<commit_message>
work on node and react exercises
</commit_message>
<xml_diff>
--- a/slides/graphq-slides.pptx
+++ b/slides/graphq-slides.pptx
@@ -18,6 +18,9 @@
     <p:sldId id="264" r:id="rId13"/>
     <p:sldId id="265" r:id="rId14"/>
     <p:sldId id="266" r:id="rId15"/>
+    <p:sldId id="267" r:id="rId16"/>
+    <p:sldId id="268" r:id="rId17"/>
+    <p:sldId id="269" r:id="rId18"/>
   </p:sldIdLst>
   <p:sldSz cx="9144000" cy="5143500"/>
   <p:notesSz cx="7559675" cy="10691812"/>
@@ -4535,7 +4538,13 @@
               <a:rPr b="0" lang="en-US" sz="4400" spc="-1" strike="noStrike">
                 <a:latin typeface="Arial"/>
               </a:rPr>
-              <a:t>Click to edit the title text format</a:t>
+              <a:t>Click to edit the title text </a:t>
+            </a:r>
+            <a:r>
+              <a:rPr b="0" lang="en-US" sz="4400" spc="-1" strike="noStrike">
+                <a:latin typeface="Arial"/>
+              </a:rPr>
+              <a:t>format</a:t>
             </a:r>
             <a:endParaRPr b="0" lang="en-US" sz="4400" spc="-1" strike="noStrike">
               <a:latin typeface="Arial"/>
@@ -4909,7 +4918,13 @@
               <a:rPr b="0" lang="en-US" sz="4400" spc="-1" strike="noStrike">
                 <a:latin typeface="Arial"/>
               </a:rPr>
-              <a:t>Click to edit the title text format</a:t>
+              <a:t>Click to edit the title text </a:t>
+            </a:r>
+            <a:r>
+              <a:rPr b="0" lang="en-US" sz="4400" spc="-1" strike="noStrike">
+                <a:latin typeface="Arial"/>
+              </a:rPr>
+              <a:t>format</a:t>
             </a:r>
             <a:endParaRPr b="0" lang="en-US" sz="4400" spc="-1" strike="noStrike">
               <a:latin typeface="Arial"/>
@@ -5422,7 +5437,7 @@
                 <a:spcPct val="100000"/>
               </a:lnSpc>
             </a:pPr>
-            <a:fld id="{1C28BD4C-4784-4B7C-9B7D-6EE711412430}" type="slidenum">
+            <a:fld id="{E26FCC4E-9DC7-4A2D-8DD4-3B68E37202CB}" type="slidenum">
               <a:rPr b="0" lang="en-US" sz="600" spc="-1" strike="noStrike">
                 <a:solidFill>
                   <a:srgbClr val="ffffff"/>
@@ -5430,7 +5445,7 @@
                 <a:latin typeface="Arial"/>
                 <a:ea typeface="DejaVu Sans"/>
               </a:rPr>
-              <a:t>1</a:t>
+              <a:t>&lt;number&gt;</a:t>
             </a:fld>
             <a:endParaRPr b="0" lang="en-US" sz="600" spc="-1" strike="noStrike">
               <a:latin typeface="Arial"/>
@@ -5803,7 +5818,7 @@
                 <a:spcPct val="100000"/>
               </a:lnSpc>
             </a:pPr>
-            <a:fld id="{195D53B2-5831-4B64-9AB6-511E86059177}" type="slidenum">
+            <a:fld id="{D498618C-D92B-49D1-A23E-1C5C59BE9C40}" type="slidenum">
               <a:rPr b="0" lang="en-US" sz="600" spc="-1" strike="noStrike">
                 <a:solidFill>
                   <a:srgbClr val="ffffff"/>
@@ -5811,7 +5826,7 @@
                 <a:latin typeface="Arial"/>
                 <a:ea typeface="DejaVu Sans"/>
               </a:rPr>
-              <a:t>1</a:t>
+              <a:t>&lt;number&gt;</a:t>
             </a:fld>
             <a:endParaRPr b="0" lang="en-US" sz="600" spc="-1" strike="noStrike">
               <a:latin typeface="Arial"/>
@@ -5921,7 +5936,7 @@
               <a:rPr b="0" lang="en-US" sz="1800" spc="-1" strike="noStrike">
                 <a:latin typeface="Arial"/>
               </a:rPr>
-              <a:t>` const fetched = await Practice.findByPk(practice.id, { include: [{ model: Person }] });`</a:t>
+              <a:t>` const fetched = await Practice.findByPk(practice.id, { include: [{ model: Person }] });`. Practice can be found on db.practice.</a:t>
             </a:r>
             <a:endParaRPr b="0" lang="en-US" sz="1800" spc="-1" strike="noStrike">
               <a:latin typeface="Arial"/>
@@ -5964,7 +5979,7 @@
               <a:rPr b="0" lang="en-US" sz="1800" spc="-1" strike="noStrike">
                 <a:latin typeface="Arial"/>
               </a:rPr>
-              <a:t>Then implement a nested resolver for projects under practices</a:t>
+              <a:t>Then implement a nested resolver for projects under practices.</a:t>
             </a:r>
             <a:endParaRPr b="0" lang="en-US" sz="1800" spc="-1" strike="noStrike">
               <a:latin typeface="Arial"/>
@@ -5986,6 +6001,1331 @@
           <p:childTnLst>
             <p:seq>
               <p:cTn id="22" dur="indefinite" nodeType="mainSeq"/>
+              <p:prevCondLst>
+                <p:cond delay="0" evt="onPrev">
+                  <p:tgtEl>
+                    <p:sldTgt/>
+                  </p:tgtEl>
+                </p:cond>
+              </p:prevCondLst>
+              <p:nextCondLst>
+                <p:cond delay="0" evt="onNext">
+                  <p:tgtEl>
+                    <p:sldTgt/>
+                  </p:tgtEl>
+                </p:cond>
+              </p:nextCondLst>
+            </p:seq>
+          </p:childTnLst>
+        </p:cTn>
+      </p:par>
+    </p:tnLst>
+  </p:timing>
+</p:sld>
+</file>
+
+<file path=ppt/slides/slide12.xml><?xml version="1.0" encoding="utf-8"?>
+<p:sld xmlns:a="http://schemas.openxmlformats.org/drawingml/2006/main" xmlns:p="http://schemas.openxmlformats.org/presentationml/2006/main" xmlns:r="http://schemas.openxmlformats.org/officeDocument/2006/relationships" xmlns:p14="http://schemas.microsoft.com/office/powerpoint/2010/main" xmlns:p15="http://schemas.microsoft.com/office/powerpoint/2012/main" xmlns:mc="http://schemas.openxmlformats.org/markup-compatibility/2006">
+  <p:cSld>
+    <p:spTree>
+      <p:nvGrpSpPr>
+        <p:cNvPr id="1" name=""/>
+        <p:cNvGrpSpPr/>
+        <p:nvPr/>
+      </p:nvGrpSpPr>
+      <p:grpSpPr>
+        <a:xfrm>
+          <a:off x="0" y="0"/>
+          <a:ext cx="0" cy="0"/>
+          <a:chOff x="0" y="0"/>
+          <a:chExt cx="0" cy="0"/>
+        </a:xfrm>
+      </p:grpSpPr>
+      <p:sp>
+        <p:nvSpPr>
+          <p:cNvPr id="179" name="CustomShape 1"/>
+          <p:cNvSpPr/>
+          <p:nvPr/>
+        </p:nvSpPr>
+        <p:spPr>
+          <a:xfrm>
+            <a:off x="720000" y="288000"/>
+            <a:ext cx="6613560" cy="493560"/>
+          </a:xfrm>
+          <a:prstGeom prst="rect">
+            <a:avLst/>
+          </a:prstGeom>
+          <a:noFill/>
+          <a:ln>
+            <a:noFill/>
+          </a:ln>
+        </p:spPr>
+        <p:style>
+          <a:lnRef idx="0"/>
+          <a:fillRef idx="0"/>
+          <a:effectRef idx="0"/>
+          <a:fontRef idx="minor"/>
+        </p:style>
+        <p:txBody>
+          <a:bodyPr lIns="0" rIns="0" tIns="0" bIns="0" anchor="ctr"/>
+          <a:p>
+            <a:pPr>
+              <a:lnSpc>
+                <a:spcPct val="85000"/>
+              </a:lnSpc>
+            </a:pPr>
+            <a:r>
+              <a:rPr b="1" lang="en-US" sz="1800" spc="-1" strike="noStrike">
+                <a:solidFill>
+                  <a:srgbClr val="e63232"/>
+                </a:solidFill>
+                <a:latin typeface="Arial"/>
+                <a:ea typeface="DejaVu Sans"/>
+              </a:rPr>
+              <a:t>To the front-end!</a:t>
+            </a:r>
+            <a:endParaRPr b="0" lang="en-US" sz="1800" spc="-1" strike="noStrike">
+              <a:latin typeface="Arial"/>
+            </a:endParaRPr>
+          </a:p>
+        </p:txBody>
+      </p:sp>
+      <p:sp>
+        <p:nvSpPr>
+          <p:cNvPr id="180" name="CustomShape 2"/>
+          <p:cNvSpPr/>
+          <p:nvPr/>
+        </p:nvSpPr>
+        <p:spPr>
+          <a:xfrm>
+            <a:off x="4968000" y="5004000"/>
+            <a:ext cx="3229560" cy="97560"/>
+          </a:xfrm>
+          <a:prstGeom prst="rect">
+            <a:avLst/>
+          </a:prstGeom>
+          <a:noFill/>
+          <a:ln>
+            <a:noFill/>
+          </a:ln>
+        </p:spPr>
+        <p:style>
+          <a:lnRef idx="0"/>
+          <a:fillRef idx="0"/>
+          <a:effectRef idx="0"/>
+          <a:fontRef idx="minor"/>
+        </p:style>
+        <p:txBody>
+          <a:bodyPr lIns="0" rIns="0" tIns="0" bIns="0"/>
+          <a:p>
+            <a:pPr algn="r">
+              <a:lnSpc>
+                <a:spcPct val="100000"/>
+              </a:lnSpc>
+            </a:pPr>
+            <a:r>
+              <a:rPr b="0" lang="en-US" sz="600" spc="-1" strike="noStrike">
+                <a:solidFill>
+                  <a:srgbClr val="ffffff"/>
+                </a:solidFill>
+                <a:latin typeface="Arial"/>
+                <a:ea typeface="DejaVu Sans"/>
+              </a:rPr>
+              <a:t>GraphQL</a:t>
+            </a:r>
+            <a:endParaRPr b="0" lang="en-US" sz="600" spc="-1" strike="noStrike">
+              <a:latin typeface="Arial"/>
+            </a:endParaRPr>
+          </a:p>
+        </p:txBody>
+      </p:sp>
+      <p:sp>
+        <p:nvSpPr>
+          <p:cNvPr id="181" name="CustomShape 3"/>
+          <p:cNvSpPr/>
+          <p:nvPr/>
+        </p:nvSpPr>
+        <p:spPr>
+          <a:xfrm>
+            <a:off x="8280000" y="5004000"/>
+            <a:ext cx="133560" cy="97560"/>
+          </a:xfrm>
+          <a:prstGeom prst="rect">
+            <a:avLst/>
+          </a:prstGeom>
+          <a:noFill/>
+          <a:ln>
+            <a:noFill/>
+          </a:ln>
+        </p:spPr>
+        <p:style>
+          <a:lnRef idx="0"/>
+          <a:fillRef idx="0"/>
+          <a:effectRef idx="0"/>
+          <a:fontRef idx="minor"/>
+        </p:style>
+        <p:txBody>
+          <a:bodyPr lIns="0" rIns="0" tIns="0" bIns="0"/>
+          <a:p>
+            <a:pPr algn="r">
+              <a:lnSpc>
+                <a:spcPct val="100000"/>
+              </a:lnSpc>
+            </a:pPr>
+            <a:fld id="{FC6D9CB2-E6F2-4EB5-A0CA-34C82A20F025}" type="slidenum">
+              <a:rPr b="0" lang="en-US" sz="600" spc="-1" strike="noStrike">
+                <a:solidFill>
+                  <a:srgbClr val="ffffff"/>
+                </a:solidFill>
+                <a:latin typeface="Arial"/>
+                <a:ea typeface="DejaVu Sans"/>
+              </a:rPr>
+              <a:t>&lt;number&gt;</a:t>
+            </a:fld>
+            <a:endParaRPr b="0" lang="en-US" sz="600" spc="-1" strike="noStrike">
+              <a:latin typeface="Arial"/>
+            </a:endParaRPr>
+          </a:p>
+        </p:txBody>
+      </p:sp>
+      <p:sp>
+        <p:nvSpPr>
+          <p:cNvPr id="182" name="CustomShape 4"/>
+          <p:cNvSpPr/>
+          <p:nvPr/>
+        </p:nvSpPr>
+        <p:spPr>
+          <a:xfrm>
+            <a:off x="602640" y="504720"/>
+            <a:ext cx="6613560" cy="3876840"/>
+          </a:xfrm>
+          <a:prstGeom prst="rect">
+            <a:avLst/>
+          </a:prstGeom>
+          <a:noFill/>
+          <a:ln>
+            <a:noFill/>
+          </a:ln>
+        </p:spPr>
+        <p:style>
+          <a:lnRef idx="0"/>
+          <a:fillRef idx="0"/>
+          <a:effectRef idx="0"/>
+          <a:fontRef idx="minor"/>
+        </p:style>
+        <p:txBody>
+          <a:bodyPr lIns="0" rIns="0" tIns="0" bIns="0"/>
+          <a:p>
+            <a:pPr>
+              <a:lnSpc>
+                <a:spcPct val="120000"/>
+              </a:lnSpc>
+            </a:pPr>
+            <a:endParaRPr b="0" lang="en-US" sz="1800" spc="-1" strike="noStrike">
+              <a:latin typeface="Arial"/>
+            </a:endParaRPr>
+          </a:p>
+          <a:p>
+            <a:pPr>
+              <a:lnSpc>
+                <a:spcPct val="120000"/>
+              </a:lnSpc>
+            </a:pPr>
+            <a:endParaRPr b="0" lang="en-US" sz="1800" spc="-1" strike="noStrike">
+              <a:latin typeface="Arial"/>
+            </a:endParaRPr>
+          </a:p>
+        </p:txBody>
+      </p:sp>
+      <p:sp>
+        <p:nvSpPr>
+          <p:cNvPr id="183" name="TextShape 5"/>
+          <p:cNvSpPr txBox="1"/>
+          <p:nvPr/>
+        </p:nvSpPr>
+        <p:spPr>
+          <a:xfrm>
+            <a:off x="822960" y="696600"/>
+            <a:ext cx="7132320" cy="3929760"/>
+          </a:xfrm>
+          <a:prstGeom prst="rect">
+            <a:avLst/>
+          </a:prstGeom>
+          <a:noFill/>
+          <a:ln>
+            <a:noFill/>
+          </a:ln>
+        </p:spPr>
+        <p:txBody>
+          <a:bodyPr lIns="90000" rIns="90000" tIns="45000" bIns="45000"/>
+          <a:p>
+            <a:r>
+              <a:rPr b="0" lang="en-US" sz="1800" spc="-1" strike="noStrike">
+                <a:latin typeface="Arial"/>
+              </a:rPr>
+              <a:t>In fetch.js add </a:t>
+            </a:r>
+            <a:endParaRPr b="0" lang="en-US" sz="1800" spc="-1" strike="noStrike">
+              <a:latin typeface="Arial"/>
+            </a:endParaRPr>
+          </a:p>
+          <a:p>
+            <a:r>
+              <a:rPr b="0" lang="en-US" sz="1800" spc="-1" strike="noStrike">
+                <a:latin typeface="Arial"/>
+              </a:rPr>
+              <a:t>`const graphqlClient = new ApolloClient({</a:t>
+            </a:r>
+            <a:endParaRPr b="0" lang="en-US" sz="1800" spc="-1" strike="noStrike">
+              <a:latin typeface="Arial"/>
+            </a:endParaRPr>
+          </a:p>
+          <a:p>
+            <a:r>
+              <a:rPr b="0" lang="en-US" sz="1800" spc="-1" strike="noStrike">
+                <a:latin typeface="Arial"/>
+              </a:rPr>
+              <a:t>  </a:t>
+            </a:r>
+            <a:r>
+              <a:rPr b="0" lang="en-US" sz="1800" spc="-1" strike="noStrike">
+                <a:latin typeface="Arial"/>
+              </a:rPr>
+              <a:t>link: new HttpLink({ uri: "http://localhost:3030/api/graphql" }),</a:t>
+            </a:r>
+            <a:endParaRPr b="0" lang="en-US" sz="1800" spc="-1" strike="noStrike">
+              <a:latin typeface="Arial"/>
+            </a:endParaRPr>
+          </a:p>
+          <a:p>
+            <a:r>
+              <a:rPr b="0" lang="en-US" sz="1800" spc="-1" strike="noStrike">
+                <a:latin typeface="Arial"/>
+              </a:rPr>
+              <a:t>  </a:t>
+            </a:r>
+            <a:r>
+              <a:rPr b="0" lang="en-US" sz="1800" spc="-1" strike="noStrike">
+                <a:latin typeface="Arial"/>
+              </a:rPr>
+              <a:t>cache: new InMemoryCache()</a:t>
+            </a:r>
+            <a:endParaRPr b="0" lang="en-US" sz="1800" spc="-1" strike="noStrike">
+              <a:latin typeface="Arial"/>
+            </a:endParaRPr>
+          </a:p>
+          <a:p>
+            <a:r>
+              <a:rPr b="0" lang="en-US" sz="1800" spc="-1" strike="noStrike">
+                <a:latin typeface="Arial"/>
+              </a:rPr>
+              <a:t>});`</a:t>
+            </a:r>
+            <a:endParaRPr b="0" lang="en-US" sz="1800" spc="-1" strike="noStrike">
+              <a:latin typeface="Arial"/>
+            </a:endParaRPr>
+          </a:p>
+          <a:p>
+            <a:endParaRPr b="0" lang="en-US" sz="1800" spc="-1" strike="noStrike">
+              <a:latin typeface="Arial"/>
+            </a:endParaRPr>
+          </a:p>
+          <a:p>
+            <a:r>
+              <a:rPr b="0" lang="en-US" sz="1800" spc="-1" strike="noStrike">
+                <a:latin typeface="Arial"/>
+              </a:rPr>
+              <a:t>Provide in App.js:</a:t>
+            </a:r>
+            <a:br/>
+            <a:r>
+              <a:rPr b="0" lang="en-US" sz="1800" spc="-1" strike="noStrike">
+                <a:latin typeface="Arial"/>
+              </a:rPr>
+              <a:t>```</a:t>
+            </a:r>
+            <a:endParaRPr b="0" lang="en-US" sz="1800" spc="-1" strike="noStrike">
+              <a:latin typeface="Arial"/>
+            </a:endParaRPr>
+          </a:p>
+          <a:p>
+            <a:r>
+              <a:rPr b="0" lang="en-US" sz="1800" spc="-1" strike="noStrike">
+                <a:latin typeface="Arial"/>
+              </a:rPr>
+              <a:t>   </a:t>
+            </a:r>
+            <a:r>
+              <a:rPr b="0" lang="en-US" sz="1800" spc="-1" strike="noStrike">
+                <a:latin typeface="Arial"/>
+              </a:rPr>
+              <a:t>&lt;ApolloProvider client={graphqlClient}&gt;</a:t>
+            </a:r>
+            <a:endParaRPr b="0" lang="en-US" sz="1800" spc="-1" strike="noStrike">
+              <a:latin typeface="Arial"/>
+            </a:endParaRPr>
+          </a:p>
+          <a:p>
+            <a:r>
+              <a:rPr b="0" lang="en-US" sz="1800" spc="-1" strike="noStrike">
+                <a:latin typeface="Arial"/>
+              </a:rPr>
+              <a:t>        </a:t>
+            </a:r>
+            <a:r>
+              <a:rPr b="0" lang="en-US" sz="1800" spc="-1" strike="noStrike">
+                <a:latin typeface="Arial"/>
+              </a:rPr>
+              <a:t>&lt;Router history={browserHistory}&gt;</a:t>
+            </a:r>
+            <a:endParaRPr b="0" lang="en-US" sz="1800" spc="-1" strike="noStrike">
+              <a:latin typeface="Arial"/>
+            </a:endParaRPr>
+          </a:p>
+          <a:p>
+            <a:r>
+              <a:rPr b="0" lang="en-US" sz="1800" spc="-1" strike="noStrike">
+                <a:latin typeface="Arial"/>
+              </a:rPr>
+              <a:t>          </a:t>
+            </a:r>
+            <a:r>
+              <a:rPr b="0" lang="en-US" sz="1800" spc="-1" strike="noStrike">
+                <a:latin typeface="Arial"/>
+              </a:rPr>
+              <a:t>&lt;Frame /&gt;</a:t>
+            </a:r>
+            <a:endParaRPr b="0" lang="en-US" sz="1800" spc="-1" strike="noStrike">
+              <a:latin typeface="Arial"/>
+            </a:endParaRPr>
+          </a:p>
+          <a:p>
+            <a:r>
+              <a:rPr b="0" lang="en-US" sz="1800" spc="-1" strike="noStrike">
+                <a:latin typeface="Arial"/>
+              </a:rPr>
+              <a:t>        </a:t>
+            </a:r>
+            <a:r>
+              <a:rPr b="0" lang="en-US" sz="1800" spc="-1" strike="noStrike">
+                <a:latin typeface="Arial"/>
+              </a:rPr>
+              <a:t>&lt;/Router&gt;</a:t>
+            </a:r>
+            <a:endParaRPr b="0" lang="en-US" sz="1800" spc="-1" strike="noStrike">
+              <a:latin typeface="Arial"/>
+            </a:endParaRPr>
+          </a:p>
+          <a:p>
+            <a:r>
+              <a:rPr b="0" lang="en-US" sz="1800" spc="-1" strike="noStrike">
+                <a:latin typeface="Arial"/>
+              </a:rPr>
+              <a:t>      </a:t>
+            </a:r>
+            <a:r>
+              <a:rPr b="0" lang="en-US" sz="1800" spc="-1" strike="noStrike">
+                <a:latin typeface="Arial"/>
+              </a:rPr>
+              <a:t>&lt;/ApolloProvider&gt;</a:t>
+            </a:r>
+            <a:br/>
+            <a:r>
+              <a:rPr b="0" lang="en-US" sz="1800" spc="-1" strike="noStrike">
+                <a:latin typeface="Arial"/>
+              </a:rPr>
+              <a:t>```</a:t>
+            </a:r>
+            <a:endParaRPr b="0" lang="en-US" sz="1800" spc="-1" strike="noStrike">
+              <a:latin typeface="Arial"/>
+            </a:endParaRPr>
+          </a:p>
+          <a:p>
+            <a:endParaRPr b="0" lang="en-US" sz="1800" spc="-1" strike="noStrike">
+              <a:latin typeface="Arial"/>
+            </a:endParaRPr>
+          </a:p>
+        </p:txBody>
+      </p:sp>
+    </p:spTree>
+  </p:cSld>
+  <p:timing>
+    <p:tnLst>
+      <p:par>
+        <p:cTn id="23" dur="indefinite" restart="never" nodeType="tmRoot">
+          <p:childTnLst>
+            <p:seq>
+              <p:cTn id="24" dur="indefinite" nodeType="mainSeq"/>
+              <p:prevCondLst>
+                <p:cond delay="0" evt="onPrev">
+                  <p:tgtEl>
+                    <p:sldTgt/>
+                  </p:tgtEl>
+                </p:cond>
+              </p:prevCondLst>
+              <p:nextCondLst>
+                <p:cond delay="0" evt="onNext">
+                  <p:tgtEl>
+                    <p:sldTgt/>
+                  </p:tgtEl>
+                </p:cond>
+              </p:nextCondLst>
+            </p:seq>
+          </p:childTnLst>
+        </p:cTn>
+      </p:par>
+    </p:tnLst>
+  </p:timing>
+</p:sld>
+</file>
+
+<file path=ppt/slides/slide13.xml><?xml version="1.0" encoding="utf-8"?>
+<p:sld xmlns:a="http://schemas.openxmlformats.org/drawingml/2006/main" xmlns:p="http://schemas.openxmlformats.org/presentationml/2006/main" xmlns:r="http://schemas.openxmlformats.org/officeDocument/2006/relationships" xmlns:p14="http://schemas.microsoft.com/office/powerpoint/2010/main" xmlns:p15="http://schemas.microsoft.com/office/powerpoint/2012/main" xmlns:mc="http://schemas.openxmlformats.org/markup-compatibility/2006">
+  <p:cSld>
+    <p:spTree>
+      <p:nvGrpSpPr>
+        <p:cNvPr id="1" name=""/>
+        <p:cNvGrpSpPr/>
+        <p:nvPr/>
+      </p:nvGrpSpPr>
+      <p:grpSpPr>
+        <a:xfrm>
+          <a:off x="0" y="0"/>
+          <a:ext cx="0" cy="0"/>
+          <a:chOff x="0" y="0"/>
+          <a:chExt cx="0" cy="0"/>
+        </a:xfrm>
+      </p:grpSpPr>
+      <p:sp>
+        <p:nvSpPr>
+          <p:cNvPr id="184" name="CustomShape 1"/>
+          <p:cNvSpPr/>
+          <p:nvPr/>
+        </p:nvSpPr>
+        <p:spPr>
+          <a:xfrm>
+            <a:off x="720000" y="288000"/>
+            <a:ext cx="6613560" cy="493560"/>
+          </a:xfrm>
+          <a:prstGeom prst="rect">
+            <a:avLst/>
+          </a:prstGeom>
+          <a:noFill/>
+          <a:ln>
+            <a:noFill/>
+          </a:ln>
+        </p:spPr>
+        <p:style>
+          <a:lnRef idx="0"/>
+          <a:fillRef idx="0"/>
+          <a:effectRef idx="0"/>
+          <a:fontRef idx="minor"/>
+        </p:style>
+        <p:txBody>
+          <a:bodyPr lIns="0" rIns="0" tIns="0" bIns="0" anchor="ctr"/>
+          <a:p>
+            <a:pPr>
+              <a:lnSpc>
+                <a:spcPct val="85000"/>
+              </a:lnSpc>
+            </a:pPr>
+            <a:r>
+              <a:rPr b="1" lang="en-US" sz="1800" spc="-1" strike="noStrike">
+                <a:solidFill>
+                  <a:srgbClr val="e63232"/>
+                </a:solidFill>
+                <a:latin typeface="Arial"/>
+                <a:ea typeface="DejaVu Sans"/>
+              </a:rPr>
+              <a:t>To the front-end!</a:t>
+            </a:r>
+            <a:endParaRPr b="0" lang="en-US" sz="1800" spc="-1" strike="noStrike">
+              <a:latin typeface="Arial"/>
+            </a:endParaRPr>
+          </a:p>
+        </p:txBody>
+      </p:sp>
+      <p:sp>
+        <p:nvSpPr>
+          <p:cNvPr id="185" name="CustomShape 2"/>
+          <p:cNvSpPr/>
+          <p:nvPr/>
+        </p:nvSpPr>
+        <p:spPr>
+          <a:xfrm>
+            <a:off x="4968000" y="5004000"/>
+            <a:ext cx="3229560" cy="97560"/>
+          </a:xfrm>
+          <a:prstGeom prst="rect">
+            <a:avLst/>
+          </a:prstGeom>
+          <a:noFill/>
+          <a:ln>
+            <a:noFill/>
+          </a:ln>
+        </p:spPr>
+        <p:style>
+          <a:lnRef idx="0"/>
+          <a:fillRef idx="0"/>
+          <a:effectRef idx="0"/>
+          <a:fontRef idx="minor"/>
+        </p:style>
+        <p:txBody>
+          <a:bodyPr lIns="0" rIns="0" tIns="0" bIns="0"/>
+          <a:p>
+            <a:pPr algn="r">
+              <a:lnSpc>
+                <a:spcPct val="100000"/>
+              </a:lnSpc>
+            </a:pPr>
+            <a:r>
+              <a:rPr b="0" lang="en-US" sz="600" spc="-1" strike="noStrike">
+                <a:solidFill>
+                  <a:srgbClr val="ffffff"/>
+                </a:solidFill>
+                <a:latin typeface="Arial"/>
+                <a:ea typeface="DejaVu Sans"/>
+              </a:rPr>
+              <a:t>GraphQL</a:t>
+            </a:r>
+            <a:endParaRPr b="0" lang="en-US" sz="600" spc="-1" strike="noStrike">
+              <a:latin typeface="Arial"/>
+            </a:endParaRPr>
+          </a:p>
+        </p:txBody>
+      </p:sp>
+      <p:sp>
+        <p:nvSpPr>
+          <p:cNvPr id="186" name="CustomShape 3"/>
+          <p:cNvSpPr/>
+          <p:nvPr/>
+        </p:nvSpPr>
+        <p:spPr>
+          <a:xfrm>
+            <a:off x="8280000" y="5004000"/>
+            <a:ext cx="133560" cy="97560"/>
+          </a:xfrm>
+          <a:prstGeom prst="rect">
+            <a:avLst/>
+          </a:prstGeom>
+          <a:noFill/>
+          <a:ln>
+            <a:noFill/>
+          </a:ln>
+        </p:spPr>
+        <p:style>
+          <a:lnRef idx="0"/>
+          <a:fillRef idx="0"/>
+          <a:effectRef idx="0"/>
+          <a:fontRef idx="minor"/>
+        </p:style>
+        <p:txBody>
+          <a:bodyPr lIns="0" rIns="0" tIns="0" bIns="0"/>
+          <a:p>
+            <a:pPr algn="r">
+              <a:lnSpc>
+                <a:spcPct val="100000"/>
+              </a:lnSpc>
+            </a:pPr>
+            <a:fld id="{05D612C7-9365-4609-A7BB-7042380A6E54}" type="slidenum">
+              <a:rPr b="0" lang="en-US" sz="600" spc="-1" strike="noStrike">
+                <a:solidFill>
+                  <a:srgbClr val="ffffff"/>
+                </a:solidFill>
+                <a:latin typeface="Arial"/>
+                <a:ea typeface="DejaVu Sans"/>
+              </a:rPr>
+              <a:t>&lt;number&gt;</a:t>
+            </a:fld>
+            <a:endParaRPr b="0" lang="en-US" sz="600" spc="-1" strike="noStrike">
+              <a:latin typeface="Arial"/>
+            </a:endParaRPr>
+          </a:p>
+        </p:txBody>
+      </p:sp>
+      <p:sp>
+        <p:nvSpPr>
+          <p:cNvPr id="187" name="CustomShape 4"/>
+          <p:cNvSpPr/>
+          <p:nvPr/>
+        </p:nvSpPr>
+        <p:spPr>
+          <a:xfrm>
+            <a:off x="602640" y="504720"/>
+            <a:ext cx="6613560" cy="3876840"/>
+          </a:xfrm>
+          <a:prstGeom prst="rect">
+            <a:avLst/>
+          </a:prstGeom>
+          <a:noFill/>
+          <a:ln>
+            <a:noFill/>
+          </a:ln>
+        </p:spPr>
+        <p:style>
+          <a:lnRef idx="0"/>
+          <a:fillRef idx="0"/>
+          <a:effectRef idx="0"/>
+          <a:fontRef idx="minor"/>
+        </p:style>
+        <p:txBody>
+          <a:bodyPr lIns="0" rIns="0" tIns="0" bIns="0"/>
+          <a:p>
+            <a:pPr>
+              <a:lnSpc>
+                <a:spcPct val="120000"/>
+              </a:lnSpc>
+            </a:pPr>
+            <a:endParaRPr b="0" lang="en-US" sz="1800" spc="-1" strike="noStrike">
+              <a:latin typeface="Arial"/>
+            </a:endParaRPr>
+          </a:p>
+          <a:p>
+            <a:pPr>
+              <a:lnSpc>
+                <a:spcPct val="120000"/>
+              </a:lnSpc>
+            </a:pPr>
+            <a:endParaRPr b="0" lang="en-US" sz="1800" spc="-1" strike="noStrike">
+              <a:latin typeface="Arial"/>
+            </a:endParaRPr>
+          </a:p>
+        </p:txBody>
+      </p:sp>
+      <p:sp>
+        <p:nvSpPr>
+          <p:cNvPr id="188" name="TextShape 5"/>
+          <p:cNvSpPr txBox="1"/>
+          <p:nvPr/>
+        </p:nvSpPr>
+        <p:spPr>
+          <a:xfrm>
+            <a:off x="822960" y="696600"/>
+            <a:ext cx="7132320" cy="3980880"/>
+          </a:xfrm>
+          <a:prstGeom prst="rect">
+            <a:avLst/>
+          </a:prstGeom>
+          <a:noFill/>
+          <a:ln>
+            <a:noFill/>
+          </a:ln>
+        </p:spPr>
+        <p:txBody>
+          <a:bodyPr lIns="90000" rIns="90000" tIns="45000" bIns="45000"/>
+          <a:p>
+            <a:r>
+              <a:rPr b="0" lang="en-US" sz="1800" spc="-1" strike="noStrike">
+                <a:latin typeface="Arial"/>
+              </a:rPr>
+              <a:t>Implement the &lt;Query /&gt; component from react-apollo in the practices component.</a:t>
+            </a:r>
+            <a:endParaRPr b="0" lang="en-US" sz="1800" spc="-1" strike="noStrike">
+              <a:latin typeface="Arial"/>
+            </a:endParaRPr>
+          </a:p>
+          <a:p>
+            <a:endParaRPr b="0" lang="en-US" sz="1800" spc="-1" strike="noStrike">
+              <a:latin typeface="Arial"/>
+            </a:endParaRPr>
+          </a:p>
+          <a:p>
+            <a:r>
+              <a:rPr b="0" lang="en-US" sz="1800" spc="-1" strike="noStrike">
+                <a:latin typeface="Arial"/>
+              </a:rPr>
+              <a:t>As Child, this component accepts a function:</a:t>
+            </a:r>
+            <a:endParaRPr b="0" lang="en-US" sz="1800" spc="-1" strike="noStrike">
+              <a:latin typeface="Arial"/>
+            </a:endParaRPr>
+          </a:p>
+          <a:p>
+            <a:r>
+              <a:rPr b="0" lang="en-US" sz="1800" spc="-1" strike="noStrike">
+                <a:latin typeface="Arial"/>
+              </a:rPr>
+              <a:t>`&lt;Query query={query}&gt;{({loading, error, data}) =&gt; { … }}`</a:t>
+            </a:r>
+            <a:endParaRPr b="0" lang="en-US" sz="1800" spc="-1" strike="noStrike">
+              <a:latin typeface="Arial"/>
+            </a:endParaRPr>
+          </a:p>
+          <a:p>
+            <a:endParaRPr b="0" lang="en-US" sz="1800" spc="-1" strike="noStrike">
+              <a:latin typeface="Arial"/>
+            </a:endParaRPr>
+          </a:p>
+          <a:p>
+            <a:r>
+              <a:rPr b="0" lang="en-US" sz="1800" spc="-1" strike="noStrike">
+                <a:latin typeface="Arial"/>
+              </a:rPr>
+              <a:t>Define the query under the component Class by using gql from the package graphql-tag:</a:t>
+            </a:r>
+            <a:endParaRPr b="0" lang="en-US" sz="1800" spc="-1" strike="noStrike">
+              <a:latin typeface="Arial"/>
+            </a:endParaRPr>
+          </a:p>
+          <a:p>
+            <a:endParaRPr b="0" lang="en-US" sz="1800" spc="-1" strike="noStrike">
+              <a:latin typeface="Arial"/>
+            </a:endParaRPr>
+          </a:p>
+          <a:p>
+            <a:r>
+              <a:rPr b="0" lang="en-US" sz="1400" spc="-1" strike="noStrike">
+                <a:latin typeface="Arial"/>
+              </a:rPr>
+              <a:t>```</a:t>
+            </a:r>
+            <a:br/>
+            <a:r>
+              <a:rPr b="0" lang="en-US" sz="1400" spc="-1" strike="noStrike">
+                <a:latin typeface="Arial"/>
+              </a:rPr>
+              <a:t>const query = gql`{</a:t>
+            </a:r>
+            <a:endParaRPr b="0" lang="en-US" sz="1400" spc="-1" strike="noStrike">
+              <a:latin typeface="Arial"/>
+            </a:endParaRPr>
+          </a:p>
+          <a:p>
+            <a:r>
+              <a:rPr b="0" lang="en-US" sz="1400" spc="-1" strike="noStrike">
+                <a:latin typeface="Arial"/>
+              </a:rPr>
+              <a:t>  </a:t>
+            </a:r>
+            <a:r>
+              <a:rPr b="0" lang="en-US" sz="1400" spc="-1" strike="noStrike">
+                <a:latin typeface="Arial"/>
+              </a:rPr>
+              <a:t>practices {</a:t>
+            </a:r>
+            <a:endParaRPr b="0" lang="en-US" sz="1400" spc="-1" strike="noStrike">
+              <a:latin typeface="Arial"/>
+            </a:endParaRPr>
+          </a:p>
+          <a:p>
+            <a:r>
+              <a:rPr b="0" lang="en-US" sz="1400" spc="-1" strike="noStrike">
+                <a:latin typeface="Arial"/>
+              </a:rPr>
+              <a:t>    </a:t>
+            </a:r>
+            <a:r>
+              <a:rPr b="0" lang="en-US" sz="1400" spc="-1" strike="noStrike">
+                <a:latin typeface="Arial"/>
+              </a:rPr>
+              <a:t>name</a:t>
+            </a:r>
+            <a:endParaRPr b="0" lang="en-US" sz="1400" spc="-1" strike="noStrike">
+              <a:latin typeface="Arial"/>
+            </a:endParaRPr>
+          </a:p>
+          <a:p>
+            <a:r>
+              <a:rPr b="0" lang="en-US" sz="1400" spc="-1" strike="noStrike">
+                <a:latin typeface="Arial"/>
+              </a:rPr>
+              <a:t>    …</a:t>
+            </a:r>
+            <a:endParaRPr b="0" lang="en-US" sz="1400" spc="-1" strike="noStrike">
+              <a:latin typeface="Arial"/>
+            </a:endParaRPr>
+          </a:p>
+          <a:p>
+            <a:r>
+              <a:rPr b="0" lang="en-US" sz="1400" spc="-1" strike="noStrike">
+                <a:latin typeface="Arial"/>
+              </a:rPr>
+              <a:t>  </a:t>
+            </a:r>
+            <a:r>
+              <a:rPr b="0" lang="en-US" sz="1400" spc="-1" strike="noStrike">
+                <a:latin typeface="Arial"/>
+              </a:rPr>
+              <a:t>}</a:t>
+            </a:r>
+            <a:endParaRPr b="0" lang="en-US" sz="1400" spc="-1" strike="noStrike">
+              <a:latin typeface="Arial"/>
+            </a:endParaRPr>
+          </a:p>
+          <a:p>
+            <a:r>
+              <a:rPr b="0" lang="en-US" sz="1400" spc="-1" strike="noStrike">
+                <a:latin typeface="Arial"/>
+              </a:rPr>
+              <a:t>}`</a:t>
+            </a:r>
+            <a:endParaRPr b="0" lang="en-US" sz="1400" spc="-1" strike="noStrike">
+              <a:latin typeface="Arial"/>
+            </a:endParaRPr>
+          </a:p>
+          <a:p>
+            <a:r>
+              <a:rPr b="0" lang="en-US" sz="1400" spc="-1" strike="noStrike">
+                <a:latin typeface="Arial"/>
+              </a:rPr>
+              <a:t>```</a:t>
+            </a:r>
+            <a:endParaRPr b="0" lang="en-US" sz="1400" spc="-1" strike="noStrike">
+              <a:latin typeface="Arial"/>
+            </a:endParaRPr>
+          </a:p>
+        </p:txBody>
+      </p:sp>
+    </p:spTree>
+  </p:cSld>
+  <p:timing>
+    <p:tnLst>
+      <p:par>
+        <p:cTn id="25" dur="indefinite" restart="never" nodeType="tmRoot">
+          <p:childTnLst>
+            <p:seq>
+              <p:cTn id="26" dur="indefinite" nodeType="mainSeq"/>
+              <p:prevCondLst>
+                <p:cond delay="0" evt="onPrev">
+                  <p:tgtEl>
+                    <p:sldTgt/>
+                  </p:tgtEl>
+                </p:cond>
+              </p:prevCondLst>
+              <p:nextCondLst>
+                <p:cond delay="0" evt="onNext">
+                  <p:tgtEl>
+                    <p:sldTgt/>
+                  </p:tgtEl>
+                </p:cond>
+              </p:nextCondLst>
+            </p:seq>
+          </p:childTnLst>
+        </p:cTn>
+      </p:par>
+    </p:tnLst>
+  </p:timing>
+</p:sld>
+</file>
+
+<file path=ppt/slides/slide14.xml><?xml version="1.0" encoding="utf-8"?>
+<p:sld xmlns:a="http://schemas.openxmlformats.org/drawingml/2006/main" xmlns:p="http://schemas.openxmlformats.org/presentationml/2006/main" xmlns:r="http://schemas.openxmlformats.org/officeDocument/2006/relationships" xmlns:p14="http://schemas.microsoft.com/office/powerpoint/2010/main" xmlns:p15="http://schemas.microsoft.com/office/powerpoint/2012/main" xmlns:mc="http://schemas.openxmlformats.org/markup-compatibility/2006">
+  <p:cSld>
+    <p:spTree>
+      <p:nvGrpSpPr>
+        <p:cNvPr id="1" name=""/>
+        <p:cNvGrpSpPr/>
+        <p:nvPr/>
+      </p:nvGrpSpPr>
+      <p:grpSpPr>
+        <a:xfrm>
+          <a:off x="0" y="0"/>
+          <a:ext cx="0" cy="0"/>
+          <a:chOff x="0" y="0"/>
+          <a:chExt cx="0" cy="0"/>
+        </a:xfrm>
+      </p:grpSpPr>
+      <p:sp>
+        <p:nvSpPr>
+          <p:cNvPr id="189" name="CustomShape 1"/>
+          <p:cNvSpPr/>
+          <p:nvPr/>
+        </p:nvSpPr>
+        <p:spPr>
+          <a:xfrm>
+            <a:off x="720000" y="288000"/>
+            <a:ext cx="6613560" cy="493560"/>
+          </a:xfrm>
+          <a:prstGeom prst="rect">
+            <a:avLst/>
+          </a:prstGeom>
+          <a:noFill/>
+          <a:ln>
+            <a:noFill/>
+          </a:ln>
+        </p:spPr>
+        <p:style>
+          <a:lnRef idx="0"/>
+          <a:fillRef idx="0"/>
+          <a:effectRef idx="0"/>
+          <a:fontRef idx="minor"/>
+        </p:style>
+        <p:txBody>
+          <a:bodyPr lIns="0" rIns="0" tIns="0" bIns="0" anchor="ctr"/>
+          <a:p>
+            <a:pPr>
+              <a:lnSpc>
+                <a:spcPct val="85000"/>
+              </a:lnSpc>
+            </a:pPr>
+            <a:r>
+              <a:rPr b="1" lang="en-US" sz="1800" spc="-1" strike="noStrike">
+                <a:solidFill>
+                  <a:srgbClr val="e63232"/>
+                </a:solidFill>
+                <a:latin typeface="Arial"/>
+                <a:ea typeface="DejaVu Sans"/>
+              </a:rPr>
+              <a:t>Inputs from the front-end</a:t>
+            </a:r>
+            <a:endParaRPr b="0" lang="en-US" sz="1800" spc="-1" strike="noStrike">
+              <a:latin typeface="Arial"/>
+            </a:endParaRPr>
+          </a:p>
+        </p:txBody>
+      </p:sp>
+      <p:sp>
+        <p:nvSpPr>
+          <p:cNvPr id="190" name="CustomShape 2"/>
+          <p:cNvSpPr/>
+          <p:nvPr/>
+        </p:nvSpPr>
+        <p:spPr>
+          <a:xfrm>
+            <a:off x="4968000" y="5004000"/>
+            <a:ext cx="3229560" cy="97560"/>
+          </a:xfrm>
+          <a:prstGeom prst="rect">
+            <a:avLst/>
+          </a:prstGeom>
+          <a:noFill/>
+          <a:ln>
+            <a:noFill/>
+          </a:ln>
+        </p:spPr>
+        <p:style>
+          <a:lnRef idx="0"/>
+          <a:fillRef idx="0"/>
+          <a:effectRef idx="0"/>
+          <a:fontRef idx="minor"/>
+        </p:style>
+        <p:txBody>
+          <a:bodyPr lIns="0" rIns="0" tIns="0" bIns="0"/>
+          <a:p>
+            <a:pPr algn="r">
+              <a:lnSpc>
+                <a:spcPct val="100000"/>
+              </a:lnSpc>
+            </a:pPr>
+            <a:r>
+              <a:rPr b="0" lang="en-US" sz="600" spc="-1" strike="noStrike">
+                <a:solidFill>
+                  <a:srgbClr val="ffffff"/>
+                </a:solidFill>
+                <a:latin typeface="Arial"/>
+                <a:ea typeface="DejaVu Sans"/>
+              </a:rPr>
+              <a:t>GraphQL</a:t>
+            </a:r>
+            <a:endParaRPr b="0" lang="en-US" sz="600" spc="-1" strike="noStrike">
+              <a:latin typeface="Arial"/>
+            </a:endParaRPr>
+          </a:p>
+        </p:txBody>
+      </p:sp>
+      <p:sp>
+        <p:nvSpPr>
+          <p:cNvPr id="191" name="CustomShape 3"/>
+          <p:cNvSpPr/>
+          <p:nvPr/>
+        </p:nvSpPr>
+        <p:spPr>
+          <a:xfrm>
+            <a:off x="8280000" y="5004000"/>
+            <a:ext cx="133560" cy="97560"/>
+          </a:xfrm>
+          <a:prstGeom prst="rect">
+            <a:avLst/>
+          </a:prstGeom>
+          <a:noFill/>
+          <a:ln>
+            <a:noFill/>
+          </a:ln>
+        </p:spPr>
+        <p:style>
+          <a:lnRef idx="0"/>
+          <a:fillRef idx="0"/>
+          <a:effectRef idx="0"/>
+          <a:fontRef idx="minor"/>
+        </p:style>
+        <p:txBody>
+          <a:bodyPr lIns="0" rIns="0" tIns="0" bIns="0"/>
+          <a:p>
+            <a:pPr algn="r">
+              <a:lnSpc>
+                <a:spcPct val="100000"/>
+              </a:lnSpc>
+            </a:pPr>
+            <a:fld id="{53736338-A33B-491E-B21C-22A8A8610938}" type="slidenum">
+              <a:rPr b="0" lang="en-US" sz="600" spc="-1" strike="noStrike">
+                <a:solidFill>
+                  <a:srgbClr val="ffffff"/>
+                </a:solidFill>
+                <a:latin typeface="Arial"/>
+                <a:ea typeface="DejaVu Sans"/>
+              </a:rPr>
+              <a:t>&lt;number&gt;</a:t>
+            </a:fld>
+            <a:endParaRPr b="0" lang="en-US" sz="600" spc="-1" strike="noStrike">
+              <a:latin typeface="Arial"/>
+            </a:endParaRPr>
+          </a:p>
+        </p:txBody>
+      </p:sp>
+      <p:sp>
+        <p:nvSpPr>
+          <p:cNvPr id="192" name="CustomShape 4"/>
+          <p:cNvSpPr/>
+          <p:nvPr/>
+        </p:nvSpPr>
+        <p:spPr>
+          <a:xfrm>
+            <a:off x="602640" y="504720"/>
+            <a:ext cx="6613560" cy="3876840"/>
+          </a:xfrm>
+          <a:prstGeom prst="rect">
+            <a:avLst/>
+          </a:prstGeom>
+          <a:noFill/>
+          <a:ln>
+            <a:noFill/>
+          </a:ln>
+        </p:spPr>
+        <p:style>
+          <a:lnRef idx="0"/>
+          <a:fillRef idx="0"/>
+          <a:effectRef idx="0"/>
+          <a:fontRef idx="minor"/>
+        </p:style>
+        <p:txBody>
+          <a:bodyPr lIns="0" rIns="0" tIns="0" bIns="0"/>
+          <a:p>
+            <a:pPr>
+              <a:lnSpc>
+                <a:spcPct val="120000"/>
+              </a:lnSpc>
+            </a:pPr>
+            <a:endParaRPr b="0" lang="en-US" sz="1800" spc="-1" strike="noStrike">
+              <a:latin typeface="Arial"/>
+            </a:endParaRPr>
+          </a:p>
+          <a:p>
+            <a:pPr>
+              <a:lnSpc>
+                <a:spcPct val="120000"/>
+              </a:lnSpc>
+            </a:pPr>
+            <a:endParaRPr b="0" lang="en-US" sz="1800" spc="-1" strike="noStrike">
+              <a:latin typeface="Arial"/>
+            </a:endParaRPr>
+          </a:p>
+        </p:txBody>
+      </p:sp>
+      <p:sp>
+        <p:nvSpPr>
+          <p:cNvPr id="193" name="TextShape 5"/>
+          <p:cNvSpPr txBox="1"/>
+          <p:nvPr/>
+        </p:nvSpPr>
+        <p:spPr>
+          <a:xfrm>
+            <a:off x="822960" y="696600"/>
+            <a:ext cx="7132320" cy="4185720"/>
+          </a:xfrm>
+          <a:prstGeom prst="rect">
+            <a:avLst/>
+          </a:prstGeom>
+          <a:noFill/>
+          <a:ln>
+            <a:noFill/>
+          </a:ln>
+        </p:spPr>
+        <p:txBody>
+          <a:bodyPr lIns="90000" rIns="90000" tIns="45000" bIns="45000"/>
+          <a:p>
+            <a:r>
+              <a:rPr b="0" lang="en-US" sz="1800" spc="-1" strike="noStrike">
+                <a:latin typeface="Arial"/>
+              </a:rPr>
+              <a:t>You can add inputs to the query just as you could from the backend. Try it out by adding an input for `ids`.</a:t>
+            </a:r>
+            <a:endParaRPr b="0" lang="en-US" sz="1800" spc="-1" strike="noStrike">
+              <a:latin typeface="Arial"/>
+            </a:endParaRPr>
+          </a:p>
+          <a:p>
+            <a:endParaRPr b="0" lang="en-US" sz="1800" spc="-1" strike="noStrike">
+              <a:latin typeface="Arial"/>
+            </a:endParaRPr>
+          </a:p>
+          <a:p>
+            <a:r>
+              <a:rPr b="0" lang="en-US" sz="1800" spc="-1" strike="noStrike">
+                <a:latin typeface="Arial"/>
+              </a:rPr>
+              <a:t>Hardcoded inputs are nice, but in order to handle something like user input we will need variable inputs. Add the variables prop to your Query component and update your query:</a:t>
+            </a:r>
+            <a:endParaRPr b="0" lang="en-US" sz="1800" spc="-1" strike="noStrike">
+              <a:latin typeface="Arial"/>
+            </a:endParaRPr>
+          </a:p>
+          <a:p>
+            <a:r>
+              <a:rPr b="0" lang="en-US" sz="1800" spc="-1" strike="noStrike">
+                <a:latin typeface="Arial"/>
+              </a:rPr>
+              <a:t>```</a:t>
+            </a:r>
+            <a:endParaRPr b="0" lang="en-US" sz="1800" spc="-1" strike="noStrike">
+              <a:latin typeface="Arial"/>
+            </a:endParaRPr>
+          </a:p>
+          <a:p>
+            <a:r>
+              <a:rPr b="0" lang="en-US" sz="1800" spc="-1" strike="noStrike">
+                <a:latin typeface="Arial"/>
+              </a:rPr>
+              <a:t>const query = gql`</a:t>
+            </a:r>
+            <a:endParaRPr b="0" lang="en-US" sz="1800" spc="-1" strike="noStrike">
+              <a:latin typeface="Arial"/>
+            </a:endParaRPr>
+          </a:p>
+          <a:p>
+            <a:r>
+              <a:rPr b="0" lang="en-US" sz="1800" spc="-1" strike="noStrike">
+                <a:latin typeface="Arial"/>
+              </a:rPr>
+              <a:t>  </a:t>
+            </a:r>
+            <a:r>
+              <a:rPr b="0" lang="en-US" sz="1800" spc="-1" strike="noStrike">
+                <a:latin typeface="Arial"/>
+              </a:rPr>
+              <a:t>query practices($ids: [Int]) {</a:t>
+            </a:r>
+            <a:endParaRPr b="0" lang="en-US" sz="1800" spc="-1" strike="noStrike">
+              <a:latin typeface="Arial"/>
+            </a:endParaRPr>
+          </a:p>
+          <a:p>
+            <a:r>
+              <a:rPr b="0" lang="en-US" sz="1800" spc="-1" strike="noStrike">
+                <a:latin typeface="Arial"/>
+              </a:rPr>
+              <a:t>    </a:t>
+            </a:r>
+            <a:r>
+              <a:rPr b="0" lang="en-US" sz="1800" spc="-1" strike="noStrike">
+                <a:latin typeface="Arial"/>
+              </a:rPr>
+              <a:t>practices(ids: $ids) {</a:t>
+            </a:r>
+            <a:endParaRPr b="0" lang="en-US" sz="1800" spc="-1" strike="noStrike">
+              <a:latin typeface="Arial"/>
+            </a:endParaRPr>
+          </a:p>
+          <a:p>
+            <a:r>
+              <a:rPr b="0" lang="en-US" sz="1800" spc="-1" strike="noStrike">
+                <a:latin typeface="Arial"/>
+              </a:rPr>
+              <a:t>      </a:t>
+            </a:r>
+            <a:r>
+              <a:rPr b="0" lang="en-US" sz="1800" spc="-1" strike="noStrike">
+                <a:latin typeface="Arial"/>
+              </a:rPr>
+              <a:t>name</a:t>
+            </a:r>
+            <a:endParaRPr b="0" lang="en-US" sz="1800" spc="-1" strike="noStrike">
+              <a:latin typeface="Arial"/>
+            </a:endParaRPr>
+          </a:p>
+          <a:p>
+            <a:r>
+              <a:rPr b="0" lang="en-US" sz="1800" spc="-1" strike="noStrike">
+                <a:latin typeface="Arial"/>
+              </a:rPr>
+              <a:t>      </a:t>
+            </a:r>
+            <a:r>
+              <a:rPr b="0" lang="en-US" sz="1800" spc="-1" strike="noStrike">
+                <a:latin typeface="Arial"/>
+              </a:rPr>
+              <a:t>...</a:t>
+            </a:r>
+            <a:endParaRPr b="0" lang="en-US" sz="1800" spc="-1" strike="noStrike">
+              <a:latin typeface="Arial"/>
+            </a:endParaRPr>
+          </a:p>
+          <a:p>
+            <a:r>
+              <a:rPr b="0" lang="en-US" sz="1800" spc="-1" strike="noStrike">
+                <a:latin typeface="Arial"/>
+              </a:rPr>
+              <a:t>    </a:t>
+            </a:r>
+            <a:r>
+              <a:rPr b="0" lang="en-US" sz="1800" spc="-1" strike="noStrike">
+                <a:latin typeface="Arial"/>
+              </a:rPr>
+              <a:t>}</a:t>
+            </a:r>
+            <a:endParaRPr b="0" lang="en-US" sz="1800" spc="-1" strike="noStrike">
+              <a:latin typeface="Arial"/>
+            </a:endParaRPr>
+          </a:p>
+          <a:p>
+            <a:r>
+              <a:rPr b="0" lang="en-US" sz="1800" spc="-1" strike="noStrike">
+                <a:latin typeface="Arial"/>
+              </a:rPr>
+              <a:t>  </a:t>
+            </a:r>
+            <a:r>
+              <a:rPr b="0" lang="en-US" sz="1800" spc="-1" strike="noStrike">
+                <a:latin typeface="Arial"/>
+              </a:rPr>
+              <a:t>}</a:t>
+            </a:r>
+            <a:endParaRPr b="0" lang="en-US" sz="1800" spc="-1" strike="noStrike">
+              <a:latin typeface="Arial"/>
+            </a:endParaRPr>
+          </a:p>
+          <a:p>
+            <a:r>
+              <a:rPr b="0" lang="en-US" sz="1800" spc="-1" strike="noStrike">
+                <a:latin typeface="Arial"/>
+              </a:rPr>
+              <a:t>`;</a:t>
+            </a:r>
+            <a:endParaRPr b="0" lang="en-US" sz="1800" spc="-1" strike="noStrike">
+              <a:latin typeface="Arial"/>
+            </a:endParaRPr>
+          </a:p>
+          <a:p>
+            <a:r>
+              <a:rPr b="0" lang="en-US" sz="1800" spc="-1" strike="noStrike">
+                <a:latin typeface="Arial"/>
+              </a:rPr>
+              <a:t>```</a:t>
+            </a:r>
+            <a:endParaRPr b="0" lang="en-US" sz="1800" spc="-1" strike="noStrike">
+              <a:latin typeface="Arial"/>
+            </a:endParaRPr>
+          </a:p>
+        </p:txBody>
+      </p:sp>
+    </p:spTree>
+  </p:cSld>
+  <p:timing>
+    <p:tnLst>
+      <p:par>
+        <p:cTn id="27" dur="indefinite" restart="never" nodeType="tmRoot">
+          <p:childTnLst>
+            <p:seq>
+              <p:cTn id="28" dur="indefinite" nodeType="mainSeq"/>
               <p:prevCondLst>
                 <p:cond delay="0" evt="onPrev">
                   <p:tgtEl>
@@ -6157,7 +7497,7 @@
                 <a:spcPct val="100000"/>
               </a:lnSpc>
             </a:pPr>
-            <a:fld id="{1FEE357A-DCCB-4AA7-BE25-758EF5F66C71}" type="slidenum">
+            <a:fld id="{2450D7F7-EC80-47F0-8F0E-8D27A55BD9ED}" type="slidenum">
               <a:rPr b="0" lang="en-US" sz="600" spc="-1" strike="noStrike">
                 <a:solidFill>
                   <a:srgbClr val="ffffff"/>
@@ -6165,7 +7505,7 @@
                 <a:latin typeface="Arial"/>
                 <a:ea typeface="DejaVu Sans"/>
               </a:rPr>
-              <a:t>1</a:t>
+              <a:t>&lt;number&gt;</a:t>
             </a:fld>
             <a:endParaRPr b="0" lang="en-US" sz="600" spc="-1" strike="noStrike">
               <a:latin typeface="Arial"/>
@@ -6425,7 +7765,7 @@
                 <a:spcPct val="100000"/>
               </a:lnSpc>
             </a:pPr>
-            <a:fld id="{60AF43B9-B025-43C0-88ED-498963F426F2}" type="slidenum">
+            <a:fld id="{87009484-9466-4AF3-BDA3-D1327FFFFF09}" type="slidenum">
               <a:rPr b="0" lang="en-US" sz="600" spc="-1" strike="noStrike">
                 <a:solidFill>
                   <a:srgbClr val="ffffff"/>
@@ -6433,7 +7773,7 @@
                 <a:latin typeface="Arial"/>
                 <a:ea typeface="DejaVu Sans"/>
               </a:rPr>
-              <a:t>1</a:t>
+              <a:t>&lt;number&gt;</a:t>
             </a:fld>
             <a:endParaRPr b="0" lang="en-US" sz="600" spc="-1" strike="noStrike">
               <a:latin typeface="Arial"/>
@@ -6726,7 +8066,7 @@
                 <a:spcPct val="100000"/>
               </a:lnSpc>
             </a:pPr>
-            <a:fld id="{1EDD4179-E857-4082-A282-9BA5032187CD}" type="slidenum">
+            <a:fld id="{B93ED06D-6A36-4E09-BAD2-E604B2B67A15}" type="slidenum">
               <a:rPr b="0" lang="en-US" sz="600" spc="-1" strike="noStrike">
                 <a:solidFill>
                   <a:srgbClr val="ffffff"/>
@@ -6734,7 +8074,7 @@
                 <a:latin typeface="Arial"/>
                 <a:ea typeface="DejaVu Sans"/>
               </a:rPr>
-              <a:t>1</a:t>
+              <a:t>&lt;number&gt;</a:t>
             </a:fld>
             <a:endParaRPr b="0" lang="en-US" sz="600" spc="-1" strike="noStrike">
               <a:latin typeface="Arial"/>
@@ -7038,7 +8378,7 @@
                 <a:spcPct val="100000"/>
               </a:lnSpc>
             </a:pPr>
-            <a:fld id="{B7F1AF36-44A3-44F1-A466-B9148831FE18}" type="slidenum">
+            <a:fld id="{1442BEEB-8AD3-4251-961C-1A3912D3AC8A}" type="slidenum">
               <a:rPr b="0" lang="en-US" sz="600" spc="-1" strike="noStrike">
                 <a:solidFill>
                   <a:srgbClr val="ffffff"/>
@@ -7046,7 +8386,7 @@
                 <a:latin typeface="Arial"/>
                 <a:ea typeface="DejaVu Sans"/>
               </a:rPr>
-              <a:t>1</a:t>
+              <a:t>&lt;number&gt;</a:t>
             </a:fld>
             <a:endParaRPr b="0" lang="en-US" sz="600" spc="-1" strike="noStrike">
               <a:latin typeface="Arial"/>
@@ -7366,7 +8706,7 @@
                 <a:spcPct val="100000"/>
               </a:lnSpc>
             </a:pPr>
-            <a:fld id="{B272E49A-DBD0-4924-9084-7A873ECA1C2F}" type="slidenum">
+            <a:fld id="{DE47341D-6C35-4AED-B1AE-24DD5BAD0694}" type="slidenum">
               <a:rPr b="0" lang="en-US" sz="600" spc="-1" strike="noStrike">
                 <a:solidFill>
                   <a:srgbClr val="ffffff"/>
@@ -7374,7 +8714,7 @@
                 <a:latin typeface="Arial"/>
                 <a:ea typeface="DejaVu Sans"/>
               </a:rPr>
-              <a:t>1</a:t>
+              <a:t>&lt;number&gt;</a:t>
             </a:fld>
             <a:endParaRPr b="0" lang="en-US" sz="600" spc="-1" strike="noStrike">
               <a:latin typeface="Arial"/>
@@ -7614,7 +8954,7 @@
                 <a:spcPct val="100000"/>
               </a:lnSpc>
             </a:pPr>
-            <a:fld id="{7DE81600-3F25-4D11-A6E2-8224AB64E2B6}" type="slidenum">
+            <a:fld id="{F28EF7E8-DD1B-4C4F-AAB0-D6CD85638178}" type="slidenum">
               <a:rPr b="0" lang="en-US" sz="600" spc="-1" strike="noStrike">
                 <a:solidFill>
                   <a:srgbClr val="ffffff"/>
@@ -7622,7 +8962,7 @@
                 <a:latin typeface="Arial"/>
                 <a:ea typeface="DejaVu Sans"/>
               </a:rPr>
-              <a:t>1</a:t>
+              <a:t>&lt;number&gt;</a:t>
             </a:fld>
             <a:endParaRPr b="0" lang="en-US" sz="600" spc="-1" strike="noStrike">
               <a:latin typeface="Arial"/>
@@ -7968,7 +9308,7 @@
                 <a:spcPct val="100000"/>
               </a:lnSpc>
             </a:pPr>
-            <a:fld id="{29690F9C-11D3-40F1-B1A7-11D54C91B6A0}" type="slidenum">
+            <a:fld id="{7ED2316E-4F41-4811-8302-F87EFBCB01D1}" type="slidenum">
               <a:rPr b="0" lang="en-US" sz="600" spc="-1" strike="noStrike">
                 <a:solidFill>
                   <a:srgbClr val="ffffff"/>
@@ -7976,7 +9316,7 @@
                 <a:latin typeface="Arial"/>
                 <a:ea typeface="DejaVu Sans"/>
               </a:rPr>
-              <a:t>1</a:t>
+              <a:t>&lt;number&gt;</a:t>
             </a:fld>
             <a:endParaRPr b="0" lang="en-US" sz="600" spc="-1" strike="noStrike">
               <a:latin typeface="Arial"/>
@@ -8338,7 +9678,7 @@
                 <a:spcPct val="100000"/>
               </a:lnSpc>
             </a:pPr>
-            <a:fld id="{6D01FA8D-94B5-4598-B078-BF06E94E6D4B}" type="slidenum">
+            <a:fld id="{20C8CFC5-5A7B-4C7D-817F-A5B22F8E9BEF}" type="slidenum">
               <a:rPr b="0" lang="en-US" sz="600" spc="-1" strike="noStrike">
                 <a:solidFill>
                   <a:srgbClr val="ffffff"/>
@@ -8346,7 +9686,7 @@
                 <a:latin typeface="Arial"/>
                 <a:ea typeface="DejaVu Sans"/>
               </a:rPr>
-              <a:t>1</a:t>
+              <a:t>&lt;number&gt;</a:t>
             </a:fld>
             <a:endParaRPr b="0" lang="en-US" sz="600" spc="-1" strike="noStrike">
               <a:latin typeface="Arial"/>

</xml_diff>

<commit_message>
work on slides and readme
</commit_message>
<xml_diff>
--- a/slides/graphq-slides.pptx
+++ b/slides/graphq-slides.pptx
@@ -18,6 +18,8 @@
     <p:sldId id="264" r:id="rId13"/>
     <p:sldId id="265" r:id="rId14"/>
     <p:sldId id="266" r:id="rId15"/>
+    <p:sldId id="267" r:id="rId16"/>
+    <p:sldId id="268" r:id="rId17"/>
   </p:sldIdLst>
   <p:sldSz cx="9144000" cy="5143500"/>
   <p:notesSz cx="7559675" cy="10691812"/>
@@ -4057,7 +4059,7 @@
         <p:spPr>
           <a:xfrm>
             <a:off x="7200000" y="360000"/>
-            <a:ext cx="1248120" cy="275760"/>
+            <a:ext cx="1247760" cy="275400"/>
           </a:xfrm>
           <a:prstGeom prst="rect">
             <a:avLst/>
@@ -4080,7 +4082,7 @@
         <p:spPr>
           <a:xfrm>
             <a:off x="0" y="4966560"/>
-            <a:ext cx="9133200" cy="165960"/>
+            <a:ext cx="9132840" cy="165600"/>
           </a:xfrm>
           <a:prstGeom prst="rect">
             <a:avLst/>
@@ -4137,7 +4139,7 @@
         <p:spPr>
           <a:xfrm>
             <a:off x="0" y="4966560"/>
-            <a:ext cx="9133200" cy="165960"/>
+            <a:ext cx="9132840" cy="165600"/>
           </a:xfrm>
           <a:prstGeom prst="rect">
             <a:avLst/>
@@ -4160,7 +4162,7 @@
         <p:spPr>
           <a:xfrm>
             <a:off x="648000" y="108000"/>
-            <a:ext cx="2869560" cy="638280"/>
+            <a:ext cx="2869200" cy="637920"/>
           </a:xfrm>
           <a:prstGeom prst="rect">
             <a:avLst/>
@@ -4441,7 +4443,7 @@
         <p:spPr>
           <a:xfrm>
             <a:off x="7200000" y="360000"/>
-            <a:ext cx="1248120" cy="275760"/>
+            <a:ext cx="1247760" cy="275400"/>
           </a:xfrm>
           <a:prstGeom prst="rect">
             <a:avLst/>
@@ -4464,7 +4466,7 @@
         <p:spPr>
           <a:xfrm>
             <a:off x="0" y="4966560"/>
-            <a:ext cx="9133200" cy="165960"/>
+            <a:ext cx="9132840" cy="165600"/>
           </a:xfrm>
           <a:prstGeom prst="rect">
             <a:avLst/>
@@ -4779,7 +4781,7 @@
         <p:spPr>
           <a:xfrm>
             <a:off x="7200000" y="360000"/>
-            <a:ext cx="1248120" cy="275760"/>
+            <a:ext cx="1247760" cy="275400"/>
           </a:xfrm>
           <a:prstGeom prst="rect">
             <a:avLst/>
@@ -4802,7 +4804,7 @@
         <p:spPr>
           <a:xfrm>
             <a:off x="0" y="4966560"/>
-            <a:ext cx="9133200" cy="165960"/>
+            <a:ext cx="9132840" cy="165600"/>
           </a:xfrm>
           <a:prstGeom prst="rect">
             <a:avLst/>
@@ -4855,7 +4857,7 @@
         <p:spPr>
           <a:xfrm>
             <a:off x="0" y="812880"/>
-            <a:ext cx="9133200" cy="3499200"/>
+            <a:ext cx="9132840" cy="3498840"/>
           </a:xfrm>
           <a:prstGeom prst="rect">
             <a:avLst/>
@@ -5147,7 +5149,7 @@
         <p:spPr>
           <a:xfrm>
             <a:off x="0" y="810000"/>
-            <a:ext cx="9133200" cy="3337200"/>
+            <a:ext cx="9132840" cy="3336840"/>
           </a:xfrm>
           <a:prstGeom prst="rect">
             <a:avLst/>
@@ -5169,7 +5171,7 @@
         <p:spPr>
           <a:xfrm>
             <a:off x="5400000" y="1548000"/>
-            <a:ext cx="3013200" cy="3013200"/>
+            <a:ext cx="3012840" cy="3012840"/>
           </a:xfrm>
           <a:prstGeom prst="rect">
             <a:avLst/>
@@ -5203,7 +5205,7 @@
                 <a:latin typeface="Arial"/>
                 <a:ea typeface="DejaVu Sans"/>
               </a:rPr>
-              <a:t>SIG graphql</a:t>
+              <a:t>SIG GraphQL</a:t>
             </a:r>
             <a:endParaRPr b="0" lang="en-US" sz="2800" spc="-1" strike="noStrike">
               <a:latin typeface="Arial"/>
@@ -5293,14 +5295,14 @@
       </p:grpSpPr>
       <p:sp>
         <p:nvSpPr>
-          <p:cNvPr id="169" name="CustomShape 1"/>
+          <p:cNvPr id="168" name="CustomShape 1"/>
           <p:cNvSpPr/>
           <p:nvPr/>
         </p:nvSpPr>
         <p:spPr>
           <a:xfrm>
             <a:off x="720000" y="288000"/>
-            <a:ext cx="6613200" cy="493200"/>
+            <a:ext cx="6612840" cy="492840"/>
           </a:xfrm>
           <a:prstGeom prst="rect">
             <a:avLst/>
@@ -5332,7 +5334,7 @@
                 <a:latin typeface="Arial"/>
                 <a:ea typeface="DejaVu Sans"/>
               </a:rPr>
-              <a:t>Inputs from the front-end</a:t>
+              <a:t>To the front-end!</a:t>
             </a:r>
             <a:endParaRPr b="0" lang="en-US" sz="1800" spc="-1" strike="noStrike">
               <a:latin typeface="Arial"/>
@@ -5342,14 +5344,14 @@
       </p:sp>
       <p:sp>
         <p:nvSpPr>
-          <p:cNvPr id="170" name="CustomShape 2"/>
+          <p:cNvPr id="169" name="CustomShape 2"/>
           <p:cNvSpPr/>
           <p:nvPr/>
         </p:nvSpPr>
         <p:spPr>
           <a:xfrm>
             <a:off x="4968000" y="5004000"/>
-            <a:ext cx="3229200" cy="97200"/>
+            <a:ext cx="3228840" cy="96840"/>
           </a:xfrm>
           <a:prstGeom prst="rect">
             <a:avLst/>
@@ -5391,14 +5393,14 @@
       </p:sp>
       <p:sp>
         <p:nvSpPr>
-          <p:cNvPr id="171" name="CustomShape 3"/>
+          <p:cNvPr id="170" name="CustomShape 3"/>
           <p:cNvSpPr/>
           <p:nvPr/>
         </p:nvSpPr>
         <p:spPr>
           <a:xfrm>
             <a:off x="8280000" y="5004000"/>
-            <a:ext cx="133200" cy="97200"/>
+            <a:ext cx="132840" cy="96840"/>
           </a:xfrm>
           <a:prstGeom prst="rect">
             <a:avLst/>
@@ -5422,7 +5424,7 @@
                 <a:spcPct val="100000"/>
               </a:lnSpc>
             </a:pPr>
-            <a:fld id="{BD1C73BD-9F57-4CBD-A8AC-4B1B6741DFDF}" type="slidenum">
+            <a:fld id="{08835AE6-77E8-449D-AEE7-A4E96D5C8139}" type="slidenum">
               <a:rPr b="0" lang="en-US" sz="600" spc="-1" strike="noStrike">
                 <a:solidFill>
                   <a:srgbClr val="ffffff"/>
@@ -5440,14 +5442,14 @@
       </p:sp>
       <p:sp>
         <p:nvSpPr>
-          <p:cNvPr id="172" name="CustomShape 4"/>
+          <p:cNvPr id="171" name="CustomShape 4"/>
           <p:cNvSpPr/>
           <p:nvPr/>
         </p:nvSpPr>
         <p:spPr>
           <a:xfrm>
             <a:off x="602640" y="504720"/>
-            <a:ext cx="6613200" cy="3876480"/>
+            <a:ext cx="6612840" cy="3876120"/>
           </a:xfrm>
           <a:prstGeom prst="rect">
             <a:avLst/>
@@ -5489,14 +5491,14 @@
       </p:sp>
       <p:sp>
         <p:nvSpPr>
-          <p:cNvPr id="173" name="CustomShape 5"/>
+          <p:cNvPr id="172" name="CustomShape 5"/>
           <p:cNvSpPr/>
           <p:nvPr/>
         </p:nvSpPr>
         <p:spPr>
           <a:xfrm>
             <a:off x="822960" y="696600"/>
-            <a:ext cx="7131960" cy="4185360"/>
+            <a:ext cx="7131600" cy="3929040"/>
           </a:xfrm>
           <a:prstGeom prst="rect">
             <a:avLst/>
@@ -5522,9 +5524,13 @@
             </a:pPr>
             <a:r>
               <a:rPr b="0" lang="en-US" sz="1800" spc="-1" strike="noStrike">
-                <a:latin typeface="Arial"/>
-              </a:rPr>
-              <a:t>You can add inputs to the query just as you could from the backend. Try it out by adding an input for `ids`.</a:t>
+                <a:solidFill>
+                  <a:srgbClr val="000000"/>
+                </a:solidFill>
+                <a:latin typeface="Arial"/>
+                <a:ea typeface="DejaVu Sans"/>
+              </a:rPr>
+              <a:t>In fetch.js add </a:t>
             </a:r>
             <a:endParaRPr b="0" lang="en-US" sz="1800" spc="-1" strike="noStrike">
               <a:latin typeface="Arial"/>
@@ -5536,6 +5542,16 @@
                 <a:spcPct val="100000"/>
               </a:lnSpc>
             </a:pPr>
+            <a:r>
+              <a:rPr b="0" lang="en-US" sz="1800" spc="-1" strike="noStrike">
+                <a:solidFill>
+                  <a:srgbClr val="000000"/>
+                </a:solidFill>
+                <a:latin typeface="Arial"/>
+                <a:ea typeface="DejaVu Sans"/>
+              </a:rPr>
+              <a:t>`const graphqlClient = new ApolloClient({</a:t>
+            </a:r>
             <a:endParaRPr b="0" lang="en-US" sz="1800" spc="-1" strike="noStrike">
               <a:latin typeface="Arial"/>
             </a:endParaRPr>
@@ -5548,9 +5564,23 @@
             </a:pPr>
             <a:r>
               <a:rPr b="0" lang="en-US" sz="1800" spc="-1" strike="noStrike">
-                <a:latin typeface="Arial"/>
-              </a:rPr>
-              <a:t>Hardcoded inputs are nice, but in order to handle something like user input we will need variable inputs. Add the variables prop to your Query component and update your query:</a:t>
+                <a:solidFill>
+                  <a:srgbClr val="000000"/>
+                </a:solidFill>
+                <a:latin typeface="Arial"/>
+                <a:ea typeface="DejaVu Sans"/>
+              </a:rPr>
+              <a:t>  </a:t>
+            </a:r>
+            <a:r>
+              <a:rPr b="0" lang="en-US" sz="1800" spc="-1" strike="noStrike">
+                <a:solidFill>
+                  <a:srgbClr val="000000"/>
+                </a:solidFill>
+                <a:latin typeface="Arial"/>
+                <a:ea typeface="DejaVu Sans"/>
+              </a:rPr>
+              <a:t>link: new HttpLink({ uri: "http://localhost:3030/api/graphql" }),</a:t>
             </a:r>
             <a:endParaRPr b="0" lang="en-US" sz="1800" spc="-1" strike="noStrike">
               <a:latin typeface="Arial"/>
@@ -5564,7 +5594,82 @@
             </a:pPr>
             <a:r>
               <a:rPr b="0" lang="en-US" sz="1800" spc="-1" strike="noStrike">
-                <a:latin typeface="Arial"/>
+                <a:solidFill>
+                  <a:srgbClr val="000000"/>
+                </a:solidFill>
+                <a:latin typeface="Arial"/>
+                <a:ea typeface="DejaVu Sans"/>
+              </a:rPr>
+              <a:t>  </a:t>
+            </a:r>
+            <a:r>
+              <a:rPr b="0" lang="en-US" sz="1800" spc="-1" strike="noStrike">
+                <a:solidFill>
+                  <a:srgbClr val="000000"/>
+                </a:solidFill>
+                <a:latin typeface="Arial"/>
+                <a:ea typeface="DejaVu Sans"/>
+              </a:rPr>
+              <a:t>cache: new InMemoryCache()</a:t>
+            </a:r>
+            <a:endParaRPr b="0" lang="en-US" sz="1800" spc="-1" strike="noStrike">
+              <a:latin typeface="Arial"/>
+            </a:endParaRPr>
+          </a:p>
+          <a:p>
+            <a:pPr>
+              <a:lnSpc>
+                <a:spcPct val="100000"/>
+              </a:lnSpc>
+            </a:pPr>
+            <a:r>
+              <a:rPr b="0" lang="en-US" sz="1800" spc="-1" strike="noStrike">
+                <a:solidFill>
+                  <a:srgbClr val="000000"/>
+                </a:solidFill>
+                <a:latin typeface="Arial"/>
+                <a:ea typeface="DejaVu Sans"/>
+              </a:rPr>
+              <a:t>});`</a:t>
+            </a:r>
+            <a:endParaRPr b="0" lang="en-US" sz="1800" spc="-1" strike="noStrike">
+              <a:latin typeface="Arial"/>
+            </a:endParaRPr>
+          </a:p>
+          <a:p>
+            <a:pPr>
+              <a:lnSpc>
+                <a:spcPct val="100000"/>
+              </a:lnSpc>
+            </a:pPr>
+            <a:endParaRPr b="0" lang="en-US" sz="1800" spc="-1" strike="noStrike">
+              <a:latin typeface="Arial"/>
+            </a:endParaRPr>
+          </a:p>
+          <a:p>
+            <a:pPr>
+              <a:lnSpc>
+                <a:spcPct val="100000"/>
+              </a:lnSpc>
+            </a:pPr>
+            <a:r>
+              <a:rPr b="0" lang="en-US" sz="1800" spc="-1" strike="noStrike">
+                <a:solidFill>
+                  <a:srgbClr val="000000"/>
+                </a:solidFill>
+                <a:latin typeface="Arial"/>
+                <a:ea typeface="DejaVu Sans"/>
+              </a:rPr>
+              <a:t>Provide in App.js:</a:t>
+            </a:r>
+            <a:br/>
+            <a:r>
+              <a:rPr b="0" lang="en-US" sz="1800" spc="-1" strike="noStrike">
+                <a:solidFill>
+                  <a:srgbClr val="000000"/>
+                </a:solidFill>
+                <a:latin typeface="Arial"/>
+                <a:ea typeface="DejaVu Sans"/>
               </a:rPr>
               <a:t>```</a:t>
             </a:r>
@@ -5580,9 +5685,23 @@
             </a:pPr>
             <a:r>
               <a:rPr b="0" lang="en-US" sz="1800" spc="-1" strike="noStrike">
-                <a:latin typeface="Arial"/>
-              </a:rPr>
-              <a:t>const query = gql`</a:t>
+                <a:solidFill>
+                  <a:srgbClr val="000000"/>
+                </a:solidFill>
+                <a:latin typeface="Arial"/>
+                <a:ea typeface="DejaVu Sans"/>
+              </a:rPr>
+              <a:t>   </a:t>
+            </a:r>
+            <a:r>
+              <a:rPr b="0" lang="en-US" sz="1800" spc="-1" strike="noStrike">
+                <a:solidFill>
+                  <a:srgbClr val="000000"/>
+                </a:solidFill>
+                <a:latin typeface="Arial"/>
+                <a:ea typeface="DejaVu Sans"/>
+              </a:rPr>
+              <a:t>&lt;ApolloProvider client={graphqlClient}&gt;</a:t>
             </a:r>
             <a:endParaRPr b="0" lang="en-US" sz="1800" spc="-1" strike="noStrike">
               <a:latin typeface="Arial"/>
@@ -5596,15 +5715,23 @@
             </a:pPr>
             <a:r>
               <a:rPr b="0" lang="en-US" sz="1800" spc="-1" strike="noStrike">
-                <a:latin typeface="Arial"/>
-              </a:rPr>
-              <a:t>  </a:t>
+                <a:solidFill>
+                  <a:srgbClr val="000000"/>
+                </a:solidFill>
+                <a:latin typeface="Arial"/>
+                <a:ea typeface="DejaVu Sans"/>
+              </a:rPr>
+              <a:t>        </a:t>
             </a:r>
             <a:r>
               <a:rPr b="0" lang="en-US" sz="1800" spc="-1" strike="noStrike">
-                <a:latin typeface="Arial"/>
-              </a:rPr>
-              <a:t>query practices($ids: [Int]) {</a:t>
+                <a:solidFill>
+                  <a:srgbClr val="000000"/>
+                </a:solidFill>
+                <a:latin typeface="Arial"/>
+                <a:ea typeface="DejaVu Sans"/>
+              </a:rPr>
+              <a:t>&lt;Router history={browserHistory}&gt;</a:t>
             </a:r>
             <a:endParaRPr b="0" lang="en-US" sz="1800" spc="-1" strike="noStrike">
               <a:latin typeface="Arial"/>
@@ -5618,15 +5745,23 @@
             </a:pPr>
             <a:r>
               <a:rPr b="0" lang="en-US" sz="1800" spc="-1" strike="noStrike">
-                <a:latin typeface="Arial"/>
-              </a:rPr>
-              <a:t>    </a:t>
+                <a:solidFill>
+                  <a:srgbClr val="000000"/>
+                </a:solidFill>
+                <a:latin typeface="Arial"/>
+                <a:ea typeface="DejaVu Sans"/>
+              </a:rPr>
+              <a:t>          </a:t>
             </a:r>
             <a:r>
               <a:rPr b="0" lang="en-US" sz="1800" spc="-1" strike="noStrike">
-                <a:latin typeface="Arial"/>
-              </a:rPr>
-              <a:t>practices(ids: $ids) {</a:t>
+                <a:solidFill>
+                  <a:srgbClr val="000000"/>
+                </a:solidFill>
+                <a:latin typeface="Arial"/>
+                <a:ea typeface="DejaVu Sans"/>
+              </a:rPr>
+              <a:t>&lt;Frame /&gt;</a:t>
             </a:r>
             <a:endParaRPr b="0" lang="en-US" sz="1800" spc="-1" strike="noStrike">
               <a:latin typeface="Arial"/>
@@ -5640,15 +5775,64 @@
             </a:pPr>
             <a:r>
               <a:rPr b="0" lang="en-US" sz="1800" spc="-1" strike="noStrike">
-                <a:latin typeface="Arial"/>
+                <a:solidFill>
+                  <a:srgbClr val="000000"/>
+                </a:solidFill>
+                <a:latin typeface="Arial"/>
+                <a:ea typeface="DejaVu Sans"/>
+              </a:rPr>
+              <a:t>        </a:t>
+            </a:r>
+            <a:r>
+              <a:rPr b="0" lang="en-US" sz="1800" spc="-1" strike="noStrike">
+                <a:solidFill>
+                  <a:srgbClr val="000000"/>
+                </a:solidFill>
+                <a:latin typeface="Arial"/>
+                <a:ea typeface="DejaVu Sans"/>
+              </a:rPr>
+              <a:t>&lt;/Router&gt;</a:t>
+            </a:r>
+            <a:endParaRPr b="0" lang="en-US" sz="1800" spc="-1" strike="noStrike">
+              <a:latin typeface="Arial"/>
+            </a:endParaRPr>
+          </a:p>
+          <a:p>
+            <a:pPr>
+              <a:lnSpc>
+                <a:spcPct val="100000"/>
+              </a:lnSpc>
+            </a:pPr>
+            <a:r>
+              <a:rPr b="0" lang="en-US" sz="1800" spc="-1" strike="noStrike">
+                <a:solidFill>
+                  <a:srgbClr val="000000"/>
+                </a:solidFill>
+                <a:latin typeface="Arial"/>
+                <a:ea typeface="DejaVu Sans"/>
               </a:rPr>
               <a:t>      </a:t>
             </a:r>
             <a:r>
               <a:rPr b="0" lang="en-US" sz="1800" spc="-1" strike="noStrike">
-                <a:latin typeface="Arial"/>
-              </a:rPr>
-              <a:t>name</a:t>
+                <a:solidFill>
+                  <a:srgbClr val="000000"/>
+                </a:solidFill>
+                <a:latin typeface="Arial"/>
+                <a:ea typeface="DejaVu Sans"/>
+              </a:rPr>
+              <a:t>&lt;/ApolloProvider&gt;</a:t>
+            </a:r>
+            <a:br/>
+            <a:r>
+              <a:rPr b="0" lang="en-US" sz="1800" spc="-1" strike="noStrike">
+                <a:solidFill>
+                  <a:srgbClr val="000000"/>
+                </a:solidFill>
+                <a:latin typeface="Arial"/>
+                <a:ea typeface="DejaVu Sans"/>
+              </a:rPr>
+              <a:t>```</a:t>
             </a:r>
             <a:endParaRPr b="0" lang="en-US" sz="1800" spc="-1" strike="noStrike">
               <a:latin typeface="Arial"/>
@@ -5660,94 +5844,6 @@
                 <a:spcPct val="100000"/>
               </a:lnSpc>
             </a:pPr>
-            <a:r>
-              <a:rPr b="0" lang="en-US" sz="1800" spc="-1" strike="noStrike">
-                <a:latin typeface="Arial"/>
-              </a:rPr>
-              <a:t>      </a:t>
-            </a:r>
-            <a:r>
-              <a:rPr b="0" lang="en-US" sz="1800" spc="-1" strike="noStrike">
-                <a:latin typeface="Arial"/>
-              </a:rPr>
-              <a:t>...</a:t>
-            </a:r>
-            <a:endParaRPr b="0" lang="en-US" sz="1800" spc="-1" strike="noStrike">
-              <a:latin typeface="Arial"/>
-            </a:endParaRPr>
-          </a:p>
-          <a:p>
-            <a:pPr>
-              <a:lnSpc>
-                <a:spcPct val="100000"/>
-              </a:lnSpc>
-            </a:pPr>
-            <a:r>
-              <a:rPr b="0" lang="en-US" sz="1800" spc="-1" strike="noStrike">
-                <a:latin typeface="Arial"/>
-              </a:rPr>
-              <a:t>    </a:t>
-            </a:r>
-            <a:r>
-              <a:rPr b="0" lang="en-US" sz="1800" spc="-1" strike="noStrike">
-                <a:latin typeface="Arial"/>
-              </a:rPr>
-              <a:t>}</a:t>
-            </a:r>
-            <a:endParaRPr b="0" lang="en-US" sz="1800" spc="-1" strike="noStrike">
-              <a:latin typeface="Arial"/>
-            </a:endParaRPr>
-          </a:p>
-          <a:p>
-            <a:pPr>
-              <a:lnSpc>
-                <a:spcPct val="100000"/>
-              </a:lnSpc>
-            </a:pPr>
-            <a:r>
-              <a:rPr b="0" lang="en-US" sz="1800" spc="-1" strike="noStrike">
-                <a:latin typeface="Arial"/>
-              </a:rPr>
-              <a:t>  </a:t>
-            </a:r>
-            <a:r>
-              <a:rPr b="0" lang="en-US" sz="1800" spc="-1" strike="noStrike">
-                <a:latin typeface="Arial"/>
-              </a:rPr>
-              <a:t>}</a:t>
-            </a:r>
-            <a:endParaRPr b="0" lang="en-US" sz="1800" spc="-1" strike="noStrike">
-              <a:latin typeface="Arial"/>
-            </a:endParaRPr>
-          </a:p>
-          <a:p>
-            <a:pPr>
-              <a:lnSpc>
-                <a:spcPct val="100000"/>
-              </a:lnSpc>
-            </a:pPr>
-            <a:r>
-              <a:rPr b="0" lang="en-US" sz="1800" spc="-1" strike="noStrike">
-                <a:latin typeface="Arial"/>
-              </a:rPr>
-              <a:t>`;</a:t>
-            </a:r>
-            <a:endParaRPr b="0" lang="en-US" sz="1800" spc="-1" strike="noStrike">
-              <a:latin typeface="Arial"/>
-            </a:endParaRPr>
-          </a:p>
-          <a:p>
-            <a:pPr>
-              <a:lnSpc>
-                <a:spcPct val="100000"/>
-              </a:lnSpc>
-            </a:pPr>
-            <a:r>
-              <a:rPr b="0" lang="en-US" sz="1800" spc="-1" strike="noStrike">
-                <a:latin typeface="Arial"/>
-              </a:rPr>
-              <a:t>```</a:t>
-            </a:r>
             <a:endParaRPr b="0" lang="en-US" sz="1800" spc="-1" strike="noStrike">
               <a:latin typeface="Arial"/>
             </a:endParaRPr>
@@ -5805,14 +5901,14 @@
       </p:grpSpPr>
       <p:sp>
         <p:nvSpPr>
-          <p:cNvPr id="174" name="CustomShape 1"/>
+          <p:cNvPr id="173" name="CustomShape 1"/>
           <p:cNvSpPr/>
           <p:nvPr/>
         </p:nvSpPr>
         <p:spPr>
           <a:xfrm>
             <a:off x="720000" y="288000"/>
-            <a:ext cx="6613200" cy="493200"/>
+            <a:ext cx="6612840" cy="492840"/>
           </a:xfrm>
           <a:prstGeom prst="rect">
             <a:avLst/>
@@ -5844,7 +5940,7 @@
                 <a:latin typeface="Arial"/>
                 <a:ea typeface="DejaVu Sans"/>
               </a:rPr>
-              <a:t>Inputs from the front-end</a:t>
+              <a:t>To the front-end!</a:t>
             </a:r>
             <a:endParaRPr b="0" lang="en-US" sz="1800" spc="-1" strike="noStrike">
               <a:latin typeface="Arial"/>
@@ -5854,14 +5950,14 @@
       </p:sp>
       <p:sp>
         <p:nvSpPr>
-          <p:cNvPr id="175" name="CustomShape 2"/>
+          <p:cNvPr id="174" name="CustomShape 2"/>
           <p:cNvSpPr/>
           <p:nvPr/>
         </p:nvSpPr>
         <p:spPr>
           <a:xfrm>
             <a:off x="4968000" y="5004000"/>
-            <a:ext cx="3229200" cy="97200"/>
+            <a:ext cx="3228840" cy="96840"/>
           </a:xfrm>
           <a:prstGeom prst="rect">
             <a:avLst/>
@@ -5903,14 +5999,14 @@
       </p:sp>
       <p:sp>
         <p:nvSpPr>
-          <p:cNvPr id="176" name="CustomShape 3"/>
+          <p:cNvPr id="175" name="CustomShape 3"/>
           <p:cNvSpPr/>
           <p:nvPr/>
         </p:nvSpPr>
         <p:spPr>
           <a:xfrm>
             <a:off x="8280000" y="5004000"/>
-            <a:ext cx="133200" cy="97200"/>
+            <a:ext cx="132840" cy="96840"/>
           </a:xfrm>
           <a:prstGeom prst="rect">
             <a:avLst/>
@@ -5934,7 +6030,7 @@
                 <a:spcPct val="100000"/>
               </a:lnSpc>
             </a:pPr>
-            <a:fld id="{463FDCDC-3D85-48E3-8863-FABB6846BA45}" type="slidenum">
+            <a:fld id="{92DD4BF7-31B0-4D39-9DD2-579C130BE815}" type="slidenum">
               <a:rPr b="0" lang="en-US" sz="600" spc="-1" strike="noStrike">
                 <a:solidFill>
                   <a:srgbClr val="ffffff"/>
@@ -5952,14 +6048,14 @@
       </p:sp>
       <p:sp>
         <p:nvSpPr>
-          <p:cNvPr id="177" name="CustomShape 4"/>
+          <p:cNvPr id="176" name="CustomShape 4"/>
           <p:cNvSpPr/>
           <p:nvPr/>
         </p:nvSpPr>
         <p:spPr>
           <a:xfrm>
             <a:off x="602640" y="504720"/>
-            <a:ext cx="6613200" cy="3876480"/>
+            <a:ext cx="6612840" cy="3876120"/>
           </a:xfrm>
           <a:prstGeom prst="rect">
             <a:avLst/>
@@ -6001,14 +6097,14 @@
       </p:sp>
       <p:sp>
         <p:nvSpPr>
-          <p:cNvPr id="178" name="CustomShape 5"/>
+          <p:cNvPr id="177" name="CustomShape 5"/>
           <p:cNvSpPr/>
           <p:nvPr/>
         </p:nvSpPr>
         <p:spPr>
           <a:xfrm>
             <a:off x="822960" y="696600"/>
-            <a:ext cx="7131960" cy="1369800"/>
+            <a:ext cx="7131600" cy="3980160"/>
           </a:xfrm>
           <a:prstGeom prst="rect">
             <a:avLst/>
@@ -6034,9 +6130,13 @@
             </a:pPr>
             <a:r>
               <a:rPr b="0" lang="en-US" sz="1800" spc="-1" strike="noStrike">
-                <a:latin typeface="Arial"/>
-              </a:rPr>
-              <a:t>Mutations</a:t>
+                <a:solidFill>
+                  <a:srgbClr val="000000"/>
+                </a:solidFill>
+                <a:latin typeface="Arial"/>
+                <a:ea typeface="DejaVu Sans"/>
+              </a:rPr>
+              <a:t>Implement the &lt;Query /&gt; component from react-apollo in the practices component.</a:t>
             </a:r>
             <a:endParaRPr b="0" lang="en-US" sz="1800" spc="-1" strike="noStrike">
               <a:latin typeface="Arial"/>
@@ -6048,11 +6148,25 @@
                 <a:spcPct val="100000"/>
               </a:lnSpc>
             </a:pPr>
+            <a:endParaRPr b="0" lang="en-US" sz="1800" spc="-1" strike="noStrike">
+              <a:latin typeface="Arial"/>
+            </a:endParaRPr>
+          </a:p>
+          <a:p>
+            <a:pPr>
+              <a:lnSpc>
+                <a:spcPct val="100000"/>
+              </a:lnSpc>
+            </a:pPr>
             <a:r>
               <a:rPr b="0" lang="en-US" sz="1800" spc="-1" strike="noStrike">
-                <a:latin typeface="Arial"/>
-              </a:rPr>
-              <a:t>Custom react component</a:t>
+                <a:solidFill>
+                  <a:srgbClr val="000000"/>
+                </a:solidFill>
+                <a:latin typeface="Arial"/>
+                <a:ea typeface="DejaVu Sans"/>
+              </a:rPr>
+              <a:t>As Child, this component accepts a function:</a:t>
             </a:r>
             <a:endParaRPr b="0" lang="en-US" sz="1800" spc="-1" strike="noStrike">
               <a:latin typeface="Arial"/>
@@ -6066,9 +6180,13 @@
             </a:pPr>
             <a:r>
               <a:rPr b="0" lang="en-US" sz="1800" spc="-1" strike="noStrike">
-                <a:latin typeface="Arial"/>
-              </a:rPr>
-              <a:t>Caching</a:t>
+                <a:solidFill>
+                  <a:srgbClr val="000000"/>
+                </a:solidFill>
+                <a:latin typeface="Arial"/>
+                <a:ea typeface="DejaVu Sans"/>
+              </a:rPr>
+              <a:t>`&lt;Query query={query}&gt;{({loading, error, data}) =&gt; { … }}`</a:t>
             </a:r>
             <a:endParaRPr b="0" lang="en-US" sz="1800" spc="-1" strike="noStrike">
               <a:latin typeface="Arial"/>
@@ -6080,11 +6198,25 @@
                 <a:spcPct val="100000"/>
               </a:lnSpc>
             </a:pPr>
+            <a:endParaRPr b="0" lang="en-US" sz="1800" spc="-1" strike="noStrike">
+              <a:latin typeface="Arial"/>
+            </a:endParaRPr>
+          </a:p>
+          <a:p>
+            <a:pPr>
+              <a:lnSpc>
+                <a:spcPct val="100000"/>
+              </a:lnSpc>
+            </a:pPr>
             <a:r>
               <a:rPr b="0" lang="en-US" sz="1800" spc="-1" strike="noStrike">
-                <a:latin typeface="Arial"/>
-              </a:rPr>
-              <a:t>(Subscriptions)</a:t>
+                <a:solidFill>
+                  <a:srgbClr val="000000"/>
+                </a:solidFill>
+                <a:latin typeface="Arial"/>
+                <a:ea typeface="DejaVu Sans"/>
+              </a:rPr>
+              <a:t>Define the query under the component Class by using gql from the package graphql-tag:</a:t>
             </a:r>
             <a:endParaRPr b="0" lang="en-US" sz="1800" spc="-1" strike="noStrike">
               <a:latin typeface="Arial"/>
@@ -6096,13 +6228,188 @@
                 <a:spcPct val="100000"/>
               </a:lnSpc>
             </a:pPr>
-            <a:r>
-              <a:rPr b="0" lang="en-US" sz="1800" spc="-1" strike="noStrike">
-                <a:latin typeface="Arial"/>
-              </a:rPr>
-              <a:t>Extra external rest endpoint</a:t>
-            </a:r>
             <a:endParaRPr b="0" lang="en-US" sz="1800" spc="-1" strike="noStrike">
+              <a:latin typeface="Arial"/>
+            </a:endParaRPr>
+          </a:p>
+          <a:p>
+            <a:pPr>
+              <a:lnSpc>
+                <a:spcPct val="100000"/>
+              </a:lnSpc>
+            </a:pPr>
+            <a:r>
+              <a:rPr b="0" lang="en-US" sz="1400" spc="-1" strike="noStrike">
+                <a:solidFill>
+                  <a:srgbClr val="000000"/>
+                </a:solidFill>
+                <a:latin typeface="Arial"/>
+                <a:ea typeface="DejaVu Sans"/>
+              </a:rPr>
+              <a:t>```</a:t>
+            </a:r>
+            <a:br/>
+            <a:r>
+              <a:rPr b="0" lang="en-US" sz="1400" spc="-1" strike="noStrike">
+                <a:solidFill>
+                  <a:srgbClr val="000000"/>
+                </a:solidFill>
+                <a:latin typeface="Arial"/>
+                <a:ea typeface="DejaVu Sans"/>
+              </a:rPr>
+              <a:t>const query = gql`{</a:t>
+            </a:r>
+            <a:endParaRPr b="0" lang="en-US" sz="1400" spc="-1" strike="noStrike">
+              <a:latin typeface="Arial"/>
+            </a:endParaRPr>
+          </a:p>
+          <a:p>
+            <a:pPr>
+              <a:lnSpc>
+                <a:spcPct val="100000"/>
+              </a:lnSpc>
+            </a:pPr>
+            <a:r>
+              <a:rPr b="0" lang="en-US" sz="1400" spc="-1" strike="noStrike">
+                <a:solidFill>
+                  <a:srgbClr val="000000"/>
+                </a:solidFill>
+                <a:latin typeface="Arial"/>
+                <a:ea typeface="DejaVu Sans"/>
+              </a:rPr>
+              <a:t>  </a:t>
+            </a:r>
+            <a:r>
+              <a:rPr b="0" lang="en-US" sz="1400" spc="-1" strike="noStrike">
+                <a:solidFill>
+                  <a:srgbClr val="000000"/>
+                </a:solidFill>
+                <a:latin typeface="Arial"/>
+                <a:ea typeface="DejaVu Sans"/>
+              </a:rPr>
+              <a:t>practices {</a:t>
+            </a:r>
+            <a:endParaRPr b="0" lang="en-US" sz="1400" spc="-1" strike="noStrike">
+              <a:latin typeface="Arial"/>
+            </a:endParaRPr>
+          </a:p>
+          <a:p>
+            <a:pPr>
+              <a:lnSpc>
+                <a:spcPct val="100000"/>
+              </a:lnSpc>
+            </a:pPr>
+            <a:r>
+              <a:rPr b="0" lang="en-US" sz="1400" spc="-1" strike="noStrike">
+                <a:solidFill>
+                  <a:srgbClr val="000000"/>
+                </a:solidFill>
+                <a:latin typeface="Arial"/>
+                <a:ea typeface="DejaVu Sans"/>
+              </a:rPr>
+              <a:t>    </a:t>
+            </a:r>
+            <a:r>
+              <a:rPr b="0" lang="en-US" sz="1400" spc="-1" strike="noStrike">
+                <a:solidFill>
+                  <a:srgbClr val="000000"/>
+                </a:solidFill>
+                <a:latin typeface="Arial"/>
+                <a:ea typeface="DejaVu Sans"/>
+              </a:rPr>
+              <a:t>name</a:t>
+            </a:r>
+            <a:endParaRPr b="0" lang="en-US" sz="1400" spc="-1" strike="noStrike">
+              <a:latin typeface="Arial"/>
+            </a:endParaRPr>
+          </a:p>
+          <a:p>
+            <a:pPr>
+              <a:lnSpc>
+                <a:spcPct val="100000"/>
+              </a:lnSpc>
+            </a:pPr>
+            <a:r>
+              <a:rPr b="0" lang="en-US" sz="1400" spc="-1" strike="noStrike">
+                <a:solidFill>
+                  <a:srgbClr val="000000"/>
+                </a:solidFill>
+                <a:latin typeface="Arial"/>
+                <a:ea typeface="DejaVu Sans"/>
+              </a:rPr>
+              <a:t>    …</a:t>
+            </a:r>
+            <a:endParaRPr b="0" lang="en-US" sz="1400" spc="-1" strike="noStrike">
+              <a:latin typeface="Arial"/>
+            </a:endParaRPr>
+          </a:p>
+          <a:p>
+            <a:pPr>
+              <a:lnSpc>
+                <a:spcPct val="100000"/>
+              </a:lnSpc>
+            </a:pPr>
+            <a:r>
+              <a:rPr b="0" lang="en-US" sz="1400" spc="-1" strike="noStrike">
+                <a:solidFill>
+                  <a:srgbClr val="000000"/>
+                </a:solidFill>
+                <a:latin typeface="Arial"/>
+                <a:ea typeface="DejaVu Sans"/>
+              </a:rPr>
+              <a:t>  </a:t>
+            </a:r>
+            <a:r>
+              <a:rPr b="0" lang="en-US" sz="1400" spc="-1" strike="noStrike">
+                <a:solidFill>
+                  <a:srgbClr val="000000"/>
+                </a:solidFill>
+                <a:latin typeface="Arial"/>
+                <a:ea typeface="DejaVu Sans"/>
+              </a:rPr>
+              <a:t>}</a:t>
+            </a:r>
+            <a:endParaRPr b="0" lang="en-US" sz="1400" spc="-1" strike="noStrike">
+              <a:latin typeface="Arial"/>
+            </a:endParaRPr>
+          </a:p>
+          <a:p>
+            <a:pPr>
+              <a:lnSpc>
+                <a:spcPct val="100000"/>
+              </a:lnSpc>
+            </a:pPr>
+            <a:r>
+              <a:rPr b="0" lang="en-US" sz="1400" spc="-1" strike="noStrike">
+                <a:solidFill>
+                  <a:srgbClr val="000000"/>
+                </a:solidFill>
+                <a:latin typeface="Arial"/>
+                <a:ea typeface="DejaVu Sans"/>
+              </a:rPr>
+              <a:t>}`</a:t>
+            </a:r>
+            <a:endParaRPr b="0" lang="en-US" sz="1400" spc="-1" strike="noStrike">
+              <a:latin typeface="Arial"/>
+            </a:endParaRPr>
+          </a:p>
+          <a:p>
+            <a:pPr>
+              <a:lnSpc>
+                <a:spcPct val="100000"/>
+              </a:lnSpc>
+            </a:pPr>
+            <a:r>
+              <a:rPr b="0" lang="en-US" sz="1400" spc="-1" strike="noStrike">
+                <a:solidFill>
+                  <a:srgbClr val="000000"/>
+                </a:solidFill>
+                <a:latin typeface="Arial"/>
+                <a:ea typeface="DejaVu Sans"/>
+              </a:rPr>
+              <a:t>```</a:t>
+            </a:r>
+            <a:endParaRPr b="0" lang="en-US" sz="1400" spc="-1" strike="noStrike">
               <a:latin typeface="Arial"/>
             </a:endParaRPr>
           </a:p>
@@ -6117,6 +6424,964 @@
           <p:childTnLst>
             <p:seq>
               <p:cTn id="22" dur="indefinite" nodeType="mainSeq"/>
+              <p:prevCondLst>
+                <p:cond delay="0" evt="onPrev">
+                  <p:tgtEl>
+                    <p:sldTgt/>
+                  </p:tgtEl>
+                </p:cond>
+              </p:prevCondLst>
+              <p:nextCondLst>
+                <p:cond delay="0" evt="onNext">
+                  <p:tgtEl>
+                    <p:sldTgt/>
+                  </p:tgtEl>
+                </p:cond>
+              </p:nextCondLst>
+            </p:seq>
+          </p:childTnLst>
+        </p:cTn>
+      </p:par>
+    </p:tnLst>
+  </p:timing>
+</p:sld>
+</file>
+
+<file path=ppt/slides/slide12.xml><?xml version="1.0" encoding="utf-8"?>
+<p:sld xmlns:a="http://schemas.openxmlformats.org/drawingml/2006/main" xmlns:p="http://schemas.openxmlformats.org/presentationml/2006/main" xmlns:r="http://schemas.openxmlformats.org/officeDocument/2006/relationships" xmlns:p14="http://schemas.microsoft.com/office/powerpoint/2010/main" xmlns:p15="http://schemas.microsoft.com/office/powerpoint/2012/main" xmlns:mc="http://schemas.openxmlformats.org/markup-compatibility/2006">
+  <p:cSld>
+    <p:spTree>
+      <p:nvGrpSpPr>
+        <p:cNvPr id="1" name=""/>
+        <p:cNvGrpSpPr/>
+        <p:nvPr/>
+      </p:nvGrpSpPr>
+      <p:grpSpPr>
+        <a:xfrm>
+          <a:off x="0" y="0"/>
+          <a:ext cx="0" cy="0"/>
+          <a:chOff x="0" y="0"/>
+          <a:chExt cx="0" cy="0"/>
+        </a:xfrm>
+      </p:grpSpPr>
+      <p:sp>
+        <p:nvSpPr>
+          <p:cNvPr id="178" name="CustomShape 1"/>
+          <p:cNvSpPr/>
+          <p:nvPr/>
+        </p:nvSpPr>
+        <p:spPr>
+          <a:xfrm>
+            <a:off x="720000" y="288000"/>
+            <a:ext cx="6612840" cy="492840"/>
+          </a:xfrm>
+          <a:prstGeom prst="rect">
+            <a:avLst/>
+          </a:prstGeom>
+          <a:noFill/>
+          <a:ln>
+            <a:noFill/>
+          </a:ln>
+        </p:spPr>
+        <p:style>
+          <a:lnRef idx="0"/>
+          <a:fillRef idx="0"/>
+          <a:effectRef idx="0"/>
+          <a:fontRef idx="minor"/>
+        </p:style>
+        <p:txBody>
+          <a:bodyPr lIns="0" rIns="0" tIns="0" bIns="0" anchor="ctr"/>
+          <a:p>
+            <a:pPr>
+              <a:lnSpc>
+                <a:spcPct val="85000"/>
+              </a:lnSpc>
+            </a:pPr>
+            <a:r>
+              <a:rPr b="1" lang="en-US" sz="1800" spc="-1" strike="noStrike">
+                <a:solidFill>
+                  <a:srgbClr val="e63232"/>
+                </a:solidFill>
+                <a:latin typeface="Arial"/>
+                <a:ea typeface="DejaVu Sans"/>
+              </a:rPr>
+              <a:t>Inputs from the front-end</a:t>
+            </a:r>
+            <a:endParaRPr b="0" lang="en-US" sz="1800" spc="-1" strike="noStrike">
+              <a:latin typeface="Arial"/>
+            </a:endParaRPr>
+          </a:p>
+        </p:txBody>
+      </p:sp>
+      <p:sp>
+        <p:nvSpPr>
+          <p:cNvPr id="179" name="CustomShape 2"/>
+          <p:cNvSpPr/>
+          <p:nvPr/>
+        </p:nvSpPr>
+        <p:spPr>
+          <a:xfrm>
+            <a:off x="4968000" y="5004000"/>
+            <a:ext cx="3228840" cy="96840"/>
+          </a:xfrm>
+          <a:prstGeom prst="rect">
+            <a:avLst/>
+          </a:prstGeom>
+          <a:noFill/>
+          <a:ln>
+            <a:noFill/>
+          </a:ln>
+        </p:spPr>
+        <p:style>
+          <a:lnRef idx="0"/>
+          <a:fillRef idx="0"/>
+          <a:effectRef idx="0"/>
+          <a:fontRef idx="minor"/>
+        </p:style>
+        <p:txBody>
+          <a:bodyPr lIns="0" rIns="0" tIns="0" bIns="0"/>
+          <a:p>
+            <a:pPr algn="r">
+              <a:lnSpc>
+                <a:spcPct val="100000"/>
+              </a:lnSpc>
+            </a:pPr>
+            <a:r>
+              <a:rPr b="0" lang="en-US" sz="600" spc="-1" strike="noStrike">
+                <a:solidFill>
+                  <a:srgbClr val="ffffff"/>
+                </a:solidFill>
+                <a:latin typeface="Arial"/>
+                <a:ea typeface="DejaVu Sans"/>
+              </a:rPr>
+              <a:t>GraphQL</a:t>
+            </a:r>
+            <a:endParaRPr b="0" lang="en-US" sz="600" spc="-1" strike="noStrike">
+              <a:latin typeface="Arial"/>
+            </a:endParaRPr>
+          </a:p>
+        </p:txBody>
+      </p:sp>
+      <p:sp>
+        <p:nvSpPr>
+          <p:cNvPr id="180" name="CustomShape 3"/>
+          <p:cNvSpPr/>
+          <p:nvPr/>
+        </p:nvSpPr>
+        <p:spPr>
+          <a:xfrm>
+            <a:off x="8280000" y="5004000"/>
+            <a:ext cx="132840" cy="96840"/>
+          </a:xfrm>
+          <a:prstGeom prst="rect">
+            <a:avLst/>
+          </a:prstGeom>
+          <a:noFill/>
+          <a:ln>
+            <a:noFill/>
+          </a:ln>
+        </p:spPr>
+        <p:style>
+          <a:lnRef idx="0"/>
+          <a:fillRef idx="0"/>
+          <a:effectRef idx="0"/>
+          <a:fontRef idx="minor"/>
+        </p:style>
+        <p:txBody>
+          <a:bodyPr lIns="0" rIns="0" tIns="0" bIns="0"/>
+          <a:p>
+            <a:pPr algn="r">
+              <a:lnSpc>
+                <a:spcPct val="100000"/>
+              </a:lnSpc>
+            </a:pPr>
+            <a:fld id="{9270D052-05A8-4F49-BCF8-FE7FF1034535}" type="slidenum">
+              <a:rPr b="0" lang="en-US" sz="600" spc="-1" strike="noStrike">
+                <a:solidFill>
+                  <a:srgbClr val="ffffff"/>
+                </a:solidFill>
+                <a:latin typeface="Arial"/>
+                <a:ea typeface="DejaVu Sans"/>
+              </a:rPr>
+              <a:t>&lt;number&gt;</a:t>
+            </a:fld>
+            <a:endParaRPr b="0" lang="en-US" sz="600" spc="-1" strike="noStrike">
+              <a:latin typeface="Arial"/>
+            </a:endParaRPr>
+          </a:p>
+        </p:txBody>
+      </p:sp>
+      <p:sp>
+        <p:nvSpPr>
+          <p:cNvPr id="181" name="CustomShape 4"/>
+          <p:cNvSpPr/>
+          <p:nvPr/>
+        </p:nvSpPr>
+        <p:spPr>
+          <a:xfrm>
+            <a:off x="602640" y="504720"/>
+            <a:ext cx="6612840" cy="3876120"/>
+          </a:xfrm>
+          <a:prstGeom prst="rect">
+            <a:avLst/>
+          </a:prstGeom>
+          <a:noFill/>
+          <a:ln>
+            <a:noFill/>
+          </a:ln>
+        </p:spPr>
+        <p:style>
+          <a:lnRef idx="0"/>
+          <a:fillRef idx="0"/>
+          <a:effectRef idx="0"/>
+          <a:fontRef idx="minor"/>
+        </p:style>
+        <p:txBody>
+          <a:bodyPr lIns="0" rIns="0" tIns="0" bIns="0"/>
+          <a:p>
+            <a:pPr>
+              <a:lnSpc>
+                <a:spcPct val="120000"/>
+              </a:lnSpc>
+            </a:pPr>
+            <a:endParaRPr b="0" lang="en-US" sz="1800" spc="-1" strike="noStrike">
+              <a:latin typeface="Arial"/>
+            </a:endParaRPr>
+          </a:p>
+          <a:p>
+            <a:pPr>
+              <a:lnSpc>
+                <a:spcPct val="120000"/>
+              </a:lnSpc>
+            </a:pPr>
+            <a:endParaRPr b="0" lang="en-US" sz="1800" spc="-1" strike="noStrike">
+              <a:latin typeface="Arial"/>
+            </a:endParaRPr>
+          </a:p>
+        </p:txBody>
+      </p:sp>
+      <p:sp>
+        <p:nvSpPr>
+          <p:cNvPr id="182" name="CustomShape 5"/>
+          <p:cNvSpPr/>
+          <p:nvPr/>
+        </p:nvSpPr>
+        <p:spPr>
+          <a:xfrm>
+            <a:off x="822960" y="696600"/>
+            <a:ext cx="7131600" cy="4185000"/>
+          </a:xfrm>
+          <a:prstGeom prst="rect">
+            <a:avLst/>
+          </a:prstGeom>
+          <a:noFill/>
+          <a:ln>
+            <a:noFill/>
+          </a:ln>
+        </p:spPr>
+        <p:style>
+          <a:lnRef idx="0"/>
+          <a:fillRef idx="0"/>
+          <a:effectRef idx="0"/>
+          <a:fontRef idx="minor"/>
+        </p:style>
+        <p:txBody>
+          <a:bodyPr lIns="90000" rIns="90000" tIns="45000" bIns="45000"/>
+          <a:p>
+            <a:pPr>
+              <a:lnSpc>
+                <a:spcPct val="100000"/>
+              </a:lnSpc>
+            </a:pPr>
+            <a:r>
+              <a:rPr b="0" lang="en-US" sz="1800" spc="-1" strike="noStrike">
+                <a:solidFill>
+                  <a:srgbClr val="000000"/>
+                </a:solidFill>
+                <a:latin typeface="Arial"/>
+                <a:ea typeface="DejaVu Sans"/>
+              </a:rPr>
+              <a:t>You can add inputs to the query just as you could from the backend. Try it out by adding an input for `ids`.</a:t>
+            </a:r>
+            <a:endParaRPr b="0" lang="en-US" sz="1800" spc="-1" strike="noStrike">
+              <a:latin typeface="Arial"/>
+            </a:endParaRPr>
+          </a:p>
+          <a:p>
+            <a:pPr>
+              <a:lnSpc>
+                <a:spcPct val="100000"/>
+              </a:lnSpc>
+            </a:pPr>
+            <a:endParaRPr b="0" lang="en-US" sz="1800" spc="-1" strike="noStrike">
+              <a:latin typeface="Arial"/>
+            </a:endParaRPr>
+          </a:p>
+          <a:p>
+            <a:pPr>
+              <a:lnSpc>
+                <a:spcPct val="100000"/>
+              </a:lnSpc>
+            </a:pPr>
+            <a:r>
+              <a:rPr b="0" lang="en-US" sz="1800" spc="-1" strike="noStrike">
+                <a:solidFill>
+                  <a:srgbClr val="000000"/>
+                </a:solidFill>
+                <a:latin typeface="Arial"/>
+                <a:ea typeface="DejaVu Sans"/>
+              </a:rPr>
+              <a:t>Hardcoded inputs are nice, but in order to handle something like user input we will need variable inputs. Add the variables prop to your Query component and update your query:</a:t>
+            </a:r>
+            <a:endParaRPr b="0" lang="en-US" sz="1800" spc="-1" strike="noStrike">
+              <a:latin typeface="Arial"/>
+            </a:endParaRPr>
+          </a:p>
+          <a:p>
+            <a:pPr>
+              <a:lnSpc>
+                <a:spcPct val="100000"/>
+              </a:lnSpc>
+            </a:pPr>
+            <a:r>
+              <a:rPr b="0" lang="en-US" sz="1800" spc="-1" strike="noStrike">
+                <a:solidFill>
+                  <a:srgbClr val="000000"/>
+                </a:solidFill>
+                <a:latin typeface="Arial"/>
+                <a:ea typeface="DejaVu Sans"/>
+              </a:rPr>
+              <a:t>```</a:t>
+            </a:r>
+            <a:endParaRPr b="0" lang="en-US" sz="1800" spc="-1" strike="noStrike">
+              <a:latin typeface="Arial"/>
+            </a:endParaRPr>
+          </a:p>
+          <a:p>
+            <a:pPr>
+              <a:lnSpc>
+                <a:spcPct val="100000"/>
+              </a:lnSpc>
+            </a:pPr>
+            <a:r>
+              <a:rPr b="0" lang="en-US" sz="1800" spc="-1" strike="noStrike">
+                <a:solidFill>
+                  <a:srgbClr val="000000"/>
+                </a:solidFill>
+                <a:latin typeface="Arial"/>
+                <a:ea typeface="DejaVu Sans"/>
+              </a:rPr>
+              <a:t>const query = gql`</a:t>
+            </a:r>
+            <a:endParaRPr b="0" lang="en-US" sz="1800" spc="-1" strike="noStrike">
+              <a:latin typeface="Arial"/>
+            </a:endParaRPr>
+          </a:p>
+          <a:p>
+            <a:pPr>
+              <a:lnSpc>
+                <a:spcPct val="100000"/>
+              </a:lnSpc>
+            </a:pPr>
+            <a:r>
+              <a:rPr b="0" lang="en-US" sz="1800" spc="-1" strike="noStrike">
+                <a:solidFill>
+                  <a:srgbClr val="000000"/>
+                </a:solidFill>
+                <a:latin typeface="Arial"/>
+                <a:ea typeface="DejaVu Sans"/>
+              </a:rPr>
+              <a:t>  </a:t>
+            </a:r>
+            <a:r>
+              <a:rPr b="0" lang="en-US" sz="1800" spc="-1" strike="noStrike">
+                <a:solidFill>
+                  <a:srgbClr val="000000"/>
+                </a:solidFill>
+                <a:latin typeface="Arial"/>
+                <a:ea typeface="DejaVu Sans"/>
+              </a:rPr>
+              <a:t>query practices($ids: [Int]) {</a:t>
+            </a:r>
+            <a:endParaRPr b="0" lang="en-US" sz="1800" spc="-1" strike="noStrike">
+              <a:latin typeface="Arial"/>
+            </a:endParaRPr>
+          </a:p>
+          <a:p>
+            <a:pPr>
+              <a:lnSpc>
+                <a:spcPct val="100000"/>
+              </a:lnSpc>
+            </a:pPr>
+            <a:r>
+              <a:rPr b="0" lang="en-US" sz="1800" spc="-1" strike="noStrike">
+                <a:solidFill>
+                  <a:srgbClr val="000000"/>
+                </a:solidFill>
+                <a:latin typeface="Arial"/>
+                <a:ea typeface="DejaVu Sans"/>
+              </a:rPr>
+              <a:t>    </a:t>
+            </a:r>
+            <a:r>
+              <a:rPr b="0" lang="en-US" sz="1800" spc="-1" strike="noStrike">
+                <a:solidFill>
+                  <a:srgbClr val="000000"/>
+                </a:solidFill>
+                <a:latin typeface="Arial"/>
+                <a:ea typeface="DejaVu Sans"/>
+              </a:rPr>
+              <a:t>practices(ids: $ids) {</a:t>
+            </a:r>
+            <a:endParaRPr b="0" lang="en-US" sz="1800" spc="-1" strike="noStrike">
+              <a:latin typeface="Arial"/>
+            </a:endParaRPr>
+          </a:p>
+          <a:p>
+            <a:pPr>
+              <a:lnSpc>
+                <a:spcPct val="100000"/>
+              </a:lnSpc>
+            </a:pPr>
+            <a:r>
+              <a:rPr b="0" lang="en-US" sz="1800" spc="-1" strike="noStrike">
+                <a:solidFill>
+                  <a:srgbClr val="000000"/>
+                </a:solidFill>
+                <a:latin typeface="Arial"/>
+                <a:ea typeface="DejaVu Sans"/>
+              </a:rPr>
+              <a:t>      </a:t>
+            </a:r>
+            <a:r>
+              <a:rPr b="0" lang="en-US" sz="1800" spc="-1" strike="noStrike">
+                <a:solidFill>
+                  <a:srgbClr val="000000"/>
+                </a:solidFill>
+                <a:latin typeface="Arial"/>
+                <a:ea typeface="DejaVu Sans"/>
+              </a:rPr>
+              <a:t>name</a:t>
+            </a:r>
+            <a:endParaRPr b="0" lang="en-US" sz="1800" spc="-1" strike="noStrike">
+              <a:latin typeface="Arial"/>
+            </a:endParaRPr>
+          </a:p>
+          <a:p>
+            <a:pPr>
+              <a:lnSpc>
+                <a:spcPct val="100000"/>
+              </a:lnSpc>
+            </a:pPr>
+            <a:r>
+              <a:rPr b="0" lang="en-US" sz="1800" spc="-1" strike="noStrike">
+                <a:solidFill>
+                  <a:srgbClr val="000000"/>
+                </a:solidFill>
+                <a:latin typeface="Arial"/>
+                <a:ea typeface="DejaVu Sans"/>
+              </a:rPr>
+              <a:t>      </a:t>
+            </a:r>
+            <a:r>
+              <a:rPr b="0" lang="en-US" sz="1800" spc="-1" strike="noStrike">
+                <a:solidFill>
+                  <a:srgbClr val="000000"/>
+                </a:solidFill>
+                <a:latin typeface="Arial"/>
+                <a:ea typeface="DejaVu Sans"/>
+              </a:rPr>
+              <a:t>...</a:t>
+            </a:r>
+            <a:endParaRPr b="0" lang="en-US" sz="1800" spc="-1" strike="noStrike">
+              <a:latin typeface="Arial"/>
+            </a:endParaRPr>
+          </a:p>
+          <a:p>
+            <a:pPr>
+              <a:lnSpc>
+                <a:spcPct val="100000"/>
+              </a:lnSpc>
+            </a:pPr>
+            <a:r>
+              <a:rPr b="0" lang="en-US" sz="1800" spc="-1" strike="noStrike">
+                <a:solidFill>
+                  <a:srgbClr val="000000"/>
+                </a:solidFill>
+                <a:latin typeface="Arial"/>
+                <a:ea typeface="DejaVu Sans"/>
+              </a:rPr>
+              <a:t>    </a:t>
+            </a:r>
+            <a:r>
+              <a:rPr b="0" lang="en-US" sz="1800" spc="-1" strike="noStrike">
+                <a:solidFill>
+                  <a:srgbClr val="000000"/>
+                </a:solidFill>
+                <a:latin typeface="Arial"/>
+                <a:ea typeface="DejaVu Sans"/>
+              </a:rPr>
+              <a:t>}</a:t>
+            </a:r>
+            <a:endParaRPr b="0" lang="en-US" sz="1800" spc="-1" strike="noStrike">
+              <a:latin typeface="Arial"/>
+            </a:endParaRPr>
+          </a:p>
+          <a:p>
+            <a:pPr>
+              <a:lnSpc>
+                <a:spcPct val="100000"/>
+              </a:lnSpc>
+            </a:pPr>
+            <a:r>
+              <a:rPr b="0" lang="en-US" sz="1800" spc="-1" strike="noStrike">
+                <a:solidFill>
+                  <a:srgbClr val="000000"/>
+                </a:solidFill>
+                <a:latin typeface="Arial"/>
+                <a:ea typeface="DejaVu Sans"/>
+              </a:rPr>
+              <a:t>  </a:t>
+            </a:r>
+            <a:r>
+              <a:rPr b="0" lang="en-US" sz="1800" spc="-1" strike="noStrike">
+                <a:solidFill>
+                  <a:srgbClr val="000000"/>
+                </a:solidFill>
+                <a:latin typeface="Arial"/>
+                <a:ea typeface="DejaVu Sans"/>
+              </a:rPr>
+              <a:t>}</a:t>
+            </a:r>
+            <a:endParaRPr b="0" lang="en-US" sz="1800" spc="-1" strike="noStrike">
+              <a:latin typeface="Arial"/>
+            </a:endParaRPr>
+          </a:p>
+          <a:p>
+            <a:pPr>
+              <a:lnSpc>
+                <a:spcPct val="100000"/>
+              </a:lnSpc>
+            </a:pPr>
+            <a:r>
+              <a:rPr b="0" lang="en-US" sz="1800" spc="-1" strike="noStrike">
+                <a:solidFill>
+                  <a:srgbClr val="000000"/>
+                </a:solidFill>
+                <a:latin typeface="Arial"/>
+                <a:ea typeface="DejaVu Sans"/>
+              </a:rPr>
+              <a:t>`;</a:t>
+            </a:r>
+            <a:endParaRPr b="0" lang="en-US" sz="1800" spc="-1" strike="noStrike">
+              <a:latin typeface="Arial"/>
+            </a:endParaRPr>
+          </a:p>
+          <a:p>
+            <a:pPr>
+              <a:lnSpc>
+                <a:spcPct val="100000"/>
+              </a:lnSpc>
+            </a:pPr>
+            <a:r>
+              <a:rPr b="0" lang="en-US" sz="1800" spc="-1" strike="noStrike">
+                <a:solidFill>
+                  <a:srgbClr val="000000"/>
+                </a:solidFill>
+                <a:latin typeface="Arial"/>
+                <a:ea typeface="DejaVu Sans"/>
+              </a:rPr>
+              <a:t>```</a:t>
+            </a:r>
+            <a:endParaRPr b="0" lang="en-US" sz="1800" spc="-1" strike="noStrike">
+              <a:latin typeface="Arial"/>
+            </a:endParaRPr>
+          </a:p>
+        </p:txBody>
+      </p:sp>
+    </p:spTree>
+  </p:cSld>
+  <p:timing>
+    <p:tnLst>
+      <p:par>
+        <p:cTn id="23" dur="indefinite" restart="never" nodeType="tmRoot">
+          <p:childTnLst>
+            <p:seq>
+              <p:cTn id="24" dur="indefinite" nodeType="mainSeq"/>
+              <p:prevCondLst>
+                <p:cond delay="0" evt="onPrev">
+                  <p:tgtEl>
+                    <p:sldTgt/>
+                  </p:tgtEl>
+                </p:cond>
+              </p:prevCondLst>
+              <p:nextCondLst>
+                <p:cond delay="0" evt="onNext">
+                  <p:tgtEl>
+                    <p:sldTgt/>
+                  </p:tgtEl>
+                </p:cond>
+              </p:nextCondLst>
+            </p:seq>
+          </p:childTnLst>
+        </p:cTn>
+      </p:par>
+    </p:tnLst>
+  </p:timing>
+</p:sld>
+</file>
+
+<file path=ppt/slides/slide13.xml><?xml version="1.0" encoding="utf-8"?>
+<p:sld xmlns:a="http://schemas.openxmlformats.org/drawingml/2006/main" xmlns:p="http://schemas.openxmlformats.org/presentationml/2006/main" xmlns:r="http://schemas.openxmlformats.org/officeDocument/2006/relationships" xmlns:p14="http://schemas.microsoft.com/office/powerpoint/2010/main" xmlns:p15="http://schemas.microsoft.com/office/powerpoint/2012/main" xmlns:mc="http://schemas.openxmlformats.org/markup-compatibility/2006">
+  <p:cSld>
+    <p:spTree>
+      <p:nvGrpSpPr>
+        <p:cNvPr id="1" name=""/>
+        <p:cNvGrpSpPr/>
+        <p:nvPr/>
+      </p:nvGrpSpPr>
+      <p:grpSpPr>
+        <a:xfrm>
+          <a:off x="0" y="0"/>
+          <a:ext cx="0" cy="0"/>
+          <a:chOff x="0" y="0"/>
+          <a:chExt cx="0" cy="0"/>
+        </a:xfrm>
+      </p:grpSpPr>
+      <p:sp>
+        <p:nvSpPr>
+          <p:cNvPr id="183" name="CustomShape 1"/>
+          <p:cNvSpPr/>
+          <p:nvPr/>
+        </p:nvSpPr>
+        <p:spPr>
+          <a:xfrm>
+            <a:off x="720000" y="288000"/>
+            <a:ext cx="6612840" cy="492840"/>
+          </a:xfrm>
+          <a:prstGeom prst="rect">
+            <a:avLst/>
+          </a:prstGeom>
+          <a:noFill/>
+          <a:ln>
+            <a:noFill/>
+          </a:ln>
+        </p:spPr>
+        <p:style>
+          <a:lnRef idx="0"/>
+          <a:fillRef idx="0"/>
+          <a:effectRef idx="0"/>
+          <a:fontRef idx="minor"/>
+        </p:style>
+        <p:txBody>
+          <a:bodyPr lIns="0" rIns="0" tIns="0" bIns="0" anchor="ctr"/>
+          <a:p>
+            <a:pPr>
+              <a:lnSpc>
+                <a:spcPct val="85000"/>
+              </a:lnSpc>
+            </a:pPr>
+            <a:r>
+              <a:rPr b="1" lang="en-US" sz="1800" spc="-1" strike="noStrike">
+                <a:solidFill>
+                  <a:srgbClr val="e63232"/>
+                </a:solidFill>
+                <a:latin typeface="Arial"/>
+                <a:ea typeface="DejaVu Sans"/>
+              </a:rPr>
+              <a:t>Inputs from the front-end</a:t>
+            </a:r>
+            <a:endParaRPr b="0" lang="en-US" sz="1800" spc="-1" strike="noStrike">
+              <a:latin typeface="Arial"/>
+            </a:endParaRPr>
+          </a:p>
+        </p:txBody>
+      </p:sp>
+      <p:sp>
+        <p:nvSpPr>
+          <p:cNvPr id="184" name="CustomShape 2"/>
+          <p:cNvSpPr/>
+          <p:nvPr/>
+        </p:nvSpPr>
+        <p:spPr>
+          <a:xfrm>
+            <a:off x="4968000" y="5004000"/>
+            <a:ext cx="3228840" cy="96840"/>
+          </a:xfrm>
+          <a:prstGeom prst="rect">
+            <a:avLst/>
+          </a:prstGeom>
+          <a:noFill/>
+          <a:ln>
+            <a:noFill/>
+          </a:ln>
+        </p:spPr>
+        <p:style>
+          <a:lnRef idx="0"/>
+          <a:fillRef idx="0"/>
+          <a:effectRef idx="0"/>
+          <a:fontRef idx="minor"/>
+        </p:style>
+        <p:txBody>
+          <a:bodyPr lIns="0" rIns="0" tIns="0" bIns="0"/>
+          <a:p>
+            <a:pPr algn="r">
+              <a:lnSpc>
+                <a:spcPct val="100000"/>
+              </a:lnSpc>
+            </a:pPr>
+            <a:r>
+              <a:rPr b="0" lang="en-US" sz="600" spc="-1" strike="noStrike">
+                <a:solidFill>
+                  <a:srgbClr val="ffffff"/>
+                </a:solidFill>
+                <a:latin typeface="Arial"/>
+                <a:ea typeface="DejaVu Sans"/>
+              </a:rPr>
+              <a:t>GraphQL</a:t>
+            </a:r>
+            <a:endParaRPr b="0" lang="en-US" sz="600" spc="-1" strike="noStrike">
+              <a:latin typeface="Arial"/>
+            </a:endParaRPr>
+          </a:p>
+        </p:txBody>
+      </p:sp>
+      <p:sp>
+        <p:nvSpPr>
+          <p:cNvPr id="185" name="CustomShape 3"/>
+          <p:cNvSpPr/>
+          <p:nvPr/>
+        </p:nvSpPr>
+        <p:spPr>
+          <a:xfrm>
+            <a:off x="8280000" y="5004000"/>
+            <a:ext cx="132840" cy="96840"/>
+          </a:xfrm>
+          <a:prstGeom prst="rect">
+            <a:avLst/>
+          </a:prstGeom>
+          <a:noFill/>
+          <a:ln>
+            <a:noFill/>
+          </a:ln>
+        </p:spPr>
+        <p:style>
+          <a:lnRef idx="0"/>
+          <a:fillRef idx="0"/>
+          <a:effectRef idx="0"/>
+          <a:fontRef idx="minor"/>
+        </p:style>
+        <p:txBody>
+          <a:bodyPr lIns="0" rIns="0" tIns="0" bIns="0"/>
+          <a:p>
+            <a:pPr algn="r">
+              <a:lnSpc>
+                <a:spcPct val="100000"/>
+              </a:lnSpc>
+            </a:pPr>
+            <a:fld id="{32DC13C3-72F5-4FD8-8255-9FEF5B83C4B6}" type="slidenum">
+              <a:rPr b="0" lang="en-US" sz="600" spc="-1" strike="noStrike">
+                <a:solidFill>
+                  <a:srgbClr val="ffffff"/>
+                </a:solidFill>
+                <a:latin typeface="Arial"/>
+                <a:ea typeface="DejaVu Sans"/>
+              </a:rPr>
+              <a:t>&lt;number&gt;</a:t>
+            </a:fld>
+            <a:endParaRPr b="0" lang="en-US" sz="600" spc="-1" strike="noStrike">
+              <a:latin typeface="Arial"/>
+            </a:endParaRPr>
+          </a:p>
+        </p:txBody>
+      </p:sp>
+      <p:sp>
+        <p:nvSpPr>
+          <p:cNvPr id="186" name="CustomShape 4"/>
+          <p:cNvSpPr/>
+          <p:nvPr/>
+        </p:nvSpPr>
+        <p:spPr>
+          <a:xfrm>
+            <a:off x="602640" y="504720"/>
+            <a:ext cx="6612840" cy="3876120"/>
+          </a:xfrm>
+          <a:prstGeom prst="rect">
+            <a:avLst/>
+          </a:prstGeom>
+          <a:noFill/>
+          <a:ln>
+            <a:noFill/>
+          </a:ln>
+        </p:spPr>
+        <p:style>
+          <a:lnRef idx="0"/>
+          <a:fillRef idx="0"/>
+          <a:effectRef idx="0"/>
+          <a:fontRef idx="minor"/>
+        </p:style>
+        <p:txBody>
+          <a:bodyPr lIns="0" rIns="0" tIns="0" bIns="0"/>
+          <a:p>
+            <a:pPr>
+              <a:lnSpc>
+                <a:spcPct val="120000"/>
+              </a:lnSpc>
+            </a:pPr>
+            <a:endParaRPr b="0" lang="en-US" sz="1800" spc="-1" strike="noStrike">
+              <a:latin typeface="Arial"/>
+            </a:endParaRPr>
+          </a:p>
+          <a:p>
+            <a:pPr>
+              <a:lnSpc>
+                <a:spcPct val="120000"/>
+              </a:lnSpc>
+            </a:pPr>
+            <a:endParaRPr b="0" lang="en-US" sz="1800" spc="-1" strike="noStrike">
+              <a:latin typeface="Arial"/>
+            </a:endParaRPr>
+          </a:p>
+        </p:txBody>
+      </p:sp>
+      <p:sp>
+        <p:nvSpPr>
+          <p:cNvPr id="187" name="CustomShape 5"/>
+          <p:cNvSpPr/>
+          <p:nvPr/>
+        </p:nvSpPr>
+        <p:spPr>
+          <a:xfrm>
+            <a:off x="822960" y="696600"/>
+            <a:ext cx="7131600" cy="1369440"/>
+          </a:xfrm>
+          <a:prstGeom prst="rect">
+            <a:avLst/>
+          </a:prstGeom>
+          <a:noFill/>
+          <a:ln>
+            <a:noFill/>
+          </a:ln>
+        </p:spPr>
+        <p:style>
+          <a:lnRef idx="0"/>
+          <a:fillRef idx="0"/>
+          <a:effectRef idx="0"/>
+          <a:fontRef idx="minor"/>
+        </p:style>
+        <p:txBody>
+          <a:bodyPr lIns="90000" rIns="90000" tIns="45000" bIns="45000"/>
+          <a:p>
+            <a:pPr>
+              <a:lnSpc>
+                <a:spcPct val="100000"/>
+              </a:lnSpc>
+            </a:pPr>
+            <a:r>
+              <a:rPr b="0" lang="en-US" sz="1800" spc="-1" strike="noStrike">
+                <a:solidFill>
+                  <a:srgbClr val="000000"/>
+                </a:solidFill>
+                <a:latin typeface="Arial"/>
+                <a:ea typeface="DejaVu Sans"/>
+              </a:rPr>
+              <a:t>Mutations</a:t>
+            </a:r>
+            <a:endParaRPr b="0" lang="en-US" sz="1800" spc="-1" strike="noStrike">
+              <a:latin typeface="Arial"/>
+            </a:endParaRPr>
+          </a:p>
+          <a:p>
+            <a:pPr>
+              <a:lnSpc>
+                <a:spcPct val="100000"/>
+              </a:lnSpc>
+            </a:pPr>
+            <a:r>
+              <a:rPr b="0" lang="en-US" sz="1800" spc="-1" strike="noStrike">
+                <a:solidFill>
+                  <a:srgbClr val="000000"/>
+                </a:solidFill>
+                <a:latin typeface="Arial"/>
+                <a:ea typeface="DejaVu Sans"/>
+              </a:rPr>
+              <a:t>Custom react component</a:t>
+            </a:r>
+            <a:endParaRPr b="0" lang="en-US" sz="1800" spc="-1" strike="noStrike">
+              <a:latin typeface="Arial"/>
+            </a:endParaRPr>
+          </a:p>
+          <a:p>
+            <a:pPr>
+              <a:lnSpc>
+                <a:spcPct val="100000"/>
+              </a:lnSpc>
+            </a:pPr>
+            <a:r>
+              <a:rPr b="0" lang="en-US" sz="1800" spc="-1" strike="noStrike">
+                <a:solidFill>
+                  <a:srgbClr val="000000"/>
+                </a:solidFill>
+                <a:latin typeface="Arial"/>
+                <a:ea typeface="DejaVu Sans"/>
+              </a:rPr>
+              <a:t>Caching</a:t>
+            </a:r>
+            <a:endParaRPr b="0" lang="en-US" sz="1800" spc="-1" strike="noStrike">
+              <a:latin typeface="Arial"/>
+            </a:endParaRPr>
+          </a:p>
+          <a:p>
+            <a:pPr>
+              <a:lnSpc>
+                <a:spcPct val="100000"/>
+              </a:lnSpc>
+            </a:pPr>
+            <a:r>
+              <a:rPr b="0" lang="en-US" sz="1800" spc="-1" strike="noStrike">
+                <a:solidFill>
+                  <a:srgbClr val="000000"/>
+                </a:solidFill>
+                <a:latin typeface="Arial"/>
+                <a:ea typeface="DejaVu Sans"/>
+              </a:rPr>
+              <a:t>(Subscriptions)</a:t>
+            </a:r>
+            <a:endParaRPr b="0" lang="en-US" sz="1800" spc="-1" strike="noStrike">
+              <a:latin typeface="Arial"/>
+            </a:endParaRPr>
+          </a:p>
+          <a:p>
+            <a:pPr>
+              <a:lnSpc>
+                <a:spcPct val="100000"/>
+              </a:lnSpc>
+            </a:pPr>
+            <a:r>
+              <a:rPr b="0" lang="en-US" sz="1800" spc="-1" strike="noStrike">
+                <a:solidFill>
+                  <a:srgbClr val="000000"/>
+                </a:solidFill>
+                <a:latin typeface="Arial"/>
+                <a:ea typeface="DejaVu Sans"/>
+              </a:rPr>
+              <a:t>Extra external rest endpoint</a:t>
+            </a:r>
+            <a:endParaRPr b="0" lang="en-US" sz="1800" spc="-1" strike="noStrike">
+              <a:latin typeface="Arial"/>
+            </a:endParaRPr>
+          </a:p>
+        </p:txBody>
+      </p:sp>
+    </p:spTree>
+  </p:cSld>
+  <p:timing>
+    <p:tnLst>
+      <p:par>
+        <p:cTn id="25" dur="indefinite" restart="never" nodeType="tmRoot">
+          <p:childTnLst>
+            <p:seq>
+              <p:cTn id="26" dur="indefinite" nodeType="mainSeq"/>
               <p:prevCondLst>
                 <p:cond delay="0" evt="onPrev">
                   <p:tgtEl>
@@ -6166,7 +7431,7 @@
         <p:spPr>
           <a:xfrm>
             <a:off x="720000" y="288000"/>
-            <a:ext cx="6613200" cy="493200"/>
+            <a:ext cx="6612840" cy="492840"/>
           </a:xfrm>
           <a:prstGeom prst="rect">
             <a:avLst/>
@@ -6198,7 +7463,7 @@
                 <a:latin typeface="Arial"/>
                 <a:ea typeface="DejaVu Sans"/>
               </a:rPr>
-              <a:t>Graphql</a:t>
+              <a:t>The history of GraphQL</a:t>
             </a:r>
             <a:endParaRPr b="0" lang="en-US" sz="1800" spc="-1" strike="noStrike">
               <a:latin typeface="Arial"/>
@@ -6215,7 +7480,7 @@
         <p:spPr>
           <a:xfrm>
             <a:off x="4968000" y="5004000"/>
-            <a:ext cx="3229200" cy="97200"/>
+            <a:ext cx="3228840" cy="96840"/>
           </a:xfrm>
           <a:prstGeom prst="rect">
             <a:avLst/>
@@ -6264,7 +7529,7 @@
         <p:spPr>
           <a:xfrm>
             <a:off x="8280000" y="5004000"/>
-            <a:ext cx="133200" cy="97200"/>
+            <a:ext cx="132840" cy="96840"/>
           </a:xfrm>
           <a:prstGeom prst="rect">
             <a:avLst/>
@@ -6288,7 +7553,7 @@
                 <a:spcPct val="100000"/>
               </a:lnSpc>
             </a:pPr>
-            <a:fld id="{00A7E5D3-9A74-4945-ACA0-0B2D754DA504}" type="slidenum">
+            <a:fld id="{B24710EE-E61F-40D8-BA07-F241CCBC0BC8}" type="slidenum">
               <a:rPr b="0" lang="en-US" sz="600" spc="-1" strike="noStrike">
                 <a:solidFill>
                   <a:srgbClr val="ffffff"/>
@@ -6313,7 +7578,7 @@
         <p:spPr>
           <a:xfrm>
             <a:off x="602640" y="504720"/>
-            <a:ext cx="6613200" cy="3876480"/>
+            <a:ext cx="6612840" cy="3876120"/>
           </a:xfrm>
           <a:prstGeom prst="rect">
             <a:avLst/>
@@ -6353,29 +7618,6 @@
           </a:p>
         </p:txBody>
       </p:sp>
-      <p:pic>
-        <p:nvPicPr>
-          <p:cNvPr id="132" name="" descr=""/>
-          <p:cNvPicPr/>
-          <p:nvPr/>
-        </p:nvPicPr>
-        <p:blipFill>
-          <a:blip r:embed="rId1"/>
-          <a:stretch/>
-        </p:blipFill>
-        <p:spPr>
-          <a:xfrm>
-            <a:off x="1019520" y="1280160"/>
-            <a:ext cx="4009320" cy="1971000"/>
-          </a:xfrm>
-          <a:prstGeom prst="rect">
-            <a:avLst/>
-          </a:prstGeom>
-          <a:ln>
-            <a:noFill/>
-          </a:ln>
-        </p:spPr>
-      </p:pic>
     </p:spTree>
   </p:cSld>
   <p:timing>
@@ -6427,14 +7669,14 @@
       </p:grpSpPr>
       <p:sp>
         <p:nvSpPr>
-          <p:cNvPr id="133" name="CustomShape 1"/>
+          <p:cNvPr id="132" name="CustomShape 1"/>
           <p:cNvSpPr/>
           <p:nvPr/>
         </p:nvSpPr>
         <p:spPr>
           <a:xfrm>
             <a:off x="720000" y="288000"/>
-            <a:ext cx="6613200" cy="493200"/>
+            <a:ext cx="6612840" cy="492840"/>
           </a:xfrm>
           <a:prstGeom prst="rect">
             <a:avLst/>
@@ -6466,7 +7708,7 @@
                 <a:latin typeface="Arial"/>
                 <a:ea typeface="DejaVu Sans"/>
               </a:rPr>
-              <a:t>Graphql</a:t>
+              <a:t>GraphQL</a:t>
             </a:r>
             <a:endParaRPr b="0" lang="en-US" sz="1800" spc="-1" strike="noStrike">
               <a:latin typeface="Arial"/>
@@ -6476,14 +7718,14 @@
       </p:sp>
       <p:sp>
         <p:nvSpPr>
-          <p:cNvPr id="134" name="CustomShape 2"/>
+          <p:cNvPr id="133" name="CustomShape 2"/>
           <p:cNvSpPr/>
           <p:nvPr/>
         </p:nvSpPr>
         <p:spPr>
           <a:xfrm>
             <a:off x="4968000" y="5004000"/>
-            <a:ext cx="3229200" cy="97200"/>
+            <a:ext cx="3228840" cy="96840"/>
           </a:xfrm>
           <a:prstGeom prst="rect">
             <a:avLst/>
@@ -6525,14 +7767,14 @@
       </p:sp>
       <p:sp>
         <p:nvSpPr>
-          <p:cNvPr id="135" name="CustomShape 3"/>
+          <p:cNvPr id="134" name="CustomShape 3"/>
           <p:cNvSpPr/>
           <p:nvPr/>
         </p:nvSpPr>
         <p:spPr>
           <a:xfrm>
             <a:off x="8280000" y="5004000"/>
-            <a:ext cx="133200" cy="97200"/>
+            <a:ext cx="132840" cy="96840"/>
           </a:xfrm>
           <a:prstGeom prst="rect">
             <a:avLst/>
@@ -6556,7 +7798,7 @@
                 <a:spcPct val="100000"/>
               </a:lnSpc>
             </a:pPr>
-            <a:fld id="{9D5874AB-21E2-4B7F-AA21-DB1D5ED13ECD}" type="slidenum">
+            <a:fld id="{74638074-6434-46CE-827E-0EEB0BEF1E67}" type="slidenum">
               <a:rPr b="0" lang="en-US" sz="600" spc="-1" strike="noStrike">
                 <a:solidFill>
                   <a:srgbClr val="ffffff"/>
@@ -6574,14 +7816,14 @@
       </p:sp>
       <p:sp>
         <p:nvSpPr>
-          <p:cNvPr id="136" name="CustomShape 4"/>
+          <p:cNvPr id="135" name="CustomShape 4"/>
           <p:cNvSpPr/>
           <p:nvPr/>
         </p:nvSpPr>
         <p:spPr>
           <a:xfrm>
             <a:off x="602640" y="504720"/>
-            <a:ext cx="6613200" cy="3876480"/>
+            <a:ext cx="6612840" cy="3876120"/>
           </a:xfrm>
           <a:prstGeom prst="rect">
             <a:avLst/>
@@ -6621,83 +7863,29 @@
           </a:p>
         </p:txBody>
       </p:sp>
-      <p:sp>
-        <p:nvSpPr>
-          <p:cNvPr id="137" name="CustomShape 5"/>
-          <p:cNvSpPr/>
+      <p:pic>
+        <p:nvPicPr>
+          <p:cNvPr id="136" name="" descr=""/>
+          <p:cNvPicPr/>
           <p:nvPr/>
-        </p:nvSpPr>
-        <p:spPr>
-          <a:xfrm>
-            <a:off x="822960" y="1188720"/>
-            <a:ext cx="6583320" cy="857880"/>
-          </a:xfrm>
-          <a:prstGeom prst="rect">
-            <a:avLst/>
-          </a:prstGeom>
-          <a:noFill/>
+        </p:nvPicPr>
+        <p:blipFill>
+          <a:blip r:embed="rId1"/>
+          <a:stretch/>
+        </p:blipFill>
+        <p:spPr>
+          <a:xfrm>
+            <a:off x="1019520" y="1280160"/>
+            <a:ext cx="4008960" cy="1970640"/>
+          </a:xfrm>
+          <a:prstGeom prst="rect">
+            <a:avLst/>
+          </a:prstGeom>
           <a:ln>
             <a:noFill/>
           </a:ln>
         </p:spPr>
-        <p:style>
-          <a:lnRef idx="0"/>
-          <a:fillRef idx="0"/>
-          <a:effectRef idx="0"/>
-          <a:fontRef idx="minor"/>
-        </p:style>
-        <p:txBody>
-          <a:bodyPr lIns="90000" rIns="90000" tIns="45000" bIns="45000"/>
-          <a:p>
-            <a:pPr>
-              <a:lnSpc>
-                <a:spcPct val="100000"/>
-              </a:lnSpc>
-            </a:pPr>
-            <a:r>
-              <a:rPr b="0" lang="en-US" sz="1800" spc="-1" strike="noStrike">
-                <a:latin typeface="Arial"/>
-              </a:rPr>
-              <a:t>Query</a:t>
-            </a:r>
-            <a:endParaRPr b="0" lang="en-US" sz="1800" spc="-1" strike="noStrike">
-              <a:latin typeface="Arial"/>
-            </a:endParaRPr>
-          </a:p>
-          <a:p>
-            <a:pPr>
-              <a:lnSpc>
-                <a:spcPct val="100000"/>
-              </a:lnSpc>
-            </a:pPr>
-            <a:r>
-              <a:rPr b="0" lang="en-US" sz="1800" spc="-1" strike="noStrike">
-                <a:latin typeface="Arial"/>
-              </a:rPr>
-              <a:t>Mutation</a:t>
-            </a:r>
-            <a:endParaRPr b="0" lang="en-US" sz="1800" spc="-1" strike="noStrike">
-              <a:latin typeface="Arial"/>
-            </a:endParaRPr>
-          </a:p>
-          <a:p>
-            <a:pPr>
-              <a:lnSpc>
-                <a:spcPct val="100000"/>
-              </a:lnSpc>
-            </a:pPr>
-            <a:r>
-              <a:rPr b="0" lang="en-US" sz="1800" spc="-1" strike="noStrike">
-                <a:latin typeface="Arial"/>
-              </a:rPr>
-              <a:t>Subscription</a:t>
-            </a:r>
-            <a:endParaRPr b="0" lang="en-US" sz="1800" spc="-1" strike="noStrike">
-              <a:latin typeface="Arial"/>
-            </a:endParaRPr>
-          </a:p>
-        </p:txBody>
-      </p:sp>
+      </p:pic>
     </p:spTree>
   </p:cSld>
   <p:timing>
@@ -6749,14 +7937,14 @@
       </p:grpSpPr>
       <p:sp>
         <p:nvSpPr>
-          <p:cNvPr id="138" name="CustomShape 1"/>
+          <p:cNvPr id="137" name="CustomShape 1"/>
           <p:cNvSpPr/>
           <p:nvPr/>
         </p:nvSpPr>
         <p:spPr>
           <a:xfrm>
             <a:off x="720000" y="288000"/>
-            <a:ext cx="6613200" cy="493200"/>
+            <a:ext cx="6612840" cy="492840"/>
           </a:xfrm>
           <a:prstGeom prst="rect">
             <a:avLst/>
@@ -6788,7 +7976,7 @@
                 <a:latin typeface="Arial"/>
                 <a:ea typeface="DejaVu Sans"/>
               </a:rPr>
-              <a:t>Graphql</a:t>
+              <a:t>GraphQL</a:t>
             </a:r>
             <a:endParaRPr b="0" lang="en-US" sz="1800" spc="-1" strike="noStrike">
               <a:latin typeface="Arial"/>
@@ -6798,14 +7986,14 @@
       </p:sp>
       <p:sp>
         <p:nvSpPr>
-          <p:cNvPr id="139" name="CustomShape 2"/>
+          <p:cNvPr id="138" name="CustomShape 2"/>
           <p:cNvSpPr/>
           <p:nvPr/>
         </p:nvSpPr>
         <p:spPr>
           <a:xfrm>
             <a:off x="4968000" y="5004000"/>
-            <a:ext cx="3229200" cy="97200"/>
+            <a:ext cx="3228840" cy="96840"/>
           </a:xfrm>
           <a:prstGeom prst="rect">
             <a:avLst/>
@@ -6847,14 +8035,14 @@
       </p:sp>
       <p:sp>
         <p:nvSpPr>
-          <p:cNvPr id="140" name="CustomShape 3"/>
+          <p:cNvPr id="139" name="CustomShape 3"/>
           <p:cNvSpPr/>
           <p:nvPr/>
         </p:nvSpPr>
         <p:spPr>
           <a:xfrm>
             <a:off x="8280000" y="5004000"/>
-            <a:ext cx="133200" cy="97200"/>
+            <a:ext cx="132840" cy="96840"/>
           </a:xfrm>
           <a:prstGeom prst="rect">
             <a:avLst/>
@@ -6878,7 +8066,7 @@
                 <a:spcPct val="100000"/>
               </a:lnSpc>
             </a:pPr>
-            <a:fld id="{8A550C95-3849-4699-AEB1-1391BE66DC2C}" type="slidenum">
+            <a:fld id="{36B98AD0-568A-4922-BCB3-8FFE85538C1E}" type="slidenum">
               <a:rPr b="0" lang="en-US" sz="600" spc="-1" strike="noStrike">
                 <a:solidFill>
                   <a:srgbClr val="ffffff"/>
@@ -6896,14 +8084,14 @@
       </p:sp>
       <p:sp>
         <p:nvSpPr>
-          <p:cNvPr id="141" name="CustomShape 4"/>
+          <p:cNvPr id="140" name="CustomShape 4"/>
           <p:cNvSpPr/>
           <p:nvPr/>
         </p:nvSpPr>
         <p:spPr>
           <a:xfrm>
             <a:off x="602640" y="504720"/>
-            <a:ext cx="6613200" cy="3876480"/>
+            <a:ext cx="6612840" cy="3876120"/>
           </a:xfrm>
           <a:prstGeom prst="rect">
             <a:avLst/>
@@ -6945,14 +8133,14 @@
       </p:sp>
       <p:sp>
         <p:nvSpPr>
-          <p:cNvPr id="142" name="CustomShape 5"/>
+          <p:cNvPr id="141" name="CustomShape 5"/>
           <p:cNvSpPr/>
           <p:nvPr/>
         </p:nvSpPr>
         <p:spPr>
           <a:xfrm>
             <a:off x="822960" y="1188720"/>
-            <a:ext cx="6583320" cy="1113840"/>
+            <a:ext cx="6582960" cy="857520"/>
           </a:xfrm>
           <a:prstGeom prst="rect">
             <a:avLst/>
@@ -6978,9 +8166,13 @@
             </a:pPr>
             <a:r>
               <a:rPr b="0" lang="en-US" sz="1800" spc="-1" strike="noStrike">
-                <a:latin typeface="Arial"/>
-              </a:rPr>
-              <a:t>Query inputs</a:t>
+                <a:solidFill>
+                  <a:srgbClr val="000000"/>
+                </a:solidFill>
+                <a:latin typeface="Arial"/>
+                <a:ea typeface="DejaVu Sans"/>
+              </a:rPr>
+              <a:t>Query</a:t>
             </a:r>
             <a:endParaRPr b="0" lang="en-US" sz="1800" spc="-1" strike="noStrike">
               <a:latin typeface="Arial"/>
@@ -6994,9 +8186,13 @@
             </a:pPr>
             <a:r>
               <a:rPr b="0" lang="en-US" sz="1800" spc="-1" strike="noStrike">
-                <a:latin typeface="Arial"/>
-              </a:rPr>
-              <a:t>- input types</a:t>
+                <a:solidFill>
+                  <a:srgbClr val="000000"/>
+                </a:solidFill>
+                <a:latin typeface="Arial"/>
+                <a:ea typeface="DejaVu Sans"/>
+              </a:rPr>
+              <a:t>Mutation</a:t>
             </a:r>
             <a:endParaRPr b="0" lang="en-US" sz="1800" spc="-1" strike="noStrike">
               <a:latin typeface="Arial"/>
@@ -7008,28 +8204,6 @@
                 <a:spcPct val="100000"/>
               </a:lnSpc>
             </a:pPr>
-            <a:r>
-              <a:rPr b="0" lang="en-US" sz="1800" spc="-1" strike="noStrike">
-                <a:latin typeface="Arial"/>
-              </a:rPr>
-              <a:t>- automated input validation</a:t>
-            </a:r>
-            <a:endParaRPr b="0" lang="en-US" sz="1800" spc="-1" strike="noStrike">
-              <a:latin typeface="Arial"/>
-            </a:endParaRPr>
-          </a:p>
-          <a:p>
-            <a:pPr>
-              <a:lnSpc>
-                <a:spcPct val="100000"/>
-              </a:lnSpc>
-            </a:pPr>
-            <a:r>
-              <a:rPr b="0" lang="en-US" sz="1800" spc="-1" strike="noStrike">
-                <a:latin typeface="Arial"/>
-              </a:rPr>
-              <a:t>- variables for input</a:t>
-            </a:r>
             <a:endParaRPr b="0" lang="en-US" sz="1800" spc="-1" strike="noStrike">
               <a:latin typeface="Arial"/>
             </a:endParaRPr>
@@ -7087,14 +8261,14 @@
       </p:grpSpPr>
       <p:sp>
         <p:nvSpPr>
-          <p:cNvPr id="143" name="CustomShape 1"/>
+          <p:cNvPr id="142" name="CustomShape 1"/>
           <p:cNvSpPr/>
           <p:nvPr/>
         </p:nvSpPr>
         <p:spPr>
           <a:xfrm>
             <a:off x="720000" y="288000"/>
-            <a:ext cx="6613200" cy="493200"/>
+            <a:ext cx="6612840" cy="492840"/>
           </a:xfrm>
           <a:prstGeom prst="rect">
             <a:avLst/>
@@ -7126,7 +8300,7 @@
                 <a:latin typeface="Arial"/>
                 <a:ea typeface="DejaVu Sans"/>
               </a:rPr>
-              <a:t>Graphql</a:t>
+              <a:t>GraphQL</a:t>
             </a:r>
             <a:endParaRPr b="0" lang="en-US" sz="1800" spc="-1" strike="noStrike">
               <a:latin typeface="Arial"/>
@@ -7136,14 +8310,14 @@
       </p:sp>
       <p:sp>
         <p:nvSpPr>
-          <p:cNvPr id="144" name="CustomShape 2"/>
+          <p:cNvPr id="143" name="CustomShape 2"/>
           <p:cNvSpPr/>
           <p:nvPr/>
         </p:nvSpPr>
         <p:spPr>
           <a:xfrm>
             <a:off x="4968000" y="5004000"/>
-            <a:ext cx="3229200" cy="97200"/>
+            <a:ext cx="3228840" cy="96840"/>
           </a:xfrm>
           <a:prstGeom prst="rect">
             <a:avLst/>
@@ -7185,14 +8359,14 @@
       </p:sp>
       <p:sp>
         <p:nvSpPr>
-          <p:cNvPr id="145" name="CustomShape 3"/>
+          <p:cNvPr id="144" name="CustomShape 3"/>
           <p:cNvSpPr/>
           <p:nvPr/>
         </p:nvSpPr>
         <p:spPr>
           <a:xfrm>
             <a:off x="8280000" y="5004000"/>
-            <a:ext cx="133200" cy="97200"/>
+            <a:ext cx="132840" cy="96840"/>
           </a:xfrm>
           <a:prstGeom prst="rect">
             <a:avLst/>
@@ -7216,7 +8390,7 @@
                 <a:spcPct val="100000"/>
               </a:lnSpc>
             </a:pPr>
-            <a:fld id="{978A4F8A-B932-4DD4-80C7-6493BEC98BB7}" type="slidenum">
+            <a:fld id="{027D95D3-6E04-4A40-B608-0F5C2A6FD1E7}" type="slidenum">
               <a:rPr b="0" lang="en-US" sz="600" spc="-1" strike="noStrike">
                 <a:solidFill>
                   <a:srgbClr val="ffffff"/>
@@ -7234,14 +8408,14 @@
       </p:sp>
       <p:sp>
         <p:nvSpPr>
-          <p:cNvPr id="146" name="CustomShape 4"/>
+          <p:cNvPr id="145" name="CustomShape 4"/>
           <p:cNvSpPr/>
           <p:nvPr/>
         </p:nvSpPr>
         <p:spPr>
           <a:xfrm>
             <a:off x="602640" y="504720"/>
-            <a:ext cx="6613200" cy="3876480"/>
+            <a:ext cx="6612840" cy="3876120"/>
           </a:xfrm>
           <a:prstGeom prst="rect">
             <a:avLst/>
@@ -7283,14 +8457,14 @@
       </p:sp>
       <p:sp>
         <p:nvSpPr>
-          <p:cNvPr id="147" name="CustomShape 5"/>
+          <p:cNvPr id="146" name="CustomShape 5"/>
           <p:cNvSpPr/>
           <p:nvPr/>
         </p:nvSpPr>
         <p:spPr>
           <a:xfrm>
             <a:off x="822960" y="1188720"/>
-            <a:ext cx="6583320" cy="345960"/>
+            <a:ext cx="6582960" cy="857520"/>
           </a:xfrm>
           <a:prstGeom prst="rect">
             <a:avLst/>
@@ -7316,9 +8490,33 @@
             </a:pPr>
             <a:r>
               <a:rPr b="0" lang="en-US" sz="1800" spc="-1" strike="noStrike">
-                <a:latin typeface="Arial"/>
-              </a:rPr>
-              <a:t>Apollo</a:t>
+                <a:solidFill>
+                  <a:srgbClr val="000000"/>
+                </a:solidFill>
+                <a:latin typeface="Arial"/>
+                <a:ea typeface="DejaVu Sans"/>
+              </a:rPr>
+              <a:t>Schema</a:t>
+            </a:r>
+            <a:endParaRPr b="0" lang="en-US" sz="1800" spc="-1" strike="noStrike">
+              <a:latin typeface="Arial"/>
+            </a:endParaRPr>
+          </a:p>
+          <a:p>
+            <a:pPr>
+              <a:lnSpc>
+                <a:spcPct val="100000"/>
+              </a:lnSpc>
+            </a:pPr>
+            <a:r>
+              <a:rPr b="0" lang="en-US" sz="1800" spc="-1" strike="noStrike">
+                <a:solidFill>
+                  <a:srgbClr val="000000"/>
+                </a:solidFill>
+                <a:latin typeface="Arial"/>
+                <a:ea typeface="DejaVu Sans"/>
+              </a:rPr>
+              <a:t>Resolvers</a:t>
             </a:r>
             <a:endParaRPr b="0" lang="en-US" sz="1800" spc="-1" strike="noStrike">
               <a:latin typeface="Arial"/>
@@ -7377,14 +8575,14 @@
       </p:grpSpPr>
       <p:sp>
         <p:nvSpPr>
-          <p:cNvPr id="148" name="CustomShape 1"/>
+          <p:cNvPr id="147" name="CustomShape 1"/>
           <p:cNvSpPr/>
           <p:nvPr/>
         </p:nvSpPr>
         <p:spPr>
           <a:xfrm>
             <a:off x="720000" y="288000"/>
-            <a:ext cx="6613200" cy="493200"/>
+            <a:ext cx="6612840" cy="492840"/>
           </a:xfrm>
           <a:prstGeom prst="rect">
             <a:avLst/>
@@ -7416,7 +8614,7 @@
                 <a:latin typeface="Arial"/>
                 <a:ea typeface="DejaVu Sans"/>
               </a:rPr>
-              <a:t>Hands-on Time!</a:t>
+              <a:t>GraphQL</a:t>
             </a:r>
             <a:endParaRPr b="0" lang="en-US" sz="1800" spc="-1" strike="noStrike">
               <a:latin typeface="Arial"/>
@@ -7426,14 +8624,14 @@
       </p:sp>
       <p:sp>
         <p:nvSpPr>
-          <p:cNvPr id="149" name="CustomShape 2"/>
+          <p:cNvPr id="148" name="CustomShape 2"/>
           <p:cNvSpPr/>
           <p:nvPr/>
         </p:nvSpPr>
         <p:spPr>
           <a:xfrm>
-            <a:off x="1097280" y="2194560"/>
-            <a:ext cx="3647160" cy="768240"/>
+            <a:off x="4968000" y="5004000"/>
+            <a:ext cx="3228840" cy="96840"/>
           </a:xfrm>
           <a:prstGeom prst="rect">
             <a:avLst/>
@@ -7452,37 +8650,37 @@
         <p:txBody>
           <a:bodyPr lIns="0" rIns="0" tIns="0" bIns="0"/>
           <a:p>
-            <a:pPr>
-              <a:lnSpc>
-                <a:spcPct val="120000"/>
-              </a:lnSpc>
-            </a:pPr>
-            <a:r>
-              <a:rPr b="0" lang="en-US" sz="3200" spc="-1" strike="noStrike">
+            <a:pPr algn="r">
+              <a:lnSpc>
+                <a:spcPct val="100000"/>
+              </a:lnSpc>
+            </a:pPr>
+            <a:r>
+              <a:rPr b="0" lang="en-US" sz="600" spc="-1" strike="noStrike">
                 <a:solidFill>
                   <a:srgbClr val="ffffff"/>
                 </a:solidFill>
                 <a:latin typeface="Arial"/>
                 <a:ea typeface="DejaVu Sans"/>
               </a:rPr>
-              <a:t>Getting started</a:t>
-            </a:r>
-            <a:endParaRPr b="0" lang="en-US" sz="3200" spc="-1" strike="noStrike">
-              <a:latin typeface="Arial"/>
-            </a:endParaRPr>
-          </a:p>
-        </p:txBody>
-      </p:sp>
-      <p:sp>
-        <p:nvSpPr>
-          <p:cNvPr id="150" name="CustomShape 3"/>
+              <a:t>GraphQL</a:t>
+            </a:r>
+            <a:endParaRPr b="0" lang="en-US" sz="600" spc="-1" strike="noStrike">
+              <a:latin typeface="Arial"/>
+            </a:endParaRPr>
+          </a:p>
+        </p:txBody>
+      </p:sp>
+      <p:sp>
+        <p:nvSpPr>
+          <p:cNvPr id="149" name="CustomShape 3"/>
           <p:cNvSpPr/>
           <p:nvPr/>
         </p:nvSpPr>
         <p:spPr>
           <a:xfrm>
-            <a:off x="4968000" y="5004000"/>
-            <a:ext cx="3229200" cy="97200"/>
+            <a:off x="8280000" y="5004000"/>
+            <a:ext cx="132840" cy="96840"/>
           </a:xfrm>
           <a:prstGeom prst="rect">
             <a:avLst/>
@@ -7506,7 +8704,7 @@
                 <a:spcPct val="100000"/>
               </a:lnSpc>
             </a:pPr>
-            <a:r>
+            <a:fld id="{D6BBB30D-9DA2-41CA-81A4-4536DC788D46}" type="slidenum">
               <a:rPr b="0" lang="en-US" sz="600" spc="-1" strike="noStrike">
                 <a:solidFill>
                   <a:srgbClr val="ffffff"/>
@@ -7514,8 +8712,8 @@
                 <a:latin typeface="Arial"/>
                 <a:ea typeface="DejaVu Sans"/>
               </a:rPr>
-              <a:t>GraphQL</a:t>
-            </a:r>
+              <a:t>&lt;number&gt;</a:t>
+            </a:fld>
             <a:endParaRPr b="0" lang="en-US" sz="600" spc="-1" strike="noStrike">
               <a:latin typeface="Arial"/>
             </a:endParaRPr>
@@ -7524,14 +8722,14 @@
       </p:sp>
       <p:sp>
         <p:nvSpPr>
-          <p:cNvPr id="151" name="CustomShape 4"/>
+          <p:cNvPr id="150" name="CustomShape 4"/>
           <p:cNvSpPr/>
           <p:nvPr/>
         </p:nvSpPr>
         <p:spPr>
           <a:xfrm>
-            <a:off x="8280000" y="5004000"/>
-            <a:ext cx="133200" cy="97200"/>
+            <a:off x="602640" y="504720"/>
+            <a:ext cx="6612840" cy="3876120"/>
           </a:xfrm>
           <a:prstGeom prst="rect">
             <a:avLst/>
@@ -7550,63 +8748,37 @@
         <p:txBody>
           <a:bodyPr lIns="0" rIns="0" tIns="0" bIns="0"/>
           <a:p>
-            <a:pPr algn="r">
-              <a:lnSpc>
-                <a:spcPct val="100000"/>
-              </a:lnSpc>
-            </a:pPr>
-            <a:fld id="{A24FE5EF-0760-4CAB-8F43-50A757B588D8}" type="slidenum">
-              <a:rPr b="0" lang="en-US" sz="600" spc="-1" strike="noStrike">
-                <a:solidFill>
-                  <a:srgbClr val="ffffff"/>
-                </a:solidFill>
-                <a:latin typeface="Arial"/>
-                <a:ea typeface="DejaVu Sans"/>
-              </a:rPr>
-              <a:t>&lt;number&gt;</a:t>
-            </a:fld>
-            <a:endParaRPr b="0" lang="en-US" sz="600" spc="-1" strike="noStrike">
-              <a:latin typeface="Arial"/>
-            </a:endParaRPr>
-          </a:p>
-        </p:txBody>
-      </p:sp>
-      <p:pic>
-        <p:nvPicPr>
-          <p:cNvPr id="152" name="Picture Placeholder 6" descr=""/>
-          <p:cNvPicPr/>
-          <p:nvPr/>
-        </p:nvPicPr>
-        <p:blipFill>
-          <a:blip r:embed="rId1"/>
-          <a:stretch/>
-        </p:blipFill>
-        <p:spPr>
-          <a:xfrm>
-            <a:off x="6840000" y="810000"/>
-            <a:ext cx="2293200" cy="3499200"/>
-          </a:xfrm>
-          <a:prstGeom prst="rect">
-            <a:avLst/>
-          </a:prstGeom>
-          <a:ln w="9360">
-            <a:solidFill>
-              <a:schemeClr val="bg1"/>
-            </a:solidFill>
-            <a:round/>
-          </a:ln>
-        </p:spPr>
-      </p:pic>
-      <p:sp>
-        <p:nvSpPr>
-          <p:cNvPr id="153" name="CustomShape 5"/>
+            <a:pPr>
+              <a:lnSpc>
+                <a:spcPct val="120000"/>
+              </a:lnSpc>
+            </a:pPr>
+            <a:endParaRPr b="0" lang="en-US" sz="1800" spc="-1" strike="noStrike">
+              <a:latin typeface="Arial"/>
+            </a:endParaRPr>
+          </a:p>
+          <a:p>
+            <a:pPr>
+              <a:lnSpc>
+                <a:spcPct val="120000"/>
+              </a:lnSpc>
+            </a:pPr>
+            <a:endParaRPr b="0" lang="en-US" sz="1800" spc="-1" strike="noStrike">
+              <a:latin typeface="Arial"/>
+            </a:endParaRPr>
+          </a:p>
+        </p:txBody>
+      </p:sp>
+      <p:sp>
+        <p:nvSpPr>
+          <p:cNvPr id="151" name="CustomShape 5"/>
           <p:cNvSpPr/>
           <p:nvPr/>
         </p:nvSpPr>
         <p:spPr>
           <a:xfrm>
-            <a:off x="1097280" y="1422000"/>
-            <a:ext cx="3647160" cy="768240"/>
+            <a:off x="822960" y="1188720"/>
+            <a:ext cx="6582960" cy="1113480"/>
           </a:xfrm>
           <a:prstGeom prst="rect">
             <a:avLst/>
@@ -7622,6 +8794,89 @@
           <a:effectRef idx="0"/>
           <a:fontRef idx="minor"/>
         </p:style>
+        <p:txBody>
+          <a:bodyPr lIns="90000" rIns="90000" tIns="45000" bIns="45000"/>
+          <a:p>
+            <a:pPr>
+              <a:lnSpc>
+                <a:spcPct val="100000"/>
+              </a:lnSpc>
+            </a:pPr>
+            <a:r>
+              <a:rPr b="0" lang="en-US" sz="1800" spc="-1" strike="noStrike">
+                <a:solidFill>
+                  <a:srgbClr val="000000"/>
+                </a:solidFill>
+                <a:latin typeface="Arial"/>
+                <a:ea typeface="DejaVu Sans"/>
+              </a:rPr>
+              <a:t>Query inputs</a:t>
+            </a:r>
+            <a:endParaRPr b="0" lang="en-US" sz="1800" spc="-1" strike="noStrike">
+              <a:latin typeface="Arial"/>
+            </a:endParaRPr>
+          </a:p>
+          <a:p>
+            <a:pPr>
+              <a:lnSpc>
+                <a:spcPct val="100000"/>
+              </a:lnSpc>
+            </a:pPr>
+            <a:r>
+              <a:rPr b="0" lang="en-US" sz="1800" spc="-1" strike="noStrike">
+                <a:solidFill>
+                  <a:srgbClr val="000000"/>
+                </a:solidFill>
+                <a:latin typeface="Arial"/>
+                <a:ea typeface="DejaVu Sans"/>
+              </a:rPr>
+              <a:t>- input types</a:t>
+            </a:r>
+            <a:endParaRPr b="0" lang="en-US" sz="1800" spc="-1" strike="noStrike">
+              <a:latin typeface="Arial"/>
+            </a:endParaRPr>
+          </a:p>
+          <a:p>
+            <a:pPr>
+              <a:lnSpc>
+                <a:spcPct val="100000"/>
+              </a:lnSpc>
+            </a:pPr>
+            <a:r>
+              <a:rPr b="0" lang="en-US" sz="1800" spc="-1" strike="noStrike">
+                <a:solidFill>
+                  <a:srgbClr val="000000"/>
+                </a:solidFill>
+                <a:latin typeface="Arial"/>
+                <a:ea typeface="DejaVu Sans"/>
+              </a:rPr>
+              <a:t>- automated input validation</a:t>
+            </a:r>
+            <a:endParaRPr b="0" lang="en-US" sz="1800" spc="-1" strike="noStrike">
+              <a:latin typeface="Arial"/>
+            </a:endParaRPr>
+          </a:p>
+          <a:p>
+            <a:pPr>
+              <a:lnSpc>
+                <a:spcPct val="100000"/>
+              </a:lnSpc>
+            </a:pPr>
+            <a:r>
+              <a:rPr b="0" lang="en-US" sz="1800" spc="-1" strike="noStrike">
+                <a:solidFill>
+                  <a:srgbClr val="000000"/>
+                </a:solidFill>
+                <a:latin typeface="Arial"/>
+                <a:ea typeface="DejaVu Sans"/>
+              </a:rPr>
+              <a:t>- variables for input</a:t>
+            </a:r>
+            <a:endParaRPr b="0" lang="en-US" sz="1800" spc="-1" strike="noStrike">
+              <a:latin typeface="Arial"/>
+            </a:endParaRPr>
+          </a:p>
+        </p:txBody>
       </p:sp>
     </p:spTree>
   </p:cSld>
@@ -7674,14 +8929,14 @@
       </p:grpSpPr>
       <p:sp>
         <p:nvSpPr>
-          <p:cNvPr id="154" name="CustomShape 1"/>
+          <p:cNvPr id="152" name="CustomShape 1"/>
           <p:cNvSpPr/>
           <p:nvPr/>
         </p:nvSpPr>
         <p:spPr>
           <a:xfrm>
             <a:off x="720000" y="288000"/>
-            <a:ext cx="6613200" cy="493200"/>
+            <a:ext cx="6612840" cy="492840"/>
           </a:xfrm>
           <a:prstGeom prst="rect">
             <a:avLst/>
@@ -7713,7 +8968,7 @@
                 <a:latin typeface="Arial"/>
                 <a:ea typeface="DejaVu Sans"/>
               </a:rPr>
-              <a:t>Nested resolvers</a:t>
+              <a:t>GraphQL</a:t>
             </a:r>
             <a:endParaRPr b="0" lang="en-US" sz="1800" spc="-1" strike="noStrike">
               <a:latin typeface="Arial"/>
@@ -7723,14 +8978,14 @@
       </p:sp>
       <p:sp>
         <p:nvSpPr>
-          <p:cNvPr id="155" name="CustomShape 2"/>
+          <p:cNvPr id="153" name="CustomShape 2"/>
           <p:cNvSpPr/>
           <p:nvPr/>
         </p:nvSpPr>
         <p:spPr>
           <a:xfrm>
             <a:off x="4968000" y="5004000"/>
-            <a:ext cx="3229200" cy="97200"/>
+            <a:ext cx="3228840" cy="96840"/>
           </a:xfrm>
           <a:prstGeom prst="rect">
             <a:avLst/>
@@ -7772,14 +9027,14 @@
       </p:sp>
       <p:sp>
         <p:nvSpPr>
-          <p:cNvPr id="156" name="CustomShape 3"/>
+          <p:cNvPr id="154" name="CustomShape 3"/>
           <p:cNvSpPr/>
           <p:nvPr/>
         </p:nvSpPr>
         <p:spPr>
           <a:xfrm>
             <a:off x="8280000" y="5004000"/>
-            <a:ext cx="133200" cy="97200"/>
+            <a:ext cx="132840" cy="96840"/>
           </a:xfrm>
           <a:prstGeom prst="rect">
             <a:avLst/>
@@ -7803,7 +9058,7 @@
                 <a:spcPct val="100000"/>
               </a:lnSpc>
             </a:pPr>
-            <a:fld id="{931D519B-A626-4518-923C-274333E5A05A}" type="slidenum">
+            <a:fld id="{E05F5CF2-D714-43E0-891B-D9078C119151}" type="slidenum">
               <a:rPr b="0" lang="en-US" sz="600" spc="-1" strike="noStrike">
                 <a:solidFill>
                   <a:srgbClr val="ffffff"/>
@@ -7821,14 +9076,14 @@
       </p:sp>
       <p:sp>
         <p:nvSpPr>
-          <p:cNvPr id="157" name="CustomShape 4"/>
+          <p:cNvPr id="155" name="CustomShape 4"/>
           <p:cNvSpPr/>
           <p:nvPr/>
         </p:nvSpPr>
         <p:spPr>
           <a:xfrm>
             <a:off x="602640" y="504720"/>
-            <a:ext cx="6613200" cy="3876480"/>
+            <a:ext cx="6612840" cy="3876120"/>
           </a:xfrm>
           <a:prstGeom prst="rect">
             <a:avLst/>
@@ -7870,14 +9125,14 @@
       </p:sp>
       <p:sp>
         <p:nvSpPr>
-          <p:cNvPr id="158" name="CustomShape 5"/>
+          <p:cNvPr id="156" name="CustomShape 5"/>
           <p:cNvSpPr/>
           <p:nvPr/>
         </p:nvSpPr>
         <p:spPr>
           <a:xfrm>
-            <a:off x="822960" y="696600"/>
-            <a:ext cx="7131960" cy="3929400"/>
+            <a:off x="822960" y="1188720"/>
+            <a:ext cx="6582960" cy="1113480"/>
           </a:xfrm>
           <a:prstGeom prst="rect">
             <a:avLst/>
@@ -7903,130 +9158,14 @@
             </a:pPr>
             <a:r>
               <a:rPr b="0" lang="en-US" sz="1800" spc="-1" strike="noStrike">
-                <a:latin typeface="Arial"/>
-              </a:rPr>
-              <a:t>Next up is the one of great advantages of GraphQL: nested resolvers</a:t>
-            </a:r>
-            <a:endParaRPr b="0" lang="en-US" sz="1800" spc="-1" strike="noStrike">
-              <a:latin typeface="Arial"/>
-            </a:endParaRPr>
-          </a:p>
-          <a:p>
-            <a:pPr>
-              <a:lnSpc>
-                <a:spcPct val="100000"/>
-              </a:lnSpc>
-            </a:pPr>
-            <a:endParaRPr b="0" lang="en-US" sz="1800" spc="-1" strike="noStrike">
-              <a:latin typeface="Arial"/>
-            </a:endParaRPr>
-          </a:p>
-          <a:p>
-            <a:pPr>
-              <a:lnSpc>
-                <a:spcPct val="100000"/>
-              </a:lnSpc>
-            </a:pPr>
-            <a:r>
-              <a:rPr b="0" lang="en-US" sz="1800" spc="-1" strike="noStrike">
-                <a:latin typeface="Arial"/>
-              </a:rPr>
-              <a:t>Create a practicesPeopleResolver function under your practicesResolver. This async function accepts a practice and returns the people who are member of this practice by doing</a:t>
-            </a:r>
-            <a:endParaRPr b="0" lang="en-US" sz="1800" spc="-1" strike="noStrike">
-              <a:latin typeface="Arial"/>
-            </a:endParaRPr>
-          </a:p>
-          <a:p>
-            <a:pPr>
-              <a:lnSpc>
-                <a:spcPct val="100000"/>
-              </a:lnSpc>
-            </a:pPr>
-            <a:r>
-              <a:rPr b="0" lang="en-US" sz="1800" spc="-1" strike="noStrike">
-                <a:latin typeface="Arial"/>
-              </a:rPr>
-              <a:t>` const fetched = await Practice.findByPk(practice.id, { include: [{ model: Person }] });`. Practice can be found on db.practice.</a:t>
-            </a:r>
-            <a:endParaRPr b="0" lang="en-US" sz="1800" spc="-1" strike="noStrike">
-              <a:latin typeface="Arial"/>
-            </a:endParaRPr>
-          </a:p>
-          <a:p>
-            <a:pPr>
-              <a:lnSpc>
-                <a:spcPct val="100000"/>
-              </a:lnSpc>
-            </a:pPr>
-            <a:endParaRPr b="0" lang="en-US" sz="1800" spc="-1" strike="noStrike">
-              <a:latin typeface="Arial"/>
-            </a:endParaRPr>
-          </a:p>
-          <a:p>
-            <a:pPr>
-              <a:lnSpc>
-                <a:spcPct val="100000"/>
-              </a:lnSpc>
-            </a:pPr>
-            <a:r>
-              <a:rPr b="0" lang="en-US" sz="1800" spc="-1" strike="noStrike">
-                <a:latin typeface="Arial"/>
-              </a:rPr>
-              <a:t>In your resolvers, add an attribute with key `Practice` under query. This key should have the value {people: practicesPeopleResolver }.</a:t>
-            </a:r>
-            <a:endParaRPr b="0" lang="en-US" sz="1800" spc="-1" strike="noStrike">
-              <a:latin typeface="Arial"/>
-            </a:endParaRPr>
-          </a:p>
-          <a:p>
-            <a:pPr>
-              <a:lnSpc>
-                <a:spcPct val="100000"/>
-              </a:lnSpc>
-            </a:pPr>
-            <a:endParaRPr b="0" lang="en-US" sz="1800" spc="-1" strike="noStrike">
-              <a:latin typeface="Arial"/>
-            </a:endParaRPr>
-          </a:p>
-          <a:p>
-            <a:pPr>
-              <a:lnSpc>
-                <a:spcPct val="100000"/>
-              </a:lnSpc>
-            </a:pPr>
-            <a:r>
-              <a:rPr b="0" lang="en-US" sz="1800" spc="-1" strike="noStrike">
-                <a:latin typeface="Arial"/>
-              </a:rPr>
-              <a:t>Go to the webpage and try requesting practices with nested people!</a:t>
-            </a:r>
-            <a:endParaRPr b="0" lang="en-US" sz="1800" spc="-1" strike="noStrike">
-              <a:latin typeface="Arial"/>
-            </a:endParaRPr>
-          </a:p>
-          <a:p>
-            <a:pPr>
-              <a:lnSpc>
-                <a:spcPct val="100000"/>
-              </a:lnSpc>
-            </a:pPr>
-            <a:r>
-              <a:rPr b="0" lang="en-US" sz="1800" spc="-1" strike="noStrike">
-                <a:latin typeface="Arial"/>
-              </a:rPr>
-              <a:t>Then implement a nested resolver for projects under practices.</a:t>
-            </a:r>
-            <a:endParaRPr b="0" lang="en-US" sz="1800" spc="-1" strike="noStrike">
-              <a:latin typeface="Arial"/>
-            </a:endParaRPr>
-          </a:p>
-          <a:p>
-            <a:pPr>
-              <a:lnSpc>
-                <a:spcPct val="100000"/>
-              </a:lnSpc>
-            </a:pPr>
+                <a:solidFill>
+                  <a:srgbClr val="000000"/>
+                </a:solidFill>
+                <a:latin typeface="Arial"/>
+                <a:ea typeface="DejaVu Sans"/>
+              </a:rPr>
+              <a:t>Security (authentication / authorization)</a:t>
+            </a:r>
             <a:endParaRPr b="0" lang="en-US" sz="1800" spc="-1" strike="noStrike">
               <a:latin typeface="Arial"/>
             </a:endParaRPr>
@@ -8084,14 +9223,14 @@
       </p:grpSpPr>
       <p:sp>
         <p:nvSpPr>
-          <p:cNvPr id="159" name="CustomShape 1"/>
+          <p:cNvPr id="157" name="CustomShape 1"/>
           <p:cNvSpPr/>
           <p:nvPr/>
         </p:nvSpPr>
         <p:spPr>
           <a:xfrm>
             <a:off x="720000" y="288000"/>
-            <a:ext cx="6613200" cy="493200"/>
+            <a:ext cx="6612840" cy="492840"/>
           </a:xfrm>
           <a:prstGeom prst="rect">
             <a:avLst/>
@@ -8123,7 +9262,7 @@
                 <a:latin typeface="Arial"/>
                 <a:ea typeface="DejaVu Sans"/>
               </a:rPr>
-              <a:t>To the front-end!</a:t>
+              <a:t>GraphQL</a:t>
             </a:r>
             <a:endParaRPr b="0" lang="en-US" sz="1800" spc="-1" strike="noStrike">
               <a:latin typeface="Arial"/>
@@ -8133,14 +9272,14 @@
       </p:sp>
       <p:sp>
         <p:nvSpPr>
-          <p:cNvPr id="160" name="CustomShape 2"/>
+          <p:cNvPr id="158" name="CustomShape 2"/>
           <p:cNvSpPr/>
           <p:nvPr/>
         </p:nvSpPr>
         <p:spPr>
           <a:xfrm>
             <a:off x="4968000" y="5004000"/>
-            <a:ext cx="3229200" cy="97200"/>
+            <a:ext cx="3228840" cy="96840"/>
           </a:xfrm>
           <a:prstGeom prst="rect">
             <a:avLst/>
@@ -8182,14 +9321,14 @@
       </p:sp>
       <p:sp>
         <p:nvSpPr>
-          <p:cNvPr id="161" name="CustomShape 3"/>
+          <p:cNvPr id="159" name="CustomShape 3"/>
           <p:cNvSpPr/>
           <p:nvPr/>
         </p:nvSpPr>
         <p:spPr>
           <a:xfrm>
             <a:off x="8280000" y="5004000"/>
-            <a:ext cx="133200" cy="97200"/>
+            <a:ext cx="132840" cy="96840"/>
           </a:xfrm>
           <a:prstGeom prst="rect">
             <a:avLst/>
@@ -8213,7 +9352,7 @@
                 <a:spcPct val="100000"/>
               </a:lnSpc>
             </a:pPr>
-            <a:fld id="{FFF56C31-44B1-45DB-9E32-B8A72634193E}" type="slidenum">
+            <a:fld id="{D92E3597-5998-4038-9FC0-EB6B9D9A1F51}" type="slidenum">
               <a:rPr b="0" lang="en-US" sz="600" spc="-1" strike="noStrike">
                 <a:solidFill>
                   <a:srgbClr val="ffffff"/>
@@ -8231,14 +9370,14 @@
       </p:sp>
       <p:sp>
         <p:nvSpPr>
-          <p:cNvPr id="162" name="CustomShape 4"/>
+          <p:cNvPr id="160" name="CustomShape 4"/>
           <p:cNvSpPr/>
           <p:nvPr/>
         </p:nvSpPr>
         <p:spPr>
           <a:xfrm>
             <a:off x="602640" y="504720"/>
-            <a:ext cx="6613200" cy="3876480"/>
+            <a:ext cx="6612840" cy="3876120"/>
           </a:xfrm>
           <a:prstGeom prst="rect">
             <a:avLst/>
@@ -8280,14 +9419,14 @@
       </p:sp>
       <p:sp>
         <p:nvSpPr>
-          <p:cNvPr id="163" name="CustomShape 5"/>
+          <p:cNvPr id="161" name="CustomShape 5"/>
           <p:cNvSpPr/>
           <p:nvPr/>
         </p:nvSpPr>
         <p:spPr>
           <a:xfrm>
-            <a:off x="822960" y="696600"/>
-            <a:ext cx="7131960" cy="3929400"/>
+            <a:off x="822960" y="1188720"/>
+            <a:ext cx="6582960" cy="345600"/>
           </a:xfrm>
           <a:prstGeom prst="rect">
             <a:avLst/>
@@ -8313,9 +9452,13 @@
             </a:pPr>
             <a:r>
               <a:rPr b="0" lang="en-US" sz="1800" spc="-1" strike="noStrike">
-                <a:latin typeface="Arial"/>
-              </a:rPr>
-              <a:t>In fetch.js add </a:t>
+                <a:solidFill>
+                  <a:srgbClr val="000000"/>
+                </a:solidFill>
+                <a:latin typeface="Arial"/>
+                <a:ea typeface="DejaVu Sans"/>
+              </a:rPr>
+              <a:t>Apollo</a:t>
             </a:r>
             <a:endParaRPr b="0" lang="en-US" sz="1800" spc="-1" strike="noStrike">
               <a:latin typeface="Arial"/>
@@ -8329,9 +9472,13 @@
             </a:pPr>
             <a:r>
               <a:rPr b="0" lang="en-US" sz="1800" spc="-1" strike="noStrike">
-                <a:latin typeface="Arial"/>
-              </a:rPr>
-              <a:t>`const graphqlClient = new ApolloClient({</a:t>
+                <a:solidFill>
+                  <a:srgbClr val="000000"/>
+                </a:solidFill>
+                <a:latin typeface="Arial"/>
+                <a:ea typeface="DejaVu Sans"/>
+              </a:rPr>
+              <a:t>- caching</a:t>
             </a:r>
             <a:endParaRPr b="0" lang="en-US" sz="1800" spc="-1" strike="noStrike">
               <a:latin typeface="Arial"/>
@@ -8345,15 +9492,43 @@
             </a:pPr>
             <a:r>
               <a:rPr b="0" lang="en-US" sz="1800" spc="-1" strike="noStrike">
-                <a:latin typeface="Arial"/>
-              </a:rPr>
-              <a:t>  </a:t>
-            </a:r>
+                <a:solidFill>
+                  <a:srgbClr val="000000"/>
+                </a:solidFill>
+                <a:latin typeface="Arial"/>
+                <a:ea typeface="DejaVu Sans"/>
+              </a:rPr>
+              <a:t>- subscriptions</a:t>
+            </a:r>
+            <a:endParaRPr b="0" lang="en-US" sz="1800" spc="-1" strike="noStrike">
+              <a:latin typeface="Arial"/>
+            </a:endParaRPr>
+          </a:p>
+          <a:p>
+            <a:pPr>
+              <a:lnSpc>
+                <a:spcPct val="100000"/>
+              </a:lnSpc>
+            </a:pPr>
+            <a:endParaRPr b="0" lang="en-US" sz="1800" spc="-1" strike="noStrike">
+              <a:latin typeface="Arial"/>
+            </a:endParaRPr>
+          </a:p>
+          <a:p>
+            <a:pPr>
+              <a:lnSpc>
+                <a:spcPct val="100000"/>
+              </a:lnSpc>
+            </a:pPr>
             <a:r>
               <a:rPr b="0" lang="en-US" sz="1800" spc="-1" strike="noStrike">
-                <a:latin typeface="Arial"/>
-              </a:rPr>
-              <a:t>link: new HttpLink({ uri: "http://localhost:3030/api/graphql" }),</a:t>
+                <a:solidFill>
+                  <a:srgbClr val="000000"/>
+                </a:solidFill>
+                <a:latin typeface="Arial"/>
+                <a:ea typeface="DejaVu Sans"/>
+              </a:rPr>
+              <a:t>Spring GraphQL</a:t>
             </a:r>
             <a:endParaRPr b="0" lang="en-US" sz="1800" spc="-1" strike="noStrike">
               <a:latin typeface="Arial"/>
@@ -8367,192 +9542,14 @@
             </a:pPr>
             <a:r>
               <a:rPr b="0" lang="en-US" sz="1800" spc="-1" strike="noStrike">
-                <a:latin typeface="Arial"/>
-              </a:rPr>
-              <a:t>  </a:t>
-            </a:r>
-            <a:r>
-              <a:rPr b="0" lang="en-US" sz="1800" spc="-1" strike="noStrike">
-                <a:latin typeface="Arial"/>
-              </a:rPr>
-              <a:t>cache: new InMemoryCache()</a:t>
-            </a:r>
-            <a:endParaRPr b="0" lang="en-US" sz="1800" spc="-1" strike="noStrike">
-              <a:latin typeface="Arial"/>
-            </a:endParaRPr>
-          </a:p>
-          <a:p>
-            <a:pPr>
-              <a:lnSpc>
-                <a:spcPct val="100000"/>
-              </a:lnSpc>
-            </a:pPr>
-            <a:r>
-              <a:rPr b="0" lang="en-US" sz="1800" spc="-1" strike="noStrike">
-                <a:latin typeface="Arial"/>
-              </a:rPr>
-              <a:t>});`</a:t>
-            </a:r>
-            <a:endParaRPr b="0" lang="en-US" sz="1800" spc="-1" strike="noStrike">
-              <a:latin typeface="Arial"/>
-            </a:endParaRPr>
-          </a:p>
-          <a:p>
-            <a:pPr>
-              <a:lnSpc>
-                <a:spcPct val="100000"/>
-              </a:lnSpc>
-            </a:pPr>
-            <a:endParaRPr b="0" lang="en-US" sz="1800" spc="-1" strike="noStrike">
-              <a:latin typeface="Arial"/>
-            </a:endParaRPr>
-          </a:p>
-          <a:p>
-            <a:pPr>
-              <a:lnSpc>
-                <a:spcPct val="100000"/>
-              </a:lnSpc>
-            </a:pPr>
-            <a:r>
-              <a:rPr b="0" lang="en-US" sz="1800" spc="-1" strike="noStrike">
-                <a:latin typeface="Arial"/>
-              </a:rPr>
-              <a:t>Provide in App.js:</a:t>
-            </a:r>
-            <a:br/>
-            <a:r>
-              <a:rPr b="0" lang="en-US" sz="1800" spc="-1" strike="noStrike">
-                <a:latin typeface="Arial"/>
-              </a:rPr>
-              <a:t>```</a:t>
-            </a:r>
-            <a:endParaRPr b="0" lang="en-US" sz="1800" spc="-1" strike="noStrike">
-              <a:latin typeface="Arial"/>
-            </a:endParaRPr>
-          </a:p>
-          <a:p>
-            <a:pPr>
-              <a:lnSpc>
-                <a:spcPct val="100000"/>
-              </a:lnSpc>
-            </a:pPr>
-            <a:r>
-              <a:rPr b="0" lang="en-US" sz="1800" spc="-1" strike="noStrike">
-                <a:latin typeface="Arial"/>
-              </a:rPr>
-              <a:t>   </a:t>
-            </a:r>
-            <a:r>
-              <a:rPr b="0" lang="en-US" sz="1800" spc="-1" strike="noStrike">
-                <a:latin typeface="Arial"/>
-              </a:rPr>
-              <a:t>&lt;ApolloProvider client={graphqlClient}&gt;</a:t>
-            </a:r>
-            <a:endParaRPr b="0" lang="en-US" sz="1800" spc="-1" strike="noStrike">
-              <a:latin typeface="Arial"/>
-            </a:endParaRPr>
-          </a:p>
-          <a:p>
-            <a:pPr>
-              <a:lnSpc>
-                <a:spcPct val="100000"/>
-              </a:lnSpc>
-            </a:pPr>
-            <a:r>
-              <a:rPr b="0" lang="en-US" sz="1800" spc="-1" strike="noStrike">
-                <a:latin typeface="Arial"/>
-              </a:rPr>
-              <a:t>        </a:t>
-            </a:r>
-            <a:r>
-              <a:rPr b="0" lang="en-US" sz="1800" spc="-1" strike="noStrike">
-                <a:latin typeface="Arial"/>
-              </a:rPr>
-              <a:t>&lt;Router history={browserHistory}&gt;</a:t>
-            </a:r>
-            <a:endParaRPr b="0" lang="en-US" sz="1800" spc="-1" strike="noStrike">
-              <a:latin typeface="Arial"/>
-            </a:endParaRPr>
-          </a:p>
-          <a:p>
-            <a:pPr>
-              <a:lnSpc>
-                <a:spcPct val="100000"/>
-              </a:lnSpc>
-            </a:pPr>
-            <a:r>
-              <a:rPr b="0" lang="en-US" sz="1800" spc="-1" strike="noStrike">
-                <a:latin typeface="Arial"/>
-              </a:rPr>
-              <a:t>          </a:t>
-            </a:r>
-            <a:r>
-              <a:rPr b="0" lang="en-US" sz="1800" spc="-1" strike="noStrike">
-                <a:latin typeface="Arial"/>
-              </a:rPr>
-              <a:t>&lt;Frame /&gt;</a:t>
-            </a:r>
-            <a:endParaRPr b="0" lang="en-US" sz="1800" spc="-1" strike="noStrike">
-              <a:latin typeface="Arial"/>
-            </a:endParaRPr>
-          </a:p>
-          <a:p>
-            <a:pPr>
-              <a:lnSpc>
-                <a:spcPct val="100000"/>
-              </a:lnSpc>
-            </a:pPr>
-            <a:r>
-              <a:rPr b="0" lang="en-US" sz="1800" spc="-1" strike="noStrike">
-                <a:latin typeface="Arial"/>
-              </a:rPr>
-              <a:t>        </a:t>
-            </a:r>
-            <a:r>
-              <a:rPr b="0" lang="en-US" sz="1800" spc="-1" strike="noStrike">
-                <a:latin typeface="Arial"/>
-              </a:rPr>
-              <a:t>&lt;/Router&gt;</a:t>
-            </a:r>
-            <a:endParaRPr b="0" lang="en-US" sz="1800" spc="-1" strike="noStrike">
-              <a:latin typeface="Arial"/>
-            </a:endParaRPr>
-          </a:p>
-          <a:p>
-            <a:pPr>
-              <a:lnSpc>
-                <a:spcPct val="100000"/>
-              </a:lnSpc>
-            </a:pPr>
-            <a:r>
-              <a:rPr b="0" lang="en-US" sz="1800" spc="-1" strike="noStrike">
-                <a:latin typeface="Arial"/>
-              </a:rPr>
-              <a:t>      </a:t>
-            </a:r>
-            <a:r>
-              <a:rPr b="0" lang="en-US" sz="1800" spc="-1" strike="noStrike">
-                <a:latin typeface="Arial"/>
-              </a:rPr>
-              <a:t>&lt;/ApolloProvider&gt;</a:t>
-            </a:r>
-            <a:br/>
-            <a:r>
-              <a:rPr b="0" lang="en-US" sz="1800" spc="-1" strike="noStrike">
-                <a:latin typeface="Arial"/>
-              </a:rPr>
-              <a:t>```</a:t>
-            </a:r>
-            <a:endParaRPr b="0" lang="en-US" sz="1800" spc="-1" strike="noStrike">
-              <a:latin typeface="Arial"/>
-            </a:endParaRPr>
-          </a:p>
-          <a:p>
-            <a:pPr>
-              <a:lnSpc>
-                <a:spcPct val="100000"/>
-              </a:lnSpc>
-            </a:pPr>
+                <a:solidFill>
+                  <a:srgbClr val="000000"/>
+                </a:solidFill>
+                <a:latin typeface="Arial"/>
+                <a:ea typeface="DejaVu Sans"/>
+              </a:rPr>
+              <a:t>- ?</a:t>
+            </a:r>
             <a:endParaRPr b="0" lang="en-US" sz="1800" spc="-1" strike="noStrike">
               <a:latin typeface="Arial"/>
             </a:endParaRPr>
@@ -8610,14 +9607,14 @@
       </p:grpSpPr>
       <p:sp>
         <p:nvSpPr>
-          <p:cNvPr id="164" name="CustomShape 1"/>
+          <p:cNvPr id="162" name="CustomShape 1"/>
           <p:cNvSpPr/>
           <p:nvPr/>
         </p:nvSpPr>
         <p:spPr>
           <a:xfrm>
             <a:off x="720000" y="288000"/>
-            <a:ext cx="6613200" cy="493200"/>
+            <a:ext cx="6612840" cy="492840"/>
           </a:xfrm>
           <a:prstGeom prst="rect">
             <a:avLst/>
@@ -8649,7 +9646,7 @@
                 <a:latin typeface="Arial"/>
                 <a:ea typeface="DejaVu Sans"/>
               </a:rPr>
-              <a:t>To the front-end!</a:t>
+              <a:t>Hands-on Time!</a:t>
             </a:r>
             <a:endParaRPr b="0" lang="en-US" sz="1800" spc="-1" strike="noStrike">
               <a:latin typeface="Arial"/>
@@ -8659,14 +9656,14 @@
       </p:sp>
       <p:sp>
         <p:nvSpPr>
-          <p:cNvPr id="165" name="CustomShape 2"/>
+          <p:cNvPr id="163" name="CustomShape 2"/>
           <p:cNvSpPr/>
           <p:nvPr/>
         </p:nvSpPr>
         <p:spPr>
           <a:xfrm>
-            <a:off x="4968000" y="5004000"/>
-            <a:ext cx="3229200" cy="97200"/>
+            <a:off x="1097280" y="2194560"/>
+            <a:ext cx="3646800" cy="767880"/>
           </a:xfrm>
           <a:prstGeom prst="rect">
             <a:avLst/>
@@ -8685,37 +9682,37 @@
         <p:txBody>
           <a:bodyPr lIns="0" rIns="0" tIns="0" bIns="0"/>
           <a:p>
-            <a:pPr algn="r">
-              <a:lnSpc>
-                <a:spcPct val="100000"/>
-              </a:lnSpc>
-            </a:pPr>
-            <a:r>
-              <a:rPr b="0" lang="en-US" sz="600" spc="-1" strike="noStrike">
+            <a:pPr>
+              <a:lnSpc>
+                <a:spcPct val="120000"/>
+              </a:lnSpc>
+            </a:pPr>
+            <a:r>
+              <a:rPr b="0" lang="en-US" sz="3200" spc="-1" strike="noStrike">
                 <a:solidFill>
                   <a:srgbClr val="ffffff"/>
                 </a:solidFill>
                 <a:latin typeface="Arial"/>
                 <a:ea typeface="DejaVu Sans"/>
               </a:rPr>
-              <a:t>GraphQL</a:t>
-            </a:r>
-            <a:endParaRPr b="0" lang="en-US" sz="600" spc="-1" strike="noStrike">
-              <a:latin typeface="Arial"/>
-            </a:endParaRPr>
-          </a:p>
-        </p:txBody>
-      </p:sp>
-      <p:sp>
-        <p:nvSpPr>
-          <p:cNvPr id="166" name="CustomShape 3"/>
+              <a:t>Getting started</a:t>
+            </a:r>
+            <a:endParaRPr b="0" lang="en-US" sz="3200" spc="-1" strike="noStrike">
+              <a:latin typeface="Arial"/>
+            </a:endParaRPr>
+          </a:p>
+        </p:txBody>
+      </p:sp>
+      <p:sp>
+        <p:nvSpPr>
+          <p:cNvPr id="164" name="CustomShape 3"/>
           <p:cNvSpPr/>
           <p:nvPr/>
         </p:nvSpPr>
         <p:spPr>
           <a:xfrm>
-            <a:off x="8280000" y="5004000"/>
-            <a:ext cx="133200" cy="97200"/>
+            <a:off x="4968000" y="5004000"/>
+            <a:ext cx="3228840" cy="96840"/>
           </a:xfrm>
           <a:prstGeom prst="rect">
             <a:avLst/>
@@ -8739,7 +9736,7 @@
                 <a:spcPct val="100000"/>
               </a:lnSpc>
             </a:pPr>
-            <a:fld id="{537A1A28-72B6-43F6-8254-CE3EB0BA9A1C}" type="slidenum">
+            <a:r>
               <a:rPr b="0" lang="en-US" sz="600" spc="-1" strike="noStrike">
                 <a:solidFill>
                   <a:srgbClr val="ffffff"/>
@@ -8747,8 +9744,8 @@
                 <a:latin typeface="Arial"/>
                 <a:ea typeface="DejaVu Sans"/>
               </a:rPr>
-              <a:t>&lt;number&gt;</a:t>
-            </a:fld>
+              <a:t>GraphQL</a:t>
+            </a:r>
             <a:endParaRPr b="0" lang="en-US" sz="600" spc="-1" strike="noStrike">
               <a:latin typeface="Arial"/>
             </a:endParaRPr>
@@ -8757,14 +9754,14 @@
       </p:sp>
       <p:sp>
         <p:nvSpPr>
-          <p:cNvPr id="167" name="CustomShape 4"/>
+          <p:cNvPr id="165" name="CustomShape 4"/>
           <p:cNvSpPr/>
           <p:nvPr/>
         </p:nvSpPr>
         <p:spPr>
           <a:xfrm>
-            <a:off x="602640" y="504720"/>
-            <a:ext cx="6613200" cy="3876480"/>
+            <a:off x="8280000" y="5004000"/>
+            <a:ext cx="132840" cy="96840"/>
           </a:xfrm>
           <a:prstGeom prst="rect">
             <a:avLst/>
@@ -8783,37 +9780,63 @@
         <p:txBody>
           <a:bodyPr lIns="0" rIns="0" tIns="0" bIns="0"/>
           <a:p>
-            <a:pPr>
-              <a:lnSpc>
-                <a:spcPct val="120000"/>
-              </a:lnSpc>
-            </a:pPr>
-            <a:endParaRPr b="0" lang="en-US" sz="1800" spc="-1" strike="noStrike">
-              <a:latin typeface="Arial"/>
-            </a:endParaRPr>
-          </a:p>
-          <a:p>
-            <a:pPr>
-              <a:lnSpc>
-                <a:spcPct val="120000"/>
-              </a:lnSpc>
-            </a:pPr>
-            <a:endParaRPr b="0" lang="en-US" sz="1800" spc="-1" strike="noStrike">
-              <a:latin typeface="Arial"/>
-            </a:endParaRPr>
-          </a:p>
-        </p:txBody>
-      </p:sp>
-      <p:sp>
-        <p:nvSpPr>
-          <p:cNvPr id="168" name="CustomShape 5"/>
+            <a:pPr algn="r">
+              <a:lnSpc>
+                <a:spcPct val="100000"/>
+              </a:lnSpc>
+            </a:pPr>
+            <a:fld id="{EA11D9E8-EDD1-4C5F-A5FB-91C87DF4C0F6}" type="slidenum">
+              <a:rPr b="0" lang="en-US" sz="600" spc="-1" strike="noStrike">
+                <a:solidFill>
+                  <a:srgbClr val="ffffff"/>
+                </a:solidFill>
+                <a:latin typeface="Arial"/>
+                <a:ea typeface="DejaVu Sans"/>
+              </a:rPr>
+              <a:t>&lt;number&gt;</a:t>
+            </a:fld>
+            <a:endParaRPr b="0" lang="en-US" sz="600" spc="-1" strike="noStrike">
+              <a:latin typeface="Arial"/>
+            </a:endParaRPr>
+          </a:p>
+        </p:txBody>
+      </p:sp>
+      <p:pic>
+        <p:nvPicPr>
+          <p:cNvPr id="166" name="Picture Placeholder 6" descr=""/>
+          <p:cNvPicPr/>
+          <p:nvPr/>
+        </p:nvPicPr>
+        <p:blipFill>
+          <a:blip r:embed="rId1"/>
+          <a:stretch/>
+        </p:blipFill>
+        <p:spPr>
+          <a:xfrm>
+            <a:off x="6840000" y="810000"/>
+            <a:ext cx="2292840" cy="3498840"/>
+          </a:xfrm>
+          <a:prstGeom prst="rect">
+            <a:avLst/>
+          </a:prstGeom>
+          <a:ln w="9360">
+            <a:solidFill>
+              <a:schemeClr val="bg1"/>
+            </a:solidFill>
+            <a:round/>
+          </a:ln>
+        </p:spPr>
+      </p:pic>
+      <p:sp>
+        <p:nvSpPr>
+          <p:cNvPr id="167" name="CustomShape 5"/>
           <p:cNvSpPr/>
           <p:nvPr/>
         </p:nvSpPr>
         <p:spPr>
           <a:xfrm>
-            <a:off x="822960" y="696600"/>
-            <a:ext cx="7131960" cy="3980520"/>
+            <a:off x="1097280" y="1422000"/>
+            <a:ext cx="3646800" cy="767880"/>
           </a:xfrm>
           <a:prstGeom prst="rect">
             <a:avLst/>
@@ -8829,240 +9852,6 @@
           <a:effectRef idx="0"/>
           <a:fontRef idx="minor"/>
         </p:style>
-        <p:txBody>
-          <a:bodyPr lIns="90000" rIns="90000" tIns="45000" bIns="45000"/>
-          <a:p>
-            <a:pPr>
-              <a:lnSpc>
-                <a:spcPct val="100000"/>
-              </a:lnSpc>
-            </a:pPr>
-            <a:r>
-              <a:rPr b="0" lang="en-US" sz="1800" spc="-1" strike="noStrike">
-                <a:latin typeface="Arial"/>
-              </a:rPr>
-              <a:t>Implement the &lt;Query /&gt; component from react-apollo in the practices component.</a:t>
-            </a:r>
-            <a:endParaRPr b="0" lang="en-US" sz="1800" spc="-1" strike="noStrike">
-              <a:latin typeface="Arial"/>
-            </a:endParaRPr>
-          </a:p>
-          <a:p>
-            <a:pPr>
-              <a:lnSpc>
-                <a:spcPct val="100000"/>
-              </a:lnSpc>
-            </a:pPr>
-            <a:endParaRPr b="0" lang="en-US" sz="1800" spc="-1" strike="noStrike">
-              <a:latin typeface="Arial"/>
-            </a:endParaRPr>
-          </a:p>
-          <a:p>
-            <a:pPr>
-              <a:lnSpc>
-                <a:spcPct val="100000"/>
-              </a:lnSpc>
-            </a:pPr>
-            <a:r>
-              <a:rPr b="0" lang="en-US" sz="1800" spc="-1" strike="noStrike">
-                <a:latin typeface="Arial"/>
-              </a:rPr>
-              <a:t>As Child, this component accepts a function:</a:t>
-            </a:r>
-            <a:endParaRPr b="0" lang="en-US" sz="1800" spc="-1" strike="noStrike">
-              <a:latin typeface="Arial"/>
-            </a:endParaRPr>
-          </a:p>
-          <a:p>
-            <a:pPr>
-              <a:lnSpc>
-                <a:spcPct val="100000"/>
-              </a:lnSpc>
-            </a:pPr>
-            <a:r>
-              <a:rPr b="0" lang="en-US" sz="1800" spc="-1" strike="noStrike">
-                <a:latin typeface="Arial"/>
-              </a:rPr>
-              <a:t>`&lt;Query query={query}&gt;{({loading, error, data}) =&gt; { … }}`</a:t>
-            </a:r>
-            <a:endParaRPr b="0" lang="en-US" sz="1800" spc="-1" strike="noStrike">
-              <a:latin typeface="Arial"/>
-            </a:endParaRPr>
-          </a:p>
-          <a:p>
-            <a:pPr>
-              <a:lnSpc>
-                <a:spcPct val="100000"/>
-              </a:lnSpc>
-            </a:pPr>
-            <a:endParaRPr b="0" lang="en-US" sz="1800" spc="-1" strike="noStrike">
-              <a:latin typeface="Arial"/>
-            </a:endParaRPr>
-          </a:p>
-          <a:p>
-            <a:pPr>
-              <a:lnSpc>
-                <a:spcPct val="100000"/>
-              </a:lnSpc>
-            </a:pPr>
-            <a:r>
-              <a:rPr b="0" lang="en-US" sz="1800" spc="-1" strike="noStrike">
-                <a:latin typeface="Arial"/>
-              </a:rPr>
-              <a:t>Define the query under the component Class by using gql from the package graphql-tag:</a:t>
-            </a:r>
-            <a:endParaRPr b="0" lang="en-US" sz="1800" spc="-1" strike="noStrike">
-              <a:latin typeface="Arial"/>
-            </a:endParaRPr>
-          </a:p>
-          <a:p>
-            <a:pPr>
-              <a:lnSpc>
-                <a:spcPct val="100000"/>
-              </a:lnSpc>
-            </a:pPr>
-            <a:endParaRPr b="0" lang="en-US" sz="1800" spc="-1" strike="noStrike">
-              <a:latin typeface="Arial"/>
-            </a:endParaRPr>
-          </a:p>
-          <a:p>
-            <a:pPr>
-              <a:lnSpc>
-                <a:spcPct val="100000"/>
-              </a:lnSpc>
-            </a:pPr>
-            <a:r>
-              <a:rPr b="0" lang="en-US" sz="1400" spc="-1" strike="noStrike">
-                <a:latin typeface="Arial"/>
-              </a:rPr>
-              <a:t>```</a:t>
-            </a:r>
-            <a:br/>
-            <a:r>
-              <a:rPr b="0" lang="en-US" sz="1400" spc="-1" strike="noStrike">
-                <a:latin typeface="Arial"/>
-              </a:rPr>
-              <a:t>const query = gql`{</a:t>
-            </a:r>
-            <a:endParaRPr b="0" lang="en-US" sz="1400" spc="-1" strike="noStrike">
-              <a:latin typeface="Arial"/>
-            </a:endParaRPr>
-          </a:p>
-          <a:p>
-            <a:pPr>
-              <a:lnSpc>
-                <a:spcPct val="100000"/>
-              </a:lnSpc>
-            </a:pPr>
-            <a:r>
-              <a:rPr b="0" lang="en-US" sz="1400" spc="-1" strike="noStrike">
-                <a:latin typeface="Arial"/>
-              </a:rPr>
-              <a:t>  </a:t>
-            </a:r>
-            <a:r>
-              <a:rPr b="0" lang="en-US" sz="1400" spc="-1" strike="noStrike">
-                <a:latin typeface="Arial"/>
-              </a:rPr>
-              <a:t>practices {</a:t>
-            </a:r>
-            <a:endParaRPr b="0" lang="en-US" sz="1400" spc="-1" strike="noStrike">
-              <a:latin typeface="Arial"/>
-            </a:endParaRPr>
-          </a:p>
-          <a:p>
-            <a:pPr>
-              <a:lnSpc>
-                <a:spcPct val="100000"/>
-              </a:lnSpc>
-            </a:pPr>
-            <a:r>
-              <a:rPr b="0" lang="en-US" sz="1400" spc="-1" strike="noStrike">
-                <a:latin typeface="Arial"/>
-              </a:rPr>
-              <a:t>    </a:t>
-            </a:r>
-            <a:r>
-              <a:rPr b="0" lang="en-US" sz="1400" spc="-1" strike="noStrike">
-                <a:latin typeface="Arial"/>
-              </a:rPr>
-              <a:t>name</a:t>
-            </a:r>
-            <a:endParaRPr b="0" lang="en-US" sz="1400" spc="-1" strike="noStrike">
-              <a:latin typeface="Arial"/>
-            </a:endParaRPr>
-          </a:p>
-          <a:p>
-            <a:pPr>
-              <a:lnSpc>
-                <a:spcPct val="100000"/>
-              </a:lnSpc>
-            </a:pPr>
-            <a:r>
-              <a:rPr b="0" lang="en-US" sz="1400" spc="-1" strike="noStrike">
-                <a:latin typeface="Arial"/>
-              </a:rPr>
-              <a:t>    …</a:t>
-            </a:r>
-            <a:endParaRPr b="0" lang="en-US" sz="1400" spc="-1" strike="noStrike">
-              <a:latin typeface="Arial"/>
-            </a:endParaRPr>
-          </a:p>
-          <a:p>
-            <a:pPr>
-              <a:lnSpc>
-                <a:spcPct val="100000"/>
-              </a:lnSpc>
-            </a:pPr>
-            <a:r>
-              <a:rPr b="0" lang="en-US" sz="1400" spc="-1" strike="noStrike">
-                <a:latin typeface="Arial"/>
-              </a:rPr>
-              <a:t>  </a:t>
-            </a:r>
-            <a:r>
-              <a:rPr b="0" lang="en-US" sz="1400" spc="-1" strike="noStrike">
-                <a:latin typeface="Arial"/>
-              </a:rPr>
-              <a:t>}</a:t>
-            </a:r>
-            <a:endParaRPr b="0" lang="en-US" sz="1400" spc="-1" strike="noStrike">
-              <a:latin typeface="Arial"/>
-            </a:endParaRPr>
-          </a:p>
-          <a:p>
-            <a:pPr>
-              <a:lnSpc>
-                <a:spcPct val="100000"/>
-              </a:lnSpc>
-            </a:pPr>
-            <a:r>
-              <a:rPr b="0" lang="en-US" sz="1400" spc="-1" strike="noStrike">
-                <a:latin typeface="Arial"/>
-              </a:rPr>
-              <a:t>}`</a:t>
-            </a:r>
-            <a:endParaRPr b="0" lang="en-US" sz="1400" spc="-1" strike="noStrike">
-              <a:latin typeface="Arial"/>
-            </a:endParaRPr>
-          </a:p>
-          <a:p>
-            <a:pPr>
-              <a:lnSpc>
-                <a:spcPct val="100000"/>
-              </a:lnSpc>
-            </a:pPr>
-            <a:r>
-              <a:rPr b="0" lang="en-US" sz="1400" spc="-1" strike="noStrike">
-                <a:latin typeface="Arial"/>
-              </a:rPr>
-              <a:t>```</a:t>
-            </a:r>
-            <a:endParaRPr b="0" lang="en-US" sz="1400" spc="-1" strike="noStrike">
-              <a:latin typeface="Arial"/>
-            </a:endParaRPr>
-          </a:p>
-        </p:txBody>
       </p:sp>
     </p:spTree>
   </p:cSld>

</xml_diff>

<commit_message>
work on react exercises
</commit_message>
<xml_diff>
--- a/slides/graphq-slides.pptx
+++ b/slides/graphq-slides.pptx
@@ -17,9 +17,6 @@
     <p:sldId id="263" r:id="rId12"/>
     <p:sldId id="264" r:id="rId13"/>
     <p:sldId id="265" r:id="rId14"/>
-    <p:sldId id="266" r:id="rId15"/>
-    <p:sldId id="267" r:id="rId16"/>
-    <p:sldId id="268" r:id="rId17"/>
   </p:sldIdLst>
   <p:sldSz cx="9144000" cy="5143500"/>
   <p:notesSz cx="7559675" cy="10691812"/>
@@ -4059,7 +4056,7 @@
         <p:spPr>
           <a:xfrm>
             <a:off x="7200000" y="360000"/>
-            <a:ext cx="1247760" cy="275400"/>
+            <a:ext cx="1247400" cy="275040"/>
           </a:xfrm>
           <a:prstGeom prst="rect">
             <a:avLst/>
@@ -4082,7 +4079,7 @@
         <p:spPr>
           <a:xfrm>
             <a:off x="0" y="4966560"/>
-            <a:ext cx="9132840" cy="165600"/>
+            <a:ext cx="9132480" cy="165240"/>
           </a:xfrm>
           <a:prstGeom prst="rect">
             <a:avLst/>
@@ -4139,7 +4136,7 @@
         <p:spPr>
           <a:xfrm>
             <a:off x="0" y="4966560"/>
-            <a:ext cx="9132840" cy="165600"/>
+            <a:ext cx="9132480" cy="165240"/>
           </a:xfrm>
           <a:prstGeom prst="rect">
             <a:avLst/>
@@ -4162,7 +4159,7 @@
         <p:spPr>
           <a:xfrm>
             <a:off x="648000" y="108000"/>
-            <a:ext cx="2869200" cy="637920"/>
+            <a:ext cx="2868840" cy="637560"/>
           </a:xfrm>
           <a:prstGeom prst="rect">
             <a:avLst/>
@@ -4443,7 +4440,7 @@
         <p:spPr>
           <a:xfrm>
             <a:off x="7200000" y="360000"/>
-            <a:ext cx="1247760" cy="275400"/>
+            <a:ext cx="1247400" cy="275040"/>
           </a:xfrm>
           <a:prstGeom prst="rect">
             <a:avLst/>
@@ -4466,7 +4463,7 @@
         <p:spPr>
           <a:xfrm>
             <a:off x="0" y="4966560"/>
-            <a:ext cx="9132840" cy="165600"/>
+            <a:ext cx="9132480" cy="165240"/>
           </a:xfrm>
           <a:prstGeom prst="rect">
             <a:avLst/>
@@ -4781,7 +4778,7 @@
         <p:spPr>
           <a:xfrm>
             <a:off x="7200000" y="360000"/>
-            <a:ext cx="1247760" cy="275400"/>
+            <a:ext cx="1247400" cy="275040"/>
           </a:xfrm>
           <a:prstGeom prst="rect">
             <a:avLst/>
@@ -4804,7 +4801,7 @@
         <p:spPr>
           <a:xfrm>
             <a:off x="0" y="4966560"/>
-            <a:ext cx="9132840" cy="165600"/>
+            <a:ext cx="9132480" cy="165240"/>
           </a:xfrm>
           <a:prstGeom prst="rect">
             <a:avLst/>
@@ -4857,7 +4854,7 @@
         <p:spPr>
           <a:xfrm>
             <a:off x="0" y="812880"/>
-            <a:ext cx="9132840" cy="3498840"/>
+            <a:ext cx="9132480" cy="3498480"/>
           </a:xfrm>
           <a:prstGeom prst="rect">
             <a:avLst/>
@@ -5149,7 +5146,7 @@
         <p:spPr>
           <a:xfrm>
             <a:off x="0" y="810000"/>
-            <a:ext cx="9132840" cy="3336840"/>
+            <a:ext cx="9132480" cy="3336480"/>
           </a:xfrm>
           <a:prstGeom prst="rect">
             <a:avLst/>
@@ -5171,7 +5168,7 @@
         <p:spPr>
           <a:xfrm>
             <a:off x="5400000" y="1548000"/>
-            <a:ext cx="3012840" cy="3012840"/>
+            <a:ext cx="3012480" cy="3012480"/>
           </a:xfrm>
           <a:prstGeom prst="rect">
             <a:avLst/>
@@ -5302,7 +5299,7 @@
         <p:spPr>
           <a:xfrm>
             <a:off x="720000" y="288000"/>
-            <a:ext cx="6612840" cy="492840"/>
+            <a:ext cx="6612480" cy="492480"/>
           </a:xfrm>
           <a:prstGeom prst="rect">
             <a:avLst/>
@@ -5334,7 +5331,7 @@
                 <a:latin typeface="Arial"/>
                 <a:ea typeface="DejaVu Sans"/>
               </a:rPr>
-              <a:t>To the front-end!</a:t>
+              <a:t>Inputs from the front-end</a:t>
             </a:r>
             <a:endParaRPr b="0" lang="en-US" sz="1800" spc="-1" strike="noStrike">
               <a:latin typeface="Arial"/>
@@ -5351,7 +5348,7 @@
         <p:spPr>
           <a:xfrm>
             <a:off x="4968000" y="5004000"/>
-            <a:ext cx="3228840" cy="96840"/>
+            <a:ext cx="3228480" cy="96480"/>
           </a:xfrm>
           <a:prstGeom prst="rect">
             <a:avLst/>
@@ -5400,7 +5397,7 @@
         <p:spPr>
           <a:xfrm>
             <a:off x="8280000" y="5004000"/>
-            <a:ext cx="132840" cy="96840"/>
+            <a:ext cx="132480" cy="96480"/>
           </a:xfrm>
           <a:prstGeom prst="rect">
             <a:avLst/>
@@ -5424,7 +5421,7 @@
                 <a:spcPct val="100000"/>
               </a:lnSpc>
             </a:pPr>
-            <a:fld id="{08835AE6-77E8-449D-AEE7-A4E96D5C8139}" type="slidenum">
+            <a:fld id="{F9D16EBB-E3B8-45C8-89DF-EE8100192974}" type="slidenum">
               <a:rPr b="0" lang="en-US" sz="600" spc="-1" strike="noStrike">
                 <a:solidFill>
                   <a:srgbClr val="ffffff"/>
@@ -5449,7 +5446,7 @@
         <p:spPr>
           <a:xfrm>
             <a:off x="602640" y="504720"/>
-            <a:ext cx="6612840" cy="3876120"/>
+            <a:ext cx="6612480" cy="3875760"/>
           </a:xfrm>
           <a:prstGeom prst="rect">
             <a:avLst/>
@@ -5498,1762 +5495,7 @@
         <p:spPr>
           <a:xfrm>
             <a:off x="822960" y="696600"/>
-            <a:ext cx="7131600" cy="3929040"/>
-          </a:xfrm>
-          <a:prstGeom prst="rect">
-            <a:avLst/>
-          </a:prstGeom>
-          <a:noFill/>
-          <a:ln>
-            <a:noFill/>
-          </a:ln>
-        </p:spPr>
-        <p:style>
-          <a:lnRef idx="0"/>
-          <a:fillRef idx="0"/>
-          <a:effectRef idx="0"/>
-          <a:fontRef idx="minor"/>
-        </p:style>
-        <p:txBody>
-          <a:bodyPr lIns="90000" rIns="90000" tIns="45000" bIns="45000"/>
-          <a:p>
-            <a:pPr>
-              <a:lnSpc>
-                <a:spcPct val="100000"/>
-              </a:lnSpc>
-            </a:pPr>
-            <a:r>
-              <a:rPr b="0" lang="en-US" sz="1800" spc="-1" strike="noStrike">
-                <a:solidFill>
-                  <a:srgbClr val="000000"/>
-                </a:solidFill>
-                <a:latin typeface="Arial"/>
-                <a:ea typeface="DejaVu Sans"/>
-              </a:rPr>
-              <a:t>In fetch.js add </a:t>
-            </a:r>
-            <a:endParaRPr b="0" lang="en-US" sz="1800" spc="-1" strike="noStrike">
-              <a:latin typeface="Arial"/>
-            </a:endParaRPr>
-          </a:p>
-          <a:p>
-            <a:pPr>
-              <a:lnSpc>
-                <a:spcPct val="100000"/>
-              </a:lnSpc>
-            </a:pPr>
-            <a:r>
-              <a:rPr b="0" lang="en-US" sz="1800" spc="-1" strike="noStrike">
-                <a:solidFill>
-                  <a:srgbClr val="000000"/>
-                </a:solidFill>
-                <a:latin typeface="Arial"/>
-                <a:ea typeface="DejaVu Sans"/>
-              </a:rPr>
-              <a:t>`const graphqlClient = new ApolloClient({</a:t>
-            </a:r>
-            <a:endParaRPr b="0" lang="en-US" sz="1800" spc="-1" strike="noStrike">
-              <a:latin typeface="Arial"/>
-            </a:endParaRPr>
-          </a:p>
-          <a:p>
-            <a:pPr>
-              <a:lnSpc>
-                <a:spcPct val="100000"/>
-              </a:lnSpc>
-            </a:pPr>
-            <a:r>
-              <a:rPr b="0" lang="en-US" sz="1800" spc="-1" strike="noStrike">
-                <a:solidFill>
-                  <a:srgbClr val="000000"/>
-                </a:solidFill>
-                <a:latin typeface="Arial"/>
-                <a:ea typeface="DejaVu Sans"/>
-              </a:rPr>
-              <a:t>  </a:t>
-            </a:r>
-            <a:r>
-              <a:rPr b="0" lang="en-US" sz="1800" spc="-1" strike="noStrike">
-                <a:solidFill>
-                  <a:srgbClr val="000000"/>
-                </a:solidFill>
-                <a:latin typeface="Arial"/>
-                <a:ea typeface="DejaVu Sans"/>
-              </a:rPr>
-              <a:t>link: new HttpLink({ uri: "http://localhost:3030/api/graphql" }),</a:t>
-            </a:r>
-            <a:endParaRPr b="0" lang="en-US" sz="1800" spc="-1" strike="noStrike">
-              <a:latin typeface="Arial"/>
-            </a:endParaRPr>
-          </a:p>
-          <a:p>
-            <a:pPr>
-              <a:lnSpc>
-                <a:spcPct val="100000"/>
-              </a:lnSpc>
-            </a:pPr>
-            <a:r>
-              <a:rPr b="0" lang="en-US" sz="1800" spc="-1" strike="noStrike">
-                <a:solidFill>
-                  <a:srgbClr val="000000"/>
-                </a:solidFill>
-                <a:latin typeface="Arial"/>
-                <a:ea typeface="DejaVu Sans"/>
-              </a:rPr>
-              <a:t>  </a:t>
-            </a:r>
-            <a:r>
-              <a:rPr b="0" lang="en-US" sz="1800" spc="-1" strike="noStrike">
-                <a:solidFill>
-                  <a:srgbClr val="000000"/>
-                </a:solidFill>
-                <a:latin typeface="Arial"/>
-                <a:ea typeface="DejaVu Sans"/>
-              </a:rPr>
-              <a:t>cache: new InMemoryCache()</a:t>
-            </a:r>
-            <a:endParaRPr b="0" lang="en-US" sz="1800" spc="-1" strike="noStrike">
-              <a:latin typeface="Arial"/>
-            </a:endParaRPr>
-          </a:p>
-          <a:p>
-            <a:pPr>
-              <a:lnSpc>
-                <a:spcPct val="100000"/>
-              </a:lnSpc>
-            </a:pPr>
-            <a:r>
-              <a:rPr b="0" lang="en-US" sz="1800" spc="-1" strike="noStrike">
-                <a:solidFill>
-                  <a:srgbClr val="000000"/>
-                </a:solidFill>
-                <a:latin typeface="Arial"/>
-                <a:ea typeface="DejaVu Sans"/>
-              </a:rPr>
-              <a:t>});`</a:t>
-            </a:r>
-            <a:endParaRPr b="0" lang="en-US" sz="1800" spc="-1" strike="noStrike">
-              <a:latin typeface="Arial"/>
-            </a:endParaRPr>
-          </a:p>
-          <a:p>
-            <a:pPr>
-              <a:lnSpc>
-                <a:spcPct val="100000"/>
-              </a:lnSpc>
-            </a:pPr>
-            <a:endParaRPr b="0" lang="en-US" sz="1800" spc="-1" strike="noStrike">
-              <a:latin typeface="Arial"/>
-            </a:endParaRPr>
-          </a:p>
-          <a:p>
-            <a:pPr>
-              <a:lnSpc>
-                <a:spcPct val="100000"/>
-              </a:lnSpc>
-            </a:pPr>
-            <a:r>
-              <a:rPr b="0" lang="en-US" sz="1800" spc="-1" strike="noStrike">
-                <a:solidFill>
-                  <a:srgbClr val="000000"/>
-                </a:solidFill>
-                <a:latin typeface="Arial"/>
-                <a:ea typeface="DejaVu Sans"/>
-              </a:rPr>
-              <a:t>Provide in App.js:</a:t>
-            </a:r>
-            <a:br/>
-            <a:r>
-              <a:rPr b="0" lang="en-US" sz="1800" spc="-1" strike="noStrike">
-                <a:solidFill>
-                  <a:srgbClr val="000000"/>
-                </a:solidFill>
-                <a:latin typeface="Arial"/>
-                <a:ea typeface="DejaVu Sans"/>
-              </a:rPr>
-              <a:t>```</a:t>
-            </a:r>
-            <a:endParaRPr b="0" lang="en-US" sz="1800" spc="-1" strike="noStrike">
-              <a:latin typeface="Arial"/>
-            </a:endParaRPr>
-          </a:p>
-          <a:p>
-            <a:pPr>
-              <a:lnSpc>
-                <a:spcPct val="100000"/>
-              </a:lnSpc>
-            </a:pPr>
-            <a:r>
-              <a:rPr b="0" lang="en-US" sz="1800" spc="-1" strike="noStrike">
-                <a:solidFill>
-                  <a:srgbClr val="000000"/>
-                </a:solidFill>
-                <a:latin typeface="Arial"/>
-                <a:ea typeface="DejaVu Sans"/>
-              </a:rPr>
-              <a:t>   </a:t>
-            </a:r>
-            <a:r>
-              <a:rPr b="0" lang="en-US" sz="1800" spc="-1" strike="noStrike">
-                <a:solidFill>
-                  <a:srgbClr val="000000"/>
-                </a:solidFill>
-                <a:latin typeface="Arial"/>
-                <a:ea typeface="DejaVu Sans"/>
-              </a:rPr>
-              <a:t>&lt;ApolloProvider client={graphqlClient}&gt;</a:t>
-            </a:r>
-            <a:endParaRPr b="0" lang="en-US" sz="1800" spc="-1" strike="noStrike">
-              <a:latin typeface="Arial"/>
-            </a:endParaRPr>
-          </a:p>
-          <a:p>
-            <a:pPr>
-              <a:lnSpc>
-                <a:spcPct val="100000"/>
-              </a:lnSpc>
-            </a:pPr>
-            <a:r>
-              <a:rPr b="0" lang="en-US" sz="1800" spc="-1" strike="noStrike">
-                <a:solidFill>
-                  <a:srgbClr val="000000"/>
-                </a:solidFill>
-                <a:latin typeface="Arial"/>
-                <a:ea typeface="DejaVu Sans"/>
-              </a:rPr>
-              <a:t>        </a:t>
-            </a:r>
-            <a:r>
-              <a:rPr b="0" lang="en-US" sz="1800" spc="-1" strike="noStrike">
-                <a:solidFill>
-                  <a:srgbClr val="000000"/>
-                </a:solidFill>
-                <a:latin typeface="Arial"/>
-                <a:ea typeface="DejaVu Sans"/>
-              </a:rPr>
-              <a:t>&lt;Router history={browserHistory}&gt;</a:t>
-            </a:r>
-            <a:endParaRPr b="0" lang="en-US" sz="1800" spc="-1" strike="noStrike">
-              <a:latin typeface="Arial"/>
-            </a:endParaRPr>
-          </a:p>
-          <a:p>
-            <a:pPr>
-              <a:lnSpc>
-                <a:spcPct val="100000"/>
-              </a:lnSpc>
-            </a:pPr>
-            <a:r>
-              <a:rPr b="0" lang="en-US" sz="1800" spc="-1" strike="noStrike">
-                <a:solidFill>
-                  <a:srgbClr val="000000"/>
-                </a:solidFill>
-                <a:latin typeface="Arial"/>
-                <a:ea typeface="DejaVu Sans"/>
-              </a:rPr>
-              <a:t>          </a:t>
-            </a:r>
-            <a:r>
-              <a:rPr b="0" lang="en-US" sz="1800" spc="-1" strike="noStrike">
-                <a:solidFill>
-                  <a:srgbClr val="000000"/>
-                </a:solidFill>
-                <a:latin typeface="Arial"/>
-                <a:ea typeface="DejaVu Sans"/>
-              </a:rPr>
-              <a:t>&lt;Frame /&gt;</a:t>
-            </a:r>
-            <a:endParaRPr b="0" lang="en-US" sz="1800" spc="-1" strike="noStrike">
-              <a:latin typeface="Arial"/>
-            </a:endParaRPr>
-          </a:p>
-          <a:p>
-            <a:pPr>
-              <a:lnSpc>
-                <a:spcPct val="100000"/>
-              </a:lnSpc>
-            </a:pPr>
-            <a:r>
-              <a:rPr b="0" lang="en-US" sz="1800" spc="-1" strike="noStrike">
-                <a:solidFill>
-                  <a:srgbClr val="000000"/>
-                </a:solidFill>
-                <a:latin typeface="Arial"/>
-                <a:ea typeface="DejaVu Sans"/>
-              </a:rPr>
-              <a:t>        </a:t>
-            </a:r>
-            <a:r>
-              <a:rPr b="0" lang="en-US" sz="1800" spc="-1" strike="noStrike">
-                <a:solidFill>
-                  <a:srgbClr val="000000"/>
-                </a:solidFill>
-                <a:latin typeface="Arial"/>
-                <a:ea typeface="DejaVu Sans"/>
-              </a:rPr>
-              <a:t>&lt;/Router&gt;</a:t>
-            </a:r>
-            <a:endParaRPr b="0" lang="en-US" sz="1800" spc="-1" strike="noStrike">
-              <a:latin typeface="Arial"/>
-            </a:endParaRPr>
-          </a:p>
-          <a:p>
-            <a:pPr>
-              <a:lnSpc>
-                <a:spcPct val="100000"/>
-              </a:lnSpc>
-            </a:pPr>
-            <a:r>
-              <a:rPr b="0" lang="en-US" sz="1800" spc="-1" strike="noStrike">
-                <a:solidFill>
-                  <a:srgbClr val="000000"/>
-                </a:solidFill>
-                <a:latin typeface="Arial"/>
-                <a:ea typeface="DejaVu Sans"/>
-              </a:rPr>
-              <a:t>      </a:t>
-            </a:r>
-            <a:r>
-              <a:rPr b="0" lang="en-US" sz="1800" spc="-1" strike="noStrike">
-                <a:solidFill>
-                  <a:srgbClr val="000000"/>
-                </a:solidFill>
-                <a:latin typeface="Arial"/>
-                <a:ea typeface="DejaVu Sans"/>
-              </a:rPr>
-              <a:t>&lt;/ApolloProvider&gt;</a:t>
-            </a:r>
-            <a:br/>
-            <a:r>
-              <a:rPr b="0" lang="en-US" sz="1800" spc="-1" strike="noStrike">
-                <a:solidFill>
-                  <a:srgbClr val="000000"/>
-                </a:solidFill>
-                <a:latin typeface="Arial"/>
-                <a:ea typeface="DejaVu Sans"/>
-              </a:rPr>
-              <a:t>```</a:t>
-            </a:r>
-            <a:endParaRPr b="0" lang="en-US" sz="1800" spc="-1" strike="noStrike">
-              <a:latin typeface="Arial"/>
-            </a:endParaRPr>
-          </a:p>
-          <a:p>
-            <a:pPr>
-              <a:lnSpc>
-                <a:spcPct val="100000"/>
-              </a:lnSpc>
-            </a:pPr>
-            <a:endParaRPr b="0" lang="en-US" sz="1800" spc="-1" strike="noStrike">
-              <a:latin typeface="Arial"/>
-            </a:endParaRPr>
-          </a:p>
-        </p:txBody>
-      </p:sp>
-    </p:spTree>
-  </p:cSld>
-  <p:timing>
-    <p:tnLst>
-      <p:par>
-        <p:cTn id="19" dur="indefinite" restart="never" nodeType="tmRoot">
-          <p:childTnLst>
-            <p:seq>
-              <p:cTn id="20" dur="indefinite" nodeType="mainSeq"/>
-              <p:prevCondLst>
-                <p:cond delay="0" evt="onPrev">
-                  <p:tgtEl>
-                    <p:sldTgt/>
-                  </p:tgtEl>
-                </p:cond>
-              </p:prevCondLst>
-              <p:nextCondLst>
-                <p:cond delay="0" evt="onNext">
-                  <p:tgtEl>
-                    <p:sldTgt/>
-                  </p:tgtEl>
-                </p:cond>
-              </p:nextCondLst>
-            </p:seq>
-          </p:childTnLst>
-        </p:cTn>
-      </p:par>
-    </p:tnLst>
-  </p:timing>
-</p:sld>
-</file>
-
-<file path=ppt/slides/slide11.xml><?xml version="1.0" encoding="utf-8"?>
-<p:sld xmlns:a="http://schemas.openxmlformats.org/drawingml/2006/main" xmlns:p="http://schemas.openxmlformats.org/presentationml/2006/main" xmlns:r="http://schemas.openxmlformats.org/officeDocument/2006/relationships" xmlns:p14="http://schemas.microsoft.com/office/powerpoint/2010/main" xmlns:p15="http://schemas.microsoft.com/office/powerpoint/2012/main" xmlns:mc="http://schemas.openxmlformats.org/markup-compatibility/2006">
-  <p:cSld>
-    <p:spTree>
-      <p:nvGrpSpPr>
-        <p:cNvPr id="1" name=""/>
-        <p:cNvGrpSpPr/>
-        <p:nvPr/>
-      </p:nvGrpSpPr>
-      <p:grpSpPr>
-        <a:xfrm>
-          <a:off x="0" y="0"/>
-          <a:ext cx="0" cy="0"/>
-          <a:chOff x="0" y="0"/>
-          <a:chExt cx="0" cy="0"/>
-        </a:xfrm>
-      </p:grpSpPr>
-      <p:sp>
-        <p:nvSpPr>
-          <p:cNvPr id="173" name="CustomShape 1"/>
-          <p:cNvSpPr/>
-          <p:nvPr/>
-        </p:nvSpPr>
-        <p:spPr>
-          <a:xfrm>
-            <a:off x="720000" y="288000"/>
-            <a:ext cx="6612840" cy="492840"/>
-          </a:xfrm>
-          <a:prstGeom prst="rect">
-            <a:avLst/>
-          </a:prstGeom>
-          <a:noFill/>
-          <a:ln>
-            <a:noFill/>
-          </a:ln>
-        </p:spPr>
-        <p:style>
-          <a:lnRef idx="0"/>
-          <a:fillRef idx="0"/>
-          <a:effectRef idx="0"/>
-          <a:fontRef idx="minor"/>
-        </p:style>
-        <p:txBody>
-          <a:bodyPr lIns="0" rIns="0" tIns="0" bIns="0" anchor="ctr"/>
-          <a:p>
-            <a:pPr>
-              <a:lnSpc>
-                <a:spcPct val="85000"/>
-              </a:lnSpc>
-            </a:pPr>
-            <a:r>
-              <a:rPr b="1" lang="en-US" sz="1800" spc="-1" strike="noStrike">
-                <a:solidFill>
-                  <a:srgbClr val="e63232"/>
-                </a:solidFill>
-                <a:latin typeface="Arial"/>
-                <a:ea typeface="DejaVu Sans"/>
-              </a:rPr>
-              <a:t>To the front-end!</a:t>
-            </a:r>
-            <a:endParaRPr b="0" lang="en-US" sz="1800" spc="-1" strike="noStrike">
-              <a:latin typeface="Arial"/>
-            </a:endParaRPr>
-          </a:p>
-        </p:txBody>
-      </p:sp>
-      <p:sp>
-        <p:nvSpPr>
-          <p:cNvPr id="174" name="CustomShape 2"/>
-          <p:cNvSpPr/>
-          <p:nvPr/>
-        </p:nvSpPr>
-        <p:spPr>
-          <a:xfrm>
-            <a:off x="4968000" y="5004000"/>
-            <a:ext cx="3228840" cy="96840"/>
-          </a:xfrm>
-          <a:prstGeom prst="rect">
-            <a:avLst/>
-          </a:prstGeom>
-          <a:noFill/>
-          <a:ln>
-            <a:noFill/>
-          </a:ln>
-        </p:spPr>
-        <p:style>
-          <a:lnRef idx="0"/>
-          <a:fillRef idx="0"/>
-          <a:effectRef idx="0"/>
-          <a:fontRef idx="minor"/>
-        </p:style>
-        <p:txBody>
-          <a:bodyPr lIns="0" rIns="0" tIns="0" bIns="0"/>
-          <a:p>
-            <a:pPr algn="r">
-              <a:lnSpc>
-                <a:spcPct val="100000"/>
-              </a:lnSpc>
-            </a:pPr>
-            <a:r>
-              <a:rPr b="0" lang="en-US" sz="600" spc="-1" strike="noStrike">
-                <a:solidFill>
-                  <a:srgbClr val="ffffff"/>
-                </a:solidFill>
-                <a:latin typeface="Arial"/>
-                <a:ea typeface="DejaVu Sans"/>
-              </a:rPr>
-              <a:t>GraphQL</a:t>
-            </a:r>
-            <a:endParaRPr b="0" lang="en-US" sz="600" spc="-1" strike="noStrike">
-              <a:latin typeface="Arial"/>
-            </a:endParaRPr>
-          </a:p>
-        </p:txBody>
-      </p:sp>
-      <p:sp>
-        <p:nvSpPr>
-          <p:cNvPr id="175" name="CustomShape 3"/>
-          <p:cNvSpPr/>
-          <p:nvPr/>
-        </p:nvSpPr>
-        <p:spPr>
-          <a:xfrm>
-            <a:off x="8280000" y="5004000"/>
-            <a:ext cx="132840" cy="96840"/>
-          </a:xfrm>
-          <a:prstGeom prst="rect">
-            <a:avLst/>
-          </a:prstGeom>
-          <a:noFill/>
-          <a:ln>
-            <a:noFill/>
-          </a:ln>
-        </p:spPr>
-        <p:style>
-          <a:lnRef idx="0"/>
-          <a:fillRef idx="0"/>
-          <a:effectRef idx="0"/>
-          <a:fontRef idx="minor"/>
-        </p:style>
-        <p:txBody>
-          <a:bodyPr lIns="0" rIns="0" tIns="0" bIns="0"/>
-          <a:p>
-            <a:pPr algn="r">
-              <a:lnSpc>
-                <a:spcPct val="100000"/>
-              </a:lnSpc>
-            </a:pPr>
-            <a:fld id="{92DD4BF7-31B0-4D39-9DD2-579C130BE815}" type="slidenum">
-              <a:rPr b="0" lang="en-US" sz="600" spc="-1" strike="noStrike">
-                <a:solidFill>
-                  <a:srgbClr val="ffffff"/>
-                </a:solidFill>
-                <a:latin typeface="Arial"/>
-                <a:ea typeface="DejaVu Sans"/>
-              </a:rPr>
-              <a:t>&lt;number&gt;</a:t>
-            </a:fld>
-            <a:endParaRPr b="0" lang="en-US" sz="600" spc="-1" strike="noStrike">
-              <a:latin typeface="Arial"/>
-            </a:endParaRPr>
-          </a:p>
-        </p:txBody>
-      </p:sp>
-      <p:sp>
-        <p:nvSpPr>
-          <p:cNvPr id="176" name="CustomShape 4"/>
-          <p:cNvSpPr/>
-          <p:nvPr/>
-        </p:nvSpPr>
-        <p:spPr>
-          <a:xfrm>
-            <a:off x="602640" y="504720"/>
-            <a:ext cx="6612840" cy="3876120"/>
-          </a:xfrm>
-          <a:prstGeom prst="rect">
-            <a:avLst/>
-          </a:prstGeom>
-          <a:noFill/>
-          <a:ln>
-            <a:noFill/>
-          </a:ln>
-        </p:spPr>
-        <p:style>
-          <a:lnRef idx="0"/>
-          <a:fillRef idx="0"/>
-          <a:effectRef idx="0"/>
-          <a:fontRef idx="minor"/>
-        </p:style>
-        <p:txBody>
-          <a:bodyPr lIns="0" rIns="0" tIns="0" bIns="0"/>
-          <a:p>
-            <a:pPr>
-              <a:lnSpc>
-                <a:spcPct val="120000"/>
-              </a:lnSpc>
-            </a:pPr>
-            <a:endParaRPr b="0" lang="en-US" sz="1800" spc="-1" strike="noStrike">
-              <a:latin typeface="Arial"/>
-            </a:endParaRPr>
-          </a:p>
-          <a:p>
-            <a:pPr>
-              <a:lnSpc>
-                <a:spcPct val="120000"/>
-              </a:lnSpc>
-            </a:pPr>
-            <a:endParaRPr b="0" lang="en-US" sz="1800" spc="-1" strike="noStrike">
-              <a:latin typeface="Arial"/>
-            </a:endParaRPr>
-          </a:p>
-        </p:txBody>
-      </p:sp>
-      <p:sp>
-        <p:nvSpPr>
-          <p:cNvPr id="177" name="CustomShape 5"/>
-          <p:cNvSpPr/>
-          <p:nvPr/>
-        </p:nvSpPr>
-        <p:spPr>
-          <a:xfrm>
-            <a:off x="822960" y="696600"/>
-            <a:ext cx="7131600" cy="3980160"/>
-          </a:xfrm>
-          <a:prstGeom prst="rect">
-            <a:avLst/>
-          </a:prstGeom>
-          <a:noFill/>
-          <a:ln>
-            <a:noFill/>
-          </a:ln>
-        </p:spPr>
-        <p:style>
-          <a:lnRef idx="0"/>
-          <a:fillRef idx="0"/>
-          <a:effectRef idx="0"/>
-          <a:fontRef idx="minor"/>
-        </p:style>
-        <p:txBody>
-          <a:bodyPr lIns="90000" rIns="90000" tIns="45000" bIns="45000"/>
-          <a:p>
-            <a:pPr>
-              <a:lnSpc>
-                <a:spcPct val="100000"/>
-              </a:lnSpc>
-            </a:pPr>
-            <a:r>
-              <a:rPr b="0" lang="en-US" sz="1800" spc="-1" strike="noStrike">
-                <a:solidFill>
-                  <a:srgbClr val="000000"/>
-                </a:solidFill>
-                <a:latin typeface="Arial"/>
-                <a:ea typeface="DejaVu Sans"/>
-              </a:rPr>
-              <a:t>Implement the &lt;Query /&gt; component from react-apollo in the practices component.</a:t>
-            </a:r>
-            <a:endParaRPr b="0" lang="en-US" sz="1800" spc="-1" strike="noStrike">
-              <a:latin typeface="Arial"/>
-            </a:endParaRPr>
-          </a:p>
-          <a:p>
-            <a:pPr>
-              <a:lnSpc>
-                <a:spcPct val="100000"/>
-              </a:lnSpc>
-            </a:pPr>
-            <a:endParaRPr b="0" lang="en-US" sz="1800" spc="-1" strike="noStrike">
-              <a:latin typeface="Arial"/>
-            </a:endParaRPr>
-          </a:p>
-          <a:p>
-            <a:pPr>
-              <a:lnSpc>
-                <a:spcPct val="100000"/>
-              </a:lnSpc>
-            </a:pPr>
-            <a:r>
-              <a:rPr b="0" lang="en-US" sz="1800" spc="-1" strike="noStrike">
-                <a:solidFill>
-                  <a:srgbClr val="000000"/>
-                </a:solidFill>
-                <a:latin typeface="Arial"/>
-                <a:ea typeface="DejaVu Sans"/>
-              </a:rPr>
-              <a:t>As Child, this component accepts a function:</a:t>
-            </a:r>
-            <a:endParaRPr b="0" lang="en-US" sz="1800" spc="-1" strike="noStrike">
-              <a:latin typeface="Arial"/>
-            </a:endParaRPr>
-          </a:p>
-          <a:p>
-            <a:pPr>
-              <a:lnSpc>
-                <a:spcPct val="100000"/>
-              </a:lnSpc>
-            </a:pPr>
-            <a:r>
-              <a:rPr b="0" lang="en-US" sz="1800" spc="-1" strike="noStrike">
-                <a:solidFill>
-                  <a:srgbClr val="000000"/>
-                </a:solidFill>
-                <a:latin typeface="Arial"/>
-                <a:ea typeface="DejaVu Sans"/>
-              </a:rPr>
-              <a:t>`&lt;Query query={query}&gt;{({loading, error, data}) =&gt; { … }}`</a:t>
-            </a:r>
-            <a:endParaRPr b="0" lang="en-US" sz="1800" spc="-1" strike="noStrike">
-              <a:latin typeface="Arial"/>
-            </a:endParaRPr>
-          </a:p>
-          <a:p>
-            <a:pPr>
-              <a:lnSpc>
-                <a:spcPct val="100000"/>
-              </a:lnSpc>
-            </a:pPr>
-            <a:endParaRPr b="0" lang="en-US" sz="1800" spc="-1" strike="noStrike">
-              <a:latin typeface="Arial"/>
-            </a:endParaRPr>
-          </a:p>
-          <a:p>
-            <a:pPr>
-              <a:lnSpc>
-                <a:spcPct val="100000"/>
-              </a:lnSpc>
-            </a:pPr>
-            <a:r>
-              <a:rPr b="0" lang="en-US" sz="1800" spc="-1" strike="noStrike">
-                <a:solidFill>
-                  <a:srgbClr val="000000"/>
-                </a:solidFill>
-                <a:latin typeface="Arial"/>
-                <a:ea typeface="DejaVu Sans"/>
-              </a:rPr>
-              <a:t>Define the query under the component Class by using gql from the package graphql-tag:</a:t>
-            </a:r>
-            <a:endParaRPr b="0" lang="en-US" sz="1800" spc="-1" strike="noStrike">
-              <a:latin typeface="Arial"/>
-            </a:endParaRPr>
-          </a:p>
-          <a:p>
-            <a:pPr>
-              <a:lnSpc>
-                <a:spcPct val="100000"/>
-              </a:lnSpc>
-            </a:pPr>
-            <a:endParaRPr b="0" lang="en-US" sz="1800" spc="-1" strike="noStrike">
-              <a:latin typeface="Arial"/>
-            </a:endParaRPr>
-          </a:p>
-          <a:p>
-            <a:pPr>
-              <a:lnSpc>
-                <a:spcPct val="100000"/>
-              </a:lnSpc>
-            </a:pPr>
-            <a:r>
-              <a:rPr b="0" lang="en-US" sz="1400" spc="-1" strike="noStrike">
-                <a:solidFill>
-                  <a:srgbClr val="000000"/>
-                </a:solidFill>
-                <a:latin typeface="Arial"/>
-                <a:ea typeface="DejaVu Sans"/>
-              </a:rPr>
-              <a:t>```</a:t>
-            </a:r>
-            <a:br/>
-            <a:r>
-              <a:rPr b="0" lang="en-US" sz="1400" spc="-1" strike="noStrike">
-                <a:solidFill>
-                  <a:srgbClr val="000000"/>
-                </a:solidFill>
-                <a:latin typeface="Arial"/>
-                <a:ea typeface="DejaVu Sans"/>
-              </a:rPr>
-              <a:t>const query = gql`{</a:t>
-            </a:r>
-            <a:endParaRPr b="0" lang="en-US" sz="1400" spc="-1" strike="noStrike">
-              <a:latin typeface="Arial"/>
-            </a:endParaRPr>
-          </a:p>
-          <a:p>
-            <a:pPr>
-              <a:lnSpc>
-                <a:spcPct val="100000"/>
-              </a:lnSpc>
-            </a:pPr>
-            <a:r>
-              <a:rPr b="0" lang="en-US" sz="1400" spc="-1" strike="noStrike">
-                <a:solidFill>
-                  <a:srgbClr val="000000"/>
-                </a:solidFill>
-                <a:latin typeface="Arial"/>
-                <a:ea typeface="DejaVu Sans"/>
-              </a:rPr>
-              <a:t>  </a:t>
-            </a:r>
-            <a:r>
-              <a:rPr b="0" lang="en-US" sz="1400" spc="-1" strike="noStrike">
-                <a:solidFill>
-                  <a:srgbClr val="000000"/>
-                </a:solidFill>
-                <a:latin typeface="Arial"/>
-                <a:ea typeface="DejaVu Sans"/>
-              </a:rPr>
-              <a:t>practices {</a:t>
-            </a:r>
-            <a:endParaRPr b="0" lang="en-US" sz="1400" spc="-1" strike="noStrike">
-              <a:latin typeface="Arial"/>
-            </a:endParaRPr>
-          </a:p>
-          <a:p>
-            <a:pPr>
-              <a:lnSpc>
-                <a:spcPct val="100000"/>
-              </a:lnSpc>
-            </a:pPr>
-            <a:r>
-              <a:rPr b="0" lang="en-US" sz="1400" spc="-1" strike="noStrike">
-                <a:solidFill>
-                  <a:srgbClr val="000000"/>
-                </a:solidFill>
-                <a:latin typeface="Arial"/>
-                <a:ea typeface="DejaVu Sans"/>
-              </a:rPr>
-              <a:t>    </a:t>
-            </a:r>
-            <a:r>
-              <a:rPr b="0" lang="en-US" sz="1400" spc="-1" strike="noStrike">
-                <a:solidFill>
-                  <a:srgbClr val="000000"/>
-                </a:solidFill>
-                <a:latin typeface="Arial"/>
-                <a:ea typeface="DejaVu Sans"/>
-              </a:rPr>
-              <a:t>name</a:t>
-            </a:r>
-            <a:endParaRPr b="0" lang="en-US" sz="1400" spc="-1" strike="noStrike">
-              <a:latin typeface="Arial"/>
-            </a:endParaRPr>
-          </a:p>
-          <a:p>
-            <a:pPr>
-              <a:lnSpc>
-                <a:spcPct val="100000"/>
-              </a:lnSpc>
-            </a:pPr>
-            <a:r>
-              <a:rPr b="0" lang="en-US" sz="1400" spc="-1" strike="noStrike">
-                <a:solidFill>
-                  <a:srgbClr val="000000"/>
-                </a:solidFill>
-                <a:latin typeface="Arial"/>
-                <a:ea typeface="DejaVu Sans"/>
-              </a:rPr>
-              <a:t>    …</a:t>
-            </a:r>
-            <a:endParaRPr b="0" lang="en-US" sz="1400" spc="-1" strike="noStrike">
-              <a:latin typeface="Arial"/>
-            </a:endParaRPr>
-          </a:p>
-          <a:p>
-            <a:pPr>
-              <a:lnSpc>
-                <a:spcPct val="100000"/>
-              </a:lnSpc>
-            </a:pPr>
-            <a:r>
-              <a:rPr b="0" lang="en-US" sz="1400" spc="-1" strike="noStrike">
-                <a:solidFill>
-                  <a:srgbClr val="000000"/>
-                </a:solidFill>
-                <a:latin typeface="Arial"/>
-                <a:ea typeface="DejaVu Sans"/>
-              </a:rPr>
-              <a:t>  </a:t>
-            </a:r>
-            <a:r>
-              <a:rPr b="0" lang="en-US" sz="1400" spc="-1" strike="noStrike">
-                <a:solidFill>
-                  <a:srgbClr val="000000"/>
-                </a:solidFill>
-                <a:latin typeface="Arial"/>
-                <a:ea typeface="DejaVu Sans"/>
-              </a:rPr>
-              <a:t>}</a:t>
-            </a:r>
-            <a:endParaRPr b="0" lang="en-US" sz="1400" spc="-1" strike="noStrike">
-              <a:latin typeface="Arial"/>
-            </a:endParaRPr>
-          </a:p>
-          <a:p>
-            <a:pPr>
-              <a:lnSpc>
-                <a:spcPct val="100000"/>
-              </a:lnSpc>
-            </a:pPr>
-            <a:r>
-              <a:rPr b="0" lang="en-US" sz="1400" spc="-1" strike="noStrike">
-                <a:solidFill>
-                  <a:srgbClr val="000000"/>
-                </a:solidFill>
-                <a:latin typeface="Arial"/>
-                <a:ea typeface="DejaVu Sans"/>
-              </a:rPr>
-              <a:t>}`</a:t>
-            </a:r>
-            <a:endParaRPr b="0" lang="en-US" sz="1400" spc="-1" strike="noStrike">
-              <a:latin typeface="Arial"/>
-            </a:endParaRPr>
-          </a:p>
-          <a:p>
-            <a:pPr>
-              <a:lnSpc>
-                <a:spcPct val="100000"/>
-              </a:lnSpc>
-            </a:pPr>
-            <a:r>
-              <a:rPr b="0" lang="en-US" sz="1400" spc="-1" strike="noStrike">
-                <a:solidFill>
-                  <a:srgbClr val="000000"/>
-                </a:solidFill>
-                <a:latin typeface="Arial"/>
-                <a:ea typeface="DejaVu Sans"/>
-              </a:rPr>
-              <a:t>```</a:t>
-            </a:r>
-            <a:endParaRPr b="0" lang="en-US" sz="1400" spc="-1" strike="noStrike">
-              <a:latin typeface="Arial"/>
-            </a:endParaRPr>
-          </a:p>
-        </p:txBody>
-      </p:sp>
-    </p:spTree>
-  </p:cSld>
-  <p:timing>
-    <p:tnLst>
-      <p:par>
-        <p:cTn id="21" dur="indefinite" restart="never" nodeType="tmRoot">
-          <p:childTnLst>
-            <p:seq>
-              <p:cTn id="22" dur="indefinite" nodeType="mainSeq"/>
-              <p:prevCondLst>
-                <p:cond delay="0" evt="onPrev">
-                  <p:tgtEl>
-                    <p:sldTgt/>
-                  </p:tgtEl>
-                </p:cond>
-              </p:prevCondLst>
-              <p:nextCondLst>
-                <p:cond delay="0" evt="onNext">
-                  <p:tgtEl>
-                    <p:sldTgt/>
-                  </p:tgtEl>
-                </p:cond>
-              </p:nextCondLst>
-            </p:seq>
-          </p:childTnLst>
-        </p:cTn>
-      </p:par>
-    </p:tnLst>
-  </p:timing>
-</p:sld>
-</file>
-
-<file path=ppt/slides/slide12.xml><?xml version="1.0" encoding="utf-8"?>
-<p:sld xmlns:a="http://schemas.openxmlformats.org/drawingml/2006/main" xmlns:p="http://schemas.openxmlformats.org/presentationml/2006/main" xmlns:r="http://schemas.openxmlformats.org/officeDocument/2006/relationships" xmlns:p14="http://schemas.microsoft.com/office/powerpoint/2010/main" xmlns:p15="http://schemas.microsoft.com/office/powerpoint/2012/main" xmlns:mc="http://schemas.openxmlformats.org/markup-compatibility/2006">
-  <p:cSld>
-    <p:spTree>
-      <p:nvGrpSpPr>
-        <p:cNvPr id="1" name=""/>
-        <p:cNvGrpSpPr/>
-        <p:nvPr/>
-      </p:nvGrpSpPr>
-      <p:grpSpPr>
-        <a:xfrm>
-          <a:off x="0" y="0"/>
-          <a:ext cx="0" cy="0"/>
-          <a:chOff x="0" y="0"/>
-          <a:chExt cx="0" cy="0"/>
-        </a:xfrm>
-      </p:grpSpPr>
-      <p:sp>
-        <p:nvSpPr>
-          <p:cNvPr id="178" name="CustomShape 1"/>
-          <p:cNvSpPr/>
-          <p:nvPr/>
-        </p:nvSpPr>
-        <p:spPr>
-          <a:xfrm>
-            <a:off x="720000" y="288000"/>
-            <a:ext cx="6612840" cy="492840"/>
-          </a:xfrm>
-          <a:prstGeom prst="rect">
-            <a:avLst/>
-          </a:prstGeom>
-          <a:noFill/>
-          <a:ln>
-            <a:noFill/>
-          </a:ln>
-        </p:spPr>
-        <p:style>
-          <a:lnRef idx="0"/>
-          <a:fillRef idx="0"/>
-          <a:effectRef idx="0"/>
-          <a:fontRef idx="minor"/>
-        </p:style>
-        <p:txBody>
-          <a:bodyPr lIns="0" rIns="0" tIns="0" bIns="0" anchor="ctr"/>
-          <a:p>
-            <a:pPr>
-              <a:lnSpc>
-                <a:spcPct val="85000"/>
-              </a:lnSpc>
-            </a:pPr>
-            <a:r>
-              <a:rPr b="1" lang="en-US" sz="1800" spc="-1" strike="noStrike">
-                <a:solidFill>
-                  <a:srgbClr val="e63232"/>
-                </a:solidFill>
-                <a:latin typeface="Arial"/>
-                <a:ea typeface="DejaVu Sans"/>
-              </a:rPr>
-              <a:t>Inputs from the front-end</a:t>
-            </a:r>
-            <a:endParaRPr b="0" lang="en-US" sz="1800" spc="-1" strike="noStrike">
-              <a:latin typeface="Arial"/>
-            </a:endParaRPr>
-          </a:p>
-        </p:txBody>
-      </p:sp>
-      <p:sp>
-        <p:nvSpPr>
-          <p:cNvPr id="179" name="CustomShape 2"/>
-          <p:cNvSpPr/>
-          <p:nvPr/>
-        </p:nvSpPr>
-        <p:spPr>
-          <a:xfrm>
-            <a:off x="4968000" y="5004000"/>
-            <a:ext cx="3228840" cy="96840"/>
-          </a:xfrm>
-          <a:prstGeom prst="rect">
-            <a:avLst/>
-          </a:prstGeom>
-          <a:noFill/>
-          <a:ln>
-            <a:noFill/>
-          </a:ln>
-        </p:spPr>
-        <p:style>
-          <a:lnRef idx="0"/>
-          <a:fillRef idx="0"/>
-          <a:effectRef idx="0"/>
-          <a:fontRef idx="minor"/>
-        </p:style>
-        <p:txBody>
-          <a:bodyPr lIns="0" rIns="0" tIns="0" bIns="0"/>
-          <a:p>
-            <a:pPr algn="r">
-              <a:lnSpc>
-                <a:spcPct val="100000"/>
-              </a:lnSpc>
-            </a:pPr>
-            <a:r>
-              <a:rPr b="0" lang="en-US" sz="600" spc="-1" strike="noStrike">
-                <a:solidFill>
-                  <a:srgbClr val="ffffff"/>
-                </a:solidFill>
-                <a:latin typeface="Arial"/>
-                <a:ea typeface="DejaVu Sans"/>
-              </a:rPr>
-              <a:t>GraphQL</a:t>
-            </a:r>
-            <a:endParaRPr b="0" lang="en-US" sz="600" spc="-1" strike="noStrike">
-              <a:latin typeface="Arial"/>
-            </a:endParaRPr>
-          </a:p>
-        </p:txBody>
-      </p:sp>
-      <p:sp>
-        <p:nvSpPr>
-          <p:cNvPr id="180" name="CustomShape 3"/>
-          <p:cNvSpPr/>
-          <p:nvPr/>
-        </p:nvSpPr>
-        <p:spPr>
-          <a:xfrm>
-            <a:off x="8280000" y="5004000"/>
-            <a:ext cx="132840" cy="96840"/>
-          </a:xfrm>
-          <a:prstGeom prst="rect">
-            <a:avLst/>
-          </a:prstGeom>
-          <a:noFill/>
-          <a:ln>
-            <a:noFill/>
-          </a:ln>
-        </p:spPr>
-        <p:style>
-          <a:lnRef idx="0"/>
-          <a:fillRef idx="0"/>
-          <a:effectRef idx="0"/>
-          <a:fontRef idx="minor"/>
-        </p:style>
-        <p:txBody>
-          <a:bodyPr lIns="0" rIns="0" tIns="0" bIns="0"/>
-          <a:p>
-            <a:pPr algn="r">
-              <a:lnSpc>
-                <a:spcPct val="100000"/>
-              </a:lnSpc>
-            </a:pPr>
-            <a:fld id="{9270D052-05A8-4F49-BCF8-FE7FF1034535}" type="slidenum">
-              <a:rPr b="0" lang="en-US" sz="600" spc="-1" strike="noStrike">
-                <a:solidFill>
-                  <a:srgbClr val="ffffff"/>
-                </a:solidFill>
-                <a:latin typeface="Arial"/>
-                <a:ea typeface="DejaVu Sans"/>
-              </a:rPr>
-              <a:t>&lt;number&gt;</a:t>
-            </a:fld>
-            <a:endParaRPr b="0" lang="en-US" sz="600" spc="-1" strike="noStrike">
-              <a:latin typeface="Arial"/>
-            </a:endParaRPr>
-          </a:p>
-        </p:txBody>
-      </p:sp>
-      <p:sp>
-        <p:nvSpPr>
-          <p:cNvPr id="181" name="CustomShape 4"/>
-          <p:cNvSpPr/>
-          <p:nvPr/>
-        </p:nvSpPr>
-        <p:spPr>
-          <a:xfrm>
-            <a:off x="602640" y="504720"/>
-            <a:ext cx="6612840" cy="3876120"/>
-          </a:xfrm>
-          <a:prstGeom prst="rect">
-            <a:avLst/>
-          </a:prstGeom>
-          <a:noFill/>
-          <a:ln>
-            <a:noFill/>
-          </a:ln>
-        </p:spPr>
-        <p:style>
-          <a:lnRef idx="0"/>
-          <a:fillRef idx="0"/>
-          <a:effectRef idx="0"/>
-          <a:fontRef idx="minor"/>
-        </p:style>
-        <p:txBody>
-          <a:bodyPr lIns="0" rIns="0" tIns="0" bIns="0"/>
-          <a:p>
-            <a:pPr>
-              <a:lnSpc>
-                <a:spcPct val="120000"/>
-              </a:lnSpc>
-            </a:pPr>
-            <a:endParaRPr b="0" lang="en-US" sz="1800" spc="-1" strike="noStrike">
-              <a:latin typeface="Arial"/>
-            </a:endParaRPr>
-          </a:p>
-          <a:p>
-            <a:pPr>
-              <a:lnSpc>
-                <a:spcPct val="120000"/>
-              </a:lnSpc>
-            </a:pPr>
-            <a:endParaRPr b="0" lang="en-US" sz="1800" spc="-1" strike="noStrike">
-              <a:latin typeface="Arial"/>
-            </a:endParaRPr>
-          </a:p>
-        </p:txBody>
-      </p:sp>
-      <p:sp>
-        <p:nvSpPr>
-          <p:cNvPr id="182" name="CustomShape 5"/>
-          <p:cNvSpPr/>
-          <p:nvPr/>
-        </p:nvSpPr>
-        <p:spPr>
-          <a:xfrm>
-            <a:off x="822960" y="696600"/>
-            <a:ext cx="7131600" cy="4185000"/>
-          </a:xfrm>
-          <a:prstGeom prst="rect">
-            <a:avLst/>
-          </a:prstGeom>
-          <a:noFill/>
-          <a:ln>
-            <a:noFill/>
-          </a:ln>
-        </p:spPr>
-        <p:style>
-          <a:lnRef idx="0"/>
-          <a:fillRef idx="0"/>
-          <a:effectRef idx="0"/>
-          <a:fontRef idx="minor"/>
-        </p:style>
-        <p:txBody>
-          <a:bodyPr lIns="90000" rIns="90000" tIns="45000" bIns="45000"/>
-          <a:p>
-            <a:pPr>
-              <a:lnSpc>
-                <a:spcPct val="100000"/>
-              </a:lnSpc>
-            </a:pPr>
-            <a:r>
-              <a:rPr b="0" lang="en-US" sz="1800" spc="-1" strike="noStrike">
-                <a:solidFill>
-                  <a:srgbClr val="000000"/>
-                </a:solidFill>
-                <a:latin typeface="Arial"/>
-                <a:ea typeface="DejaVu Sans"/>
-              </a:rPr>
-              <a:t>You can add inputs to the query just as you could from the backend. Try it out by adding an input for `ids`.</a:t>
-            </a:r>
-            <a:endParaRPr b="0" lang="en-US" sz="1800" spc="-1" strike="noStrike">
-              <a:latin typeface="Arial"/>
-            </a:endParaRPr>
-          </a:p>
-          <a:p>
-            <a:pPr>
-              <a:lnSpc>
-                <a:spcPct val="100000"/>
-              </a:lnSpc>
-            </a:pPr>
-            <a:endParaRPr b="0" lang="en-US" sz="1800" spc="-1" strike="noStrike">
-              <a:latin typeface="Arial"/>
-            </a:endParaRPr>
-          </a:p>
-          <a:p>
-            <a:pPr>
-              <a:lnSpc>
-                <a:spcPct val="100000"/>
-              </a:lnSpc>
-            </a:pPr>
-            <a:r>
-              <a:rPr b="0" lang="en-US" sz="1800" spc="-1" strike="noStrike">
-                <a:solidFill>
-                  <a:srgbClr val="000000"/>
-                </a:solidFill>
-                <a:latin typeface="Arial"/>
-                <a:ea typeface="DejaVu Sans"/>
-              </a:rPr>
-              <a:t>Hardcoded inputs are nice, but in order to handle something like user input we will need variable inputs. Add the variables prop to your Query component and update your query:</a:t>
-            </a:r>
-            <a:endParaRPr b="0" lang="en-US" sz="1800" spc="-1" strike="noStrike">
-              <a:latin typeface="Arial"/>
-            </a:endParaRPr>
-          </a:p>
-          <a:p>
-            <a:pPr>
-              <a:lnSpc>
-                <a:spcPct val="100000"/>
-              </a:lnSpc>
-            </a:pPr>
-            <a:r>
-              <a:rPr b="0" lang="en-US" sz="1800" spc="-1" strike="noStrike">
-                <a:solidFill>
-                  <a:srgbClr val="000000"/>
-                </a:solidFill>
-                <a:latin typeface="Arial"/>
-                <a:ea typeface="DejaVu Sans"/>
-              </a:rPr>
-              <a:t>```</a:t>
-            </a:r>
-            <a:endParaRPr b="0" lang="en-US" sz="1800" spc="-1" strike="noStrike">
-              <a:latin typeface="Arial"/>
-            </a:endParaRPr>
-          </a:p>
-          <a:p>
-            <a:pPr>
-              <a:lnSpc>
-                <a:spcPct val="100000"/>
-              </a:lnSpc>
-            </a:pPr>
-            <a:r>
-              <a:rPr b="0" lang="en-US" sz="1800" spc="-1" strike="noStrike">
-                <a:solidFill>
-                  <a:srgbClr val="000000"/>
-                </a:solidFill>
-                <a:latin typeface="Arial"/>
-                <a:ea typeface="DejaVu Sans"/>
-              </a:rPr>
-              <a:t>const query = gql`</a:t>
-            </a:r>
-            <a:endParaRPr b="0" lang="en-US" sz="1800" spc="-1" strike="noStrike">
-              <a:latin typeface="Arial"/>
-            </a:endParaRPr>
-          </a:p>
-          <a:p>
-            <a:pPr>
-              <a:lnSpc>
-                <a:spcPct val="100000"/>
-              </a:lnSpc>
-            </a:pPr>
-            <a:r>
-              <a:rPr b="0" lang="en-US" sz="1800" spc="-1" strike="noStrike">
-                <a:solidFill>
-                  <a:srgbClr val="000000"/>
-                </a:solidFill>
-                <a:latin typeface="Arial"/>
-                <a:ea typeface="DejaVu Sans"/>
-              </a:rPr>
-              <a:t>  </a:t>
-            </a:r>
-            <a:r>
-              <a:rPr b="0" lang="en-US" sz="1800" spc="-1" strike="noStrike">
-                <a:solidFill>
-                  <a:srgbClr val="000000"/>
-                </a:solidFill>
-                <a:latin typeface="Arial"/>
-                <a:ea typeface="DejaVu Sans"/>
-              </a:rPr>
-              <a:t>query practices($ids: [Int]) {</a:t>
-            </a:r>
-            <a:endParaRPr b="0" lang="en-US" sz="1800" spc="-1" strike="noStrike">
-              <a:latin typeface="Arial"/>
-            </a:endParaRPr>
-          </a:p>
-          <a:p>
-            <a:pPr>
-              <a:lnSpc>
-                <a:spcPct val="100000"/>
-              </a:lnSpc>
-            </a:pPr>
-            <a:r>
-              <a:rPr b="0" lang="en-US" sz="1800" spc="-1" strike="noStrike">
-                <a:solidFill>
-                  <a:srgbClr val="000000"/>
-                </a:solidFill>
-                <a:latin typeface="Arial"/>
-                <a:ea typeface="DejaVu Sans"/>
-              </a:rPr>
-              <a:t>    </a:t>
-            </a:r>
-            <a:r>
-              <a:rPr b="0" lang="en-US" sz="1800" spc="-1" strike="noStrike">
-                <a:solidFill>
-                  <a:srgbClr val="000000"/>
-                </a:solidFill>
-                <a:latin typeface="Arial"/>
-                <a:ea typeface="DejaVu Sans"/>
-              </a:rPr>
-              <a:t>practices(ids: $ids) {</a:t>
-            </a:r>
-            <a:endParaRPr b="0" lang="en-US" sz="1800" spc="-1" strike="noStrike">
-              <a:latin typeface="Arial"/>
-            </a:endParaRPr>
-          </a:p>
-          <a:p>
-            <a:pPr>
-              <a:lnSpc>
-                <a:spcPct val="100000"/>
-              </a:lnSpc>
-            </a:pPr>
-            <a:r>
-              <a:rPr b="0" lang="en-US" sz="1800" spc="-1" strike="noStrike">
-                <a:solidFill>
-                  <a:srgbClr val="000000"/>
-                </a:solidFill>
-                <a:latin typeface="Arial"/>
-                <a:ea typeface="DejaVu Sans"/>
-              </a:rPr>
-              <a:t>      </a:t>
-            </a:r>
-            <a:r>
-              <a:rPr b="0" lang="en-US" sz="1800" spc="-1" strike="noStrike">
-                <a:solidFill>
-                  <a:srgbClr val="000000"/>
-                </a:solidFill>
-                <a:latin typeface="Arial"/>
-                <a:ea typeface="DejaVu Sans"/>
-              </a:rPr>
-              <a:t>name</a:t>
-            </a:r>
-            <a:endParaRPr b="0" lang="en-US" sz="1800" spc="-1" strike="noStrike">
-              <a:latin typeface="Arial"/>
-            </a:endParaRPr>
-          </a:p>
-          <a:p>
-            <a:pPr>
-              <a:lnSpc>
-                <a:spcPct val="100000"/>
-              </a:lnSpc>
-            </a:pPr>
-            <a:r>
-              <a:rPr b="0" lang="en-US" sz="1800" spc="-1" strike="noStrike">
-                <a:solidFill>
-                  <a:srgbClr val="000000"/>
-                </a:solidFill>
-                <a:latin typeface="Arial"/>
-                <a:ea typeface="DejaVu Sans"/>
-              </a:rPr>
-              <a:t>      </a:t>
-            </a:r>
-            <a:r>
-              <a:rPr b="0" lang="en-US" sz="1800" spc="-1" strike="noStrike">
-                <a:solidFill>
-                  <a:srgbClr val="000000"/>
-                </a:solidFill>
-                <a:latin typeface="Arial"/>
-                <a:ea typeface="DejaVu Sans"/>
-              </a:rPr>
-              <a:t>...</a:t>
-            </a:r>
-            <a:endParaRPr b="0" lang="en-US" sz="1800" spc="-1" strike="noStrike">
-              <a:latin typeface="Arial"/>
-            </a:endParaRPr>
-          </a:p>
-          <a:p>
-            <a:pPr>
-              <a:lnSpc>
-                <a:spcPct val="100000"/>
-              </a:lnSpc>
-            </a:pPr>
-            <a:r>
-              <a:rPr b="0" lang="en-US" sz="1800" spc="-1" strike="noStrike">
-                <a:solidFill>
-                  <a:srgbClr val="000000"/>
-                </a:solidFill>
-                <a:latin typeface="Arial"/>
-                <a:ea typeface="DejaVu Sans"/>
-              </a:rPr>
-              <a:t>    </a:t>
-            </a:r>
-            <a:r>
-              <a:rPr b="0" lang="en-US" sz="1800" spc="-1" strike="noStrike">
-                <a:solidFill>
-                  <a:srgbClr val="000000"/>
-                </a:solidFill>
-                <a:latin typeface="Arial"/>
-                <a:ea typeface="DejaVu Sans"/>
-              </a:rPr>
-              <a:t>}</a:t>
-            </a:r>
-            <a:endParaRPr b="0" lang="en-US" sz="1800" spc="-1" strike="noStrike">
-              <a:latin typeface="Arial"/>
-            </a:endParaRPr>
-          </a:p>
-          <a:p>
-            <a:pPr>
-              <a:lnSpc>
-                <a:spcPct val="100000"/>
-              </a:lnSpc>
-            </a:pPr>
-            <a:r>
-              <a:rPr b="0" lang="en-US" sz="1800" spc="-1" strike="noStrike">
-                <a:solidFill>
-                  <a:srgbClr val="000000"/>
-                </a:solidFill>
-                <a:latin typeface="Arial"/>
-                <a:ea typeface="DejaVu Sans"/>
-              </a:rPr>
-              <a:t>  </a:t>
-            </a:r>
-            <a:r>
-              <a:rPr b="0" lang="en-US" sz="1800" spc="-1" strike="noStrike">
-                <a:solidFill>
-                  <a:srgbClr val="000000"/>
-                </a:solidFill>
-                <a:latin typeface="Arial"/>
-                <a:ea typeface="DejaVu Sans"/>
-              </a:rPr>
-              <a:t>}</a:t>
-            </a:r>
-            <a:endParaRPr b="0" lang="en-US" sz="1800" spc="-1" strike="noStrike">
-              <a:latin typeface="Arial"/>
-            </a:endParaRPr>
-          </a:p>
-          <a:p>
-            <a:pPr>
-              <a:lnSpc>
-                <a:spcPct val="100000"/>
-              </a:lnSpc>
-            </a:pPr>
-            <a:r>
-              <a:rPr b="0" lang="en-US" sz="1800" spc="-1" strike="noStrike">
-                <a:solidFill>
-                  <a:srgbClr val="000000"/>
-                </a:solidFill>
-                <a:latin typeface="Arial"/>
-                <a:ea typeface="DejaVu Sans"/>
-              </a:rPr>
-              <a:t>`;</a:t>
-            </a:r>
-            <a:endParaRPr b="0" lang="en-US" sz="1800" spc="-1" strike="noStrike">
-              <a:latin typeface="Arial"/>
-            </a:endParaRPr>
-          </a:p>
-          <a:p>
-            <a:pPr>
-              <a:lnSpc>
-                <a:spcPct val="100000"/>
-              </a:lnSpc>
-            </a:pPr>
-            <a:r>
-              <a:rPr b="0" lang="en-US" sz="1800" spc="-1" strike="noStrike">
-                <a:solidFill>
-                  <a:srgbClr val="000000"/>
-                </a:solidFill>
-                <a:latin typeface="Arial"/>
-                <a:ea typeface="DejaVu Sans"/>
-              </a:rPr>
-              <a:t>```</a:t>
-            </a:r>
-            <a:endParaRPr b="0" lang="en-US" sz="1800" spc="-1" strike="noStrike">
-              <a:latin typeface="Arial"/>
-            </a:endParaRPr>
-          </a:p>
-        </p:txBody>
-      </p:sp>
-    </p:spTree>
-  </p:cSld>
-  <p:timing>
-    <p:tnLst>
-      <p:par>
-        <p:cTn id="23" dur="indefinite" restart="never" nodeType="tmRoot">
-          <p:childTnLst>
-            <p:seq>
-              <p:cTn id="24" dur="indefinite" nodeType="mainSeq"/>
-              <p:prevCondLst>
-                <p:cond delay="0" evt="onPrev">
-                  <p:tgtEl>
-                    <p:sldTgt/>
-                  </p:tgtEl>
-                </p:cond>
-              </p:prevCondLst>
-              <p:nextCondLst>
-                <p:cond delay="0" evt="onNext">
-                  <p:tgtEl>
-                    <p:sldTgt/>
-                  </p:tgtEl>
-                </p:cond>
-              </p:nextCondLst>
-            </p:seq>
-          </p:childTnLst>
-        </p:cTn>
-      </p:par>
-    </p:tnLst>
-  </p:timing>
-</p:sld>
-</file>
-
-<file path=ppt/slides/slide13.xml><?xml version="1.0" encoding="utf-8"?>
-<p:sld xmlns:a="http://schemas.openxmlformats.org/drawingml/2006/main" xmlns:p="http://schemas.openxmlformats.org/presentationml/2006/main" xmlns:r="http://schemas.openxmlformats.org/officeDocument/2006/relationships" xmlns:p14="http://schemas.microsoft.com/office/powerpoint/2010/main" xmlns:p15="http://schemas.microsoft.com/office/powerpoint/2012/main" xmlns:mc="http://schemas.openxmlformats.org/markup-compatibility/2006">
-  <p:cSld>
-    <p:spTree>
-      <p:nvGrpSpPr>
-        <p:cNvPr id="1" name=""/>
-        <p:cNvGrpSpPr/>
-        <p:nvPr/>
-      </p:nvGrpSpPr>
-      <p:grpSpPr>
-        <a:xfrm>
-          <a:off x="0" y="0"/>
-          <a:ext cx="0" cy="0"/>
-          <a:chOff x="0" y="0"/>
-          <a:chExt cx="0" cy="0"/>
-        </a:xfrm>
-      </p:grpSpPr>
-      <p:sp>
-        <p:nvSpPr>
-          <p:cNvPr id="183" name="CustomShape 1"/>
-          <p:cNvSpPr/>
-          <p:nvPr/>
-        </p:nvSpPr>
-        <p:spPr>
-          <a:xfrm>
-            <a:off x="720000" y="288000"/>
-            <a:ext cx="6612840" cy="492840"/>
-          </a:xfrm>
-          <a:prstGeom prst="rect">
-            <a:avLst/>
-          </a:prstGeom>
-          <a:noFill/>
-          <a:ln>
-            <a:noFill/>
-          </a:ln>
-        </p:spPr>
-        <p:style>
-          <a:lnRef idx="0"/>
-          <a:fillRef idx="0"/>
-          <a:effectRef idx="0"/>
-          <a:fontRef idx="minor"/>
-        </p:style>
-        <p:txBody>
-          <a:bodyPr lIns="0" rIns="0" tIns="0" bIns="0" anchor="ctr"/>
-          <a:p>
-            <a:pPr>
-              <a:lnSpc>
-                <a:spcPct val="85000"/>
-              </a:lnSpc>
-            </a:pPr>
-            <a:r>
-              <a:rPr b="1" lang="en-US" sz="1800" spc="-1" strike="noStrike">
-                <a:solidFill>
-                  <a:srgbClr val="e63232"/>
-                </a:solidFill>
-                <a:latin typeface="Arial"/>
-                <a:ea typeface="DejaVu Sans"/>
-              </a:rPr>
-              <a:t>Inputs from the front-end</a:t>
-            </a:r>
-            <a:endParaRPr b="0" lang="en-US" sz="1800" spc="-1" strike="noStrike">
-              <a:latin typeface="Arial"/>
-            </a:endParaRPr>
-          </a:p>
-        </p:txBody>
-      </p:sp>
-      <p:sp>
-        <p:nvSpPr>
-          <p:cNvPr id="184" name="CustomShape 2"/>
-          <p:cNvSpPr/>
-          <p:nvPr/>
-        </p:nvSpPr>
-        <p:spPr>
-          <a:xfrm>
-            <a:off x="4968000" y="5004000"/>
-            <a:ext cx="3228840" cy="96840"/>
-          </a:xfrm>
-          <a:prstGeom prst="rect">
-            <a:avLst/>
-          </a:prstGeom>
-          <a:noFill/>
-          <a:ln>
-            <a:noFill/>
-          </a:ln>
-        </p:spPr>
-        <p:style>
-          <a:lnRef idx="0"/>
-          <a:fillRef idx="0"/>
-          <a:effectRef idx="0"/>
-          <a:fontRef idx="minor"/>
-        </p:style>
-        <p:txBody>
-          <a:bodyPr lIns="0" rIns="0" tIns="0" bIns="0"/>
-          <a:p>
-            <a:pPr algn="r">
-              <a:lnSpc>
-                <a:spcPct val="100000"/>
-              </a:lnSpc>
-            </a:pPr>
-            <a:r>
-              <a:rPr b="0" lang="en-US" sz="600" spc="-1" strike="noStrike">
-                <a:solidFill>
-                  <a:srgbClr val="ffffff"/>
-                </a:solidFill>
-                <a:latin typeface="Arial"/>
-                <a:ea typeface="DejaVu Sans"/>
-              </a:rPr>
-              <a:t>GraphQL</a:t>
-            </a:r>
-            <a:endParaRPr b="0" lang="en-US" sz="600" spc="-1" strike="noStrike">
-              <a:latin typeface="Arial"/>
-            </a:endParaRPr>
-          </a:p>
-        </p:txBody>
-      </p:sp>
-      <p:sp>
-        <p:nvSpPr>
-          <p:cNvPr id="185" name="CustomShape 3"/>
-          <p:cNvSpPr/>
-          <p:nvPr/>
-        </p:nvSpPr>
-        <p:spPr>
-          <a:xfrm>
-            <a:off x="8280000" y="5004000"/>
-            <a:ext cx="132840" cy="96840"/>
-          </a:xfrm>
-          <a:prstGeom prst="rect">
-            <a:avLst/>
-          </a:prstGeom>
-          <a:noFill/>
-          <a:ln>
-            <a:noFill/>
-          </a:ln>
-        </p:spPr>
-        <p:style>
-          <a:lnRef idx="0"/>
-          <a:fillRef idx="0"/>
-          <a:effectRef idx="0"/>
-          <a:fontRef idx="minor"/>
-        </p:style>
-        <p:txBody>
-          <a:bodyPr lIns="0" rIns="0" tIns="0" bIns="0"/>
-          <a:p>
-            <a:pPr algn="r">
-              <a:lnSpc>
-                <a:spcPct val="100000"/>
-              </a:lnSpc>
-            </a:pPr>
-            <a:fld id="{32DC13C3-72F5-4FD8-8255-9FEF5B83C4B6}" type="slidenum">
-              <a:rPr b="0" lang="en-US" sz="600" spc="-1" strike="noStrike">
-                <a:solidFill>
-                  <a:srgbClr val="ffffff"/>
-                </a:solidFill>
-                <a:latin typeface="Arial"/>
-                <a:ea typeface="DejaVu Sans"/>
-              </a:rPr>
-              <a:t>&lt;number&gt;</a:t>
-            </a:fld>
-            <a:endParaRPr b="0" lang="en-US" sz="600" spc="-1" strike="noStrike">
-              <a:latin typeface="Arial"/>
-            </a:endParaRPr>
-          </a:p>
-        </p:txBody>
-      </p:sp>
-      <p:sp>
-        <p:nvSpPr>
-          <p:cNvPr id="186" name="CustomShape 4"/>
-          <p:cNvSpPr/>
-          <p:nvPr/>
-        </p:nvSpPr>
-        <p:spPr>
-          <a:xfrm>
-            <a:off x="602640" y="504720"/>
-            <a:ext cx="6612840" cy="3876120"/>
-          </a:xfrm>
-          <a:prstGeom prst="rect">
-            <a:avLst/>
-          </a:prstGeom>
-          <a:noFill/>
-          <a:ln>
-            <a:noFill/>
-          </a:ln>
-        </p:spPr>
-        <p:style>
-          <a:lnRef idx="0"/>
-          <a:fillRef idx="0"/>
-          <a:effectRef idx="0"/>
-          <a:fontRef idx="minor"/>
-        </p:style>
-        <p:txBody>
-          <a:bodyPr lIns="0" rIns="0" tIns="0" bIns="0"/>
-          <a:p>
-            <a:pPr>
-              <a:lnSpc>
-                <a:spcPct val="120000"/>
-              </a:lnSpc>
-            </a:pPr>
-            <a:endParaRPr b="0" lang="en-US" sz="1800" spc="-1" strike="noStrike">
-              <a:latin typeface="Arial"/>
-            </a:endParaRPr>
-          </a:p>
-          <a:p>
-            <a:pPr>
-              <a:lnSpc>
-                <a:spcPct val="120000"/>
-              </a:lnSpc>
-            </a:pPr>
-            <a:endParaRPr b="0" lang="en-US" sz="1800" spc="-1" strike="noStrike">
-              <a:latin typeface="Arial"/>
-            </a:endParaRPr>
-          </a:p>
-        </p:txBody>
-      </p:sp>
-      <p:sp>
-        <p:nvSpPr>
-          <p:cNvPr id="187" name="CustomShape 5"/>
-          <p:cNvSpPr/>
-          <p:nvPr/>
-        </p:nvSpPr>
-        <p:spPr>
-          <a:xfrm>
-            <a:off x="822960" y="696600"/>
-            <a:ext cx="7131600" cy="1369440"/>
+            <a:ext cx="7131240" cy="1369080"/>
           </a:xfrm>
           <a:prstGeom prst="rect">
             <a:avLst/>
@@ -7378,10 +5620,10 @@
   <p:timing>
     <p:tnLst>
       <p:par>
-        <p:cTn id="25" dur="indefinite" restart="never" nodeType="tmRoot">
+        <p:cTn id="19" dur="indefinite" restart="never" nodeType="tmRoot">
           <p:childTnLst>
             <p:seq>
-              <p:cTn id="26" dur="indefinite" nodeType="mainSeq"/>
+              <p:cTn id="20" dur="indefinite" nodeType="mainSeq"/>
               <p:prevCondLst>
                 <p:cond delay="0" evt="onPrev">
                   <p:tgtEl>
@@ -7431,7 +5673,7 @@
         <p:spPr>
           <a:xfrm>
             <a:off x="720000" y="288000"/>
-            <a:ext cx="6612840" cy="492840"/>
+            <a:ext cx="6612480" cy="492480"/>
           </a:xfrm>
           <a:prstGeom prst="rect">
             <a:avLst/>
@@ -7480,7 +5722,7 @@
         <p:spPr>
           <a:xfrm>
             <a:off x="4968000" y="5004000"/>
-            <a:ext cx="3228840" cy="96840"/>
+            <a:ext cx="3228480" cy="96480"/>
           </a:xfrm>
           <a:prstGeom prst="rect">
             <a:avLst/>
@@ -7529,7 +5771,7 @@
         <p:spPr>
           <a:xfrm>
             <a:off x="8280000" y="5004000"/>
-            <a:ext cx="132840" cy="96840"/>
+            <a:ext cx="132480" cy="96480"/>
           </a:xfrm>
           <a:prstGeom prst="rect">
             <a:avLst/>
@@ -7553,7 +5795,7 @@
                 <a:spcPct val="100000"/>
               </a:lnSpc>
             </a:pPr>
-            <a:fld id="{B24710EE-E61F-40D8-BA07-F241CCBC0BC8}" type="slidenum">
+            <a:fld id="{CB4A9731-F7DD-46F4-8496-557EDEF6113C}" type="slidenum">
               <a:rPr b="0" lang="en-US" sz="600" spc="-1" strike="noStrike">
                 <a:solidFill>
                   <a:srgbClr val="ffffff"/>
@@ -7578,7 +5820,7 @@
         <p:spPr>
           <a:xfrm>
             <a:off x="602640" y="504720"/>
-            <a:ext cx="6612840" cy="3876120"/>
+            <a:ext cx="6612480" cy="3875760"/>
           </a:xfrm>
           <a:prstGeom prst="rect">
             <a:avLst/>
@@ -7676,7 +5918,7 @@
         <p:spPr>
           <a:xfrm>
             <a:off x="720000" y="288000"/>
-            <a:ext cx="6612840" cy="492840"/>
+            <a:ext cx="6612480" cy="492480"/>
           </a:xfrm>
           <a:prstGeom prst="rect">
             <a:avLst/>
@@ -7725,7 +5967,7 @@
         <p:spPr>
           <a:xfrm>
             <a:off x="4968000" y="5004000"/>
-            <a:ext cx="3228840" cy="96840"/>
+            <a:ext cx="3228480" cy="96480"/>
           </a:xfrm>
           <a:prstGeom prst="rect">
             <a:avLst/>
@@ -7774,7 +6016,7 @@
         <p:spPr>
           <a:xfrm>
             <a:off x="8280000" y="5004000"/>
-            <a:ext cx="132840" cy="96840"/>
+            <a:ext cx="132480" cy="96480"/>
           </a:xfrm>
           <a:prstGeom prst="rect">
             <a:avLst/>
@@ -7798,7 +6040,7 @@
                 <a:spcPct val="100000"/>
               </a:lnSpc>
             </a:pPr>
-            <a:fld id="{74638074-6434-46CE-827E-0EEB0BEF1E67}" type="slidenum">
+            <a:fld id="{5DDC068D-D25F-49D8-BFF4-29A065F3B242}" type="slidenum">
               <a:rPr b="0" lang="en-US" sz="600" spc="-1" strike="noStrike">
                 <a:solidFill>
                   <a:srgbClr val="ffffff"/>
@@ -7823,7 +6065,7 @@
         <p:spPr>
           <a:xfrm>
             <a:off x="602640" y="504720"/>
-            <a:ext cx="6612840" cy="3876120"/>
+            <a:ext cx="6612480" cy="3875760"/>
           </a:xfrm>
           <a:prstGeom prst="rect">
             <a:avLst/>
@@ -7876,7 +6118,7 @@
         <p:spPr>
           <a:xfrm>
             <a:off x="1019520" y="1280160"/>
-            <a:ext cx="4008960" cy="1970640"/>
+            <a:ext cx="4008600" cy="1970280"/>
           </a:xfrm>
           <a:prstGeom prst="rect">
             <a:avLst/>
@@ -7944,7 +6186,7 @@
         <p:spPr>
           <a:xfrm>
             <a:off x="720000" y="288000"/>
-            <a:ext cx="6612840" cy="492840"/>
+            <a:ext cx="6612480" cy="492480"/>
           </a:xfrm>
           <a:prstGeom prst="rect">
             <a:avLst/>
@@ -7993,7 +6235,7 @@
         <p:spPr>
           <a:xfrm>
             <a:off x="4968000" y="5004000"/>
-            <a:ext cx="3228840" cy="96840"/>
+            <a:ext cx="3228480" cy="96480"/>
           </a:xfrm>
           <a:prstGeom prst="rect">
             <a:avLst/>
@@ -8042,7 +6284,7 @@
         <p:spPr>
           <a:xfrm>
             <a:off x="8280000" y="5004000"/>
-            <a:ext cx="132840" cy="96840"/>
+            <a:ext cx="132480" cy="96480"/>
           </a:xfrm>
           <a:prstGeom prst="rect">
             <a:avLst/>
@@ -8066,7 +6308,7 @@
                 <a:spcPct val="100000"/>
               </a:lnSpc>
             </a:pPr>
-            <a:fld id="{36B98AD0-568A-4922-BCB3-8FFE85538C1E}" type="slidenum">
+            <a:fld id="{731E60CA-B314-4F81-81DD-1A8AE6BE1B93}" type="slidenum">
               <a:rPr b="0" lang="en-US" sz="600" spc="-1" strike="noStrike">
                 <a:solidFill>
                   <a:srgbClr val="ffffff"/>
@@ -8091,7 +6333,7 @@
         <p:spPr>
           <a:xfrm>
             <a:off x="602640" y="504720"/>
-            <a:ext cx="6612840" cy="3876120"/>
+            <a:ext cx="6612480" cy="3875760"/>
           </a:xfrm>
           <a:prstGeom prst="rect">
             <a:avLst/>
@@ -8140,7 +6382,7 @@
         <p:spPr>
           <a:xfrm>
             <a:off x="822960" y="1188720"/>
-            <a:ext cx="6582960" cy="857520"/>
+            <a:ext cx="6582600" cy="857160"/>
           </a:xfrm>
           <a:prstGeom prst="rect">
             <a:avLst/>
@@ -8268,7 +6510,7 @@
         <p:spPr>
           <a:xfrm>
             <a:off x="720000" y="288000"/>
-            <a:ext cx="6612840" cy="492840"/>
+            <a:ext cx="6612480" cy="492480"/>
           </a:xfrm>
           <a:prstGeom prst="rect">
             <a:avLst/>
@@ -8317,7 +6559,7 @@
         <p:spPr>
           <a:xfrm>
             <a:off x="4968000" y="5004000"/>
-            <a:ext cx="3228840" cy="96840"/>
+            <a:ext cx="3228480" cy="96480"/>
           </a:xfrm>
           <a:prstGeom prst="rect">
             <a:avLst/>
@@ -8366,7 +6608,7 @@
         <p:spPr>
           <a:xfrm>
             <a:off x="8280000" y="5004000"/>
-            <a:ext cx="132840" cy="96840"/>
+            <a:ext cx="132480" cy="96480"/>
           </a:xfrm>
           <a:prstGeom prst="rect">
             <a:avLst/>
@@ -8390,7 +6632,7 @@
                 <a:spcPct val="100000"/>
               </a:lnSpc>
             </a:pPr>
-            <a:fld id="{027D95D3-6E04-4A40-B608-0F5C2A6FD1E7}" type="slidenum">
+            <a:fld id="{94E8786C-576D-4B67-9591-443C7590E787}" type="slidenum">
               <a:rPr b="0" lang="en-US" sz="600" spc="-1" strike="noStrike">
                 <a:solidFill>
                   <a:srgbClr val="ffffff"/>
@@ -8415,7 +6657,7 @@
         <p:spPr>
           <a:xfrm>
             <a:off x="602640" y="504720"/>
-            <a:ext cx="6612840" cy="3876120"/>
+            <a:ext cx="6612480" cy="3875760"/>
           </a:xfrm>
           <a:prstGeom prst="rect">
             <a:avLst/>
@@ -8464,7 +6706,7 @@
         <p:spPr>
           <a:xfrm>
             <a:off x="822960" y="1188720"/>
-            <a:ext cx="6582960" cy="857520"/>
+            <a:ext cx="6582600" cy="857160"/>
           </a:xfrm>
           <a:prstGeom prst="rect">
             <a:avLst/>
@@ -8582,7 +6824,7 @@
         <p:spPr>
           <a:xfrm>
             <a:off x="720000" y="288000"/>
-            <a:ext cx="6612840" cy="492840"/>
+            <a:ext cx="6612480" cy="492480"/>
           </a:xfrm>
           <a:prstGeom prst="rect">
             <a:avLst/>
@@ -8631,7 +6873,7 @@
         <p:spPr>
           <a:xfrm>
             <a:off x="4968000" y="5004000"/>
-            <a:ext cx="3228840" cy="96840"/>
+            <a:ext cx="3228480" cy="96480"/>
           </a:xfrm>
           <a:prstGeom prst="rect">
             <a:avLst/>
@@ -8680,7 +6922,7 @@
         <p:spPr>
           <a:xfrm>
             <a:off x="8280000" y="5004000"/>
-            <a:ext cx="132840" cy="96840"/>
+            <a:ext cx="132480" cy="96480"/>
           </a:xfrm>
           <a:prstGeom prst="rect">
             <a:avLst/>
@@ -8704,7 +6946,7 @@
                 <a:spcPct val="100000"/>
               </a:lnSpc>
             </a:pPr>
-            <a:fld id="{D6BBB30D-9DA2-41CA-81A4-4536DC788D46}" type="slidenum">
+            <a:fld id="{818CE36B-6BD5-421F-994F-FC666D84EA13}" type="slidenum">
               <a:rPr b="0" lang="en-US" sz="600" spc="-1" strike="noStrike">
                 <a:solidFill>
                   <a:srgbClr val="ffffff"/>
@@ -8729,7 +6971,7 @@
         <p:spPr>
           <a:xfrm>
             <a:off x="602640" y="504720"/>
-            <a:ext cx="6612840" cy="3876120"/>
+            <a:ext cx="6612480" cy="3875760"/>
           </a:xfrm>
           <a:prstGeom prst="rect">
             <a:avLst/>
@@ -8778,7 +7020,7 @@
         <p:spPr>
           <a:xfrm>
             <a:off x="822960" y="1188720"/>
-            <a:ext cx="6582960" cy="1113480"/>
+            <a:ext cx="6582600" cy="1113120"/>
           </a:xfrm>
           <a:prstGeom prst="rect">
             <a:avLst/>
@@ -8936,7 +7178,7 @@
         <p:spPr>
           <a:xfrm>
             <a:off x="720000" y="288000"/>
-            <a:ext cx="6612840" cy="492840"/>
+            <a:ext cx="6612480" cy="492480"/>
           </a:xfrm>
           <a:prstGeom prst="rect">
             <a:avLst/>
@@ -8985,7 +7227,7 @@
         <p:spPr>
           <a:xfrm>
             <a:off x="4968000" y="5004000"/>
-            <a:ext cx="3228840" cy="96840"/>
+            <a:ext cx="3228480" cy="96480"/>
           </a:xfrm>
           <a:prstGeom prst="rect">
             <a:avLst/>
@@ -9034,7 +7276,7 @@
         <p:spPr>
           <a:xfrm>
             <a:off x="8280000" y="5004000"/>
-            <a:ext cx="132840" cy="96840"/>
+            <a:ext cx="132480" cy="96480"/>
           </a:xfrm>
           <a:prstGeom prst="rect">
             <a:avLst/>
@@ -9058,7 +7300,7 @@
                 <a:spcPct val="100000"/>
               </a:lnSpc>
             </a:pPr>
-            <a:fld id="{E05F5CF2-D714-43E0-891B-D9078C119151}" type="slidenum">
+            <a:fld id="{CD1E5314-C0AE-42B8-9035-8720CC2EC1DC}" type="slidenum">
               <a:rPr b="0" lang="en-US" sz="600" spc="-1" strike="noStrike">
                 <a:solidFill>
                   <a:srgbClr val="ffffff"/>
@@ -9083,7 +7325,7 @@
         <p:spPr>
           <a:xfrm>
             <a:off x="602640" y="504720"/>
-            <a:ext cx="6612840" cy="3876120"/>
+            <a:ext cx="6612480" cy="3875760"/>
           </a:xfrm>
           <a:prstGeom prst="rect">
             <a:avLst/>
@@ -9132,7 +7374,7 @@
         <p:spPr>
           <a:xfrm>
             <a:off x="822960" y="1188720"/>
-            <a:ext cx="6582960" cy="1113480"/>
+            <a:ext cx="6582600" cy="1113120"/>
           </a:xfrm>
           <a:prstGeom prst="rect">
             <a:avLst/>
@@ -9230,7 +7472,7 @@
         <p:spPr>
           <a:xfrm>
             <a:off x="720000" y="288000"/>
-            <a:ext cx="6612840" cy="492840"/>
+            <a:ext cx="6612480" cy="492480"/>
           </a:xfrm>
           <a:prstGeom prst="rect">
             <a:avLst/>
@@ -9279,7 +7521,7 @@
         <p:spPr>
           <a:xfrm>
             <a:off x="4968000" y="5004000"/>
-            <a:ext cx="3228840" cy="96840"/>
+            <a:ext cx="3228480" cy="96480"/>
           </a:xfrm>
           <a:prstGeom prst="rect">
             <a:avLst/>
@@ -9328,7 +7570,7 @@
         <p:spPr>
           <a:xfrm>
             <a:off x="8280000" y="5004000"/>
-            <a:ext cx="132840" cy="96840"/>
+            <a:ext cx="132480" cy="96480"/>
           </a:xfrm>
           <a:prstGeom prst="rect">
             <a:avLst/>
@@ -9352,7 +7594,7 @@
                 <a:spcPct val="100000"/>
               </a:lnSpc>
             </a:pPr>
-            <a:fld id="{D92E3597-5998-4038-9FC0-EB6B9D9A1F51}" type="slidenum">
+            <a:fld id="{B0F3475A-5820-47FA-9456-BDA76DD6A168}" type="slidenum">
               <a:rPr b="0" lang="en-US" sz="600" spc="-1" strike="noStrike">
                 <a:solidFill>
                   <a:srgbClr val="ffffff"/>
@@ -9377,7 +7619,7 @@
         <p:spPr>
           <a:xfrm>
             <a:off x="602640" y="504720"/>
-            <a:ext cx="6612840" cy="3876120"/>
+            <a:ext cx="6612480" cy="3875760"/>
           </a:xfrm>
           <a:prstGeom prst="rect">
             <a:avLst/>
@@ -9426,7 +7668,7 @@
         <p:spPr>
           <a:xfrm>
             <a:off x="822960" y="1188720"/>
-            <a:ext cx="6582960" cy="345600"/>
+            <a:ext cx="6582600" cy="345240"/>
           </a:xfrm>
           <a:prstGeom prst="rect">
             <a:avLst/>
@@ -9614,7 +7856,7 @@
         <p:spPr>
           <a:xfrm>
             <a:off x="720000" y="288000"/>
-            <a:ext cx="6612840" cy="492840"/>
+            <a:ext cx="6612480" cy="492480"/>
           </a:xfrm>
           <a:prstGeom prst="rect">
             <a:avLst/>
@@ -9663,7 +7905,7 @@
         <p:spPr>
           <a:xfrm>
             <a:off x="1097280" y="2194560"/>
-            <a:ext cx="3646800" cy="767880"/>
+            <a:ext cx="3646440" cy="767520"/>
           </a:xfrm>
           <a:prstGeom prst="rect">
             <a:avLst/>
@@ -9712,7 +7954,7 @@
         <p:spPr>
           <a:xfrm>
             <a:off x="4968000" y="5004000"/>
-            <a:ext cx="3228840" cy="96840"/>
+            <a:ext cx="3228480" cy="96480"/>
           </a:xfrm>
           <a:prstGeom prst="rect">
             <a:avLst/>
@@ -9761,7 +8003,7 @@
         <p:spPr>
           <a:xfrm>
             <a:off x="8280000" y="5004000"/>
-            <a:ext cx="132840" cy="96840"/>
+            <a:ext cx="132480" cy="96480"/>
           </a:xfrm>
           <a:prstGeom prst="rect">
             <a:avLst/>
@@ -9785,7 +8027,7 @@
                 <a:spcPct val="100000"/>
               </a:lnSpc>
             </a:pPr>
-            <a:fld id="{EA11D9E8-EDD1-4C5F-A5FB-91C87DF4C0F6}" type="slidenum">
+            <a:fld id="{CCD17C48-4DB6-4108-A69B-90DEC4ABBDCE}" type="slidenum">
               <a:rPr b="0" lang="en-US" sz="600" spc="-1" strike="noStrike">
                 <a:solidFill>
                   <a:srgbClr val="ffffff"/>
@@ -9814,7 +8056,7 @@
         <p:spPr>
           <a:xfrm>
             <a:off x="6840000" y="810000"/>
-            <a:ext cx="2292840" cy="3498840"/>
+            <a:ext cx="2292480" cy="3498480"/>
           </a:xfrm>
           <a:prstGeom prst="rect">
             <a:avLst/>
@@ -9836,7 +8078,7 @@
         <p:spPr>
           <a:xfrm>
             <a:off x="1097280" y="1422000"/>
-            <a:ext cx="3646800" cy="767880"/>
+            <a:ext cx="3646440" cy="767520"/>
           </a:xfrm>
           <a:prstGeom prst="rect">
             <a:avLst/>

</xml_diff>